<commit_message>
Updates to Powerpoint for sbl.
</commit_message>
<xml_diff>
--- a/SBL_talk/sbl_presentation.pptx
+++ b/SBL_talk/sbl_presentation.pptx
@@ -5,21 +5,36 @@
     <p:sldMasterId id="2147483648" r:id="rId1"/>
   </p:sldMasterIdLst>
   <p:sldIdLst>
-    <p:sldId id="260" r:id="rId2"/>
-    <p:sldId id="261" r:id="rId3"/>
-    <p:sldId id="267" r:id="rId4"/>
-    <p:sldId id="263" r:id="rId5"/>
-    <p:sldId id="265" r:id="rId6"/>
-    <p:sldId id="266" r:id="rId7"/>
-    <p:sldId id="268" r:id="rId8"/>
-    <p:sldId id="269" r:id="rId9"/>
-    <p:sldId id="270" r:id="rId10"/>
-    <p:sldId id="271" r:id="rId11"/>
-    <p:sldId id="274" r:id="rId12"/>
-    <p:sldId id="275" r:id="rId13"/>
-    <p:sldId id="276" r:id="rId14"/>
-    <p:sldId id="272" r:id="rId15"/>
-    <p:sldId id="273" r:id="rId16"/>
+    <p:sldId id="277" r:id="rId2"/>
+    <p:sldId id="284" r:id="rId3"/>
+    <p:sldId id="285" r:id="rId4"/>
+    <p:sldId id="278" r:id="rId5"/>
+    <p:sldId id="282" r:id="rId6"/>
+    <p:sldId id="279" r:id="rId7"/>
+    <p:sldId id="280" r:id="rId8"/>
+    <p:sldId id="286" r:id="rId9"/>
+    <p:sldId id="291" r:id="rId10"/>
+    <p:sldId id="260" r:id="rId11"/>
+    <p:sldId id="261" r:id="rId12"/>
+    <p:sldId id="267" r:id="rId13"/>
+    <p:sldId id="263" r:id="rId14"/>
+    <p:sldId id="265" r:id="rId15"/>
+    <p:sldId id="266" r:id="rId16"/>
+    <p:sldId id="268" r:id="rId17"/>
+    <p:sldId id="269" r:id="rId18"/>
+    <p:sldId id="270" r:id="rId19"/>
+    <p:sldId id="271" r:id="rId20"/>
+    <p:sldId id="274" r:id="rId21"/>
+    <p:sldId id="275" r:id="rId22"/>
+    <p:sldId id="298" r:id="rId23"/>
+    <p:sldId id="299" r:id="rId24"/>
+    <p:sldId id="300" r:id="rId25"/>
+    <p:sldId id="292" r:id="rId26"/>
+    <p:sldId id="293" r:id="rId27"/>
+    <p:sldId id="294" r:id="rId28"/>
+    <p:sldId id="295" r:id="rId29"/>
+    <p:sldId id="296" r:id="rId30"/>
+    <p:sldId id="273" r:id="rId31"/>
   </p:sldIdLst>
   <p:sldSz cx="9144000" cy="6858000" type="screen4x3"/>
   <p:notesSz cx="6858000" cy="9144000"/>
@@ -3109,6 +3124,36 @@
           <a:chExt cx="0" cy="0"/>
         </a:xfrm>
       </p:grpSpPr>
+    </p:spTree>
+    <p:extLst>
+      <p:ext uri="{BB962C8B-B14F-4D97-AF65-F5344CB8AC3E}">
+        <p14:creationId xmlns:p14="http://schemas.microsoft.com/office/powerpoint/2010/main" val="1519797498"/>
+      </p:ext>
+    </p:extLst>
+  </p:cSld>
+  <p:clrMapOvr>
+    <a:masterClrMapping/>
+  </p:clrMapOvr>
+</p:sld>
+</file>
+
+<file path=ppt/slides/slide10.xml><?xml version="1.0" encoding="utf-8"?>
+<p:sld xmlns:a="http://schemas.openxmlformats.org/drawingml/2006/main" xmlns:r="http://schemas.openxmlformats.org/officeDocument/2006/relationships" xmlns:p="http://schemas.openxmlformats.org/presentationml/2006/main">
+  <p:cSld>
+    <p:spTree>
+      <p:nvGrpSpPr>
+        <p:cNvPr id="1" name=""/>
+        <p:cNvGrpSpPr/>
+        <p:nvPr/>
+      </p:nvGrpSpPr>
+      <p:grpSpPr>
+        <a:xfrm>
+          <a:off x="0" y="0"/>
+          <a:ext cx="0" cy="0"/>
+          <a:chOff x="0" y="0"/>
+          <a:chExt cx="0" cy="0"/>
+        </a:xfrm>
+      </p:grpSpPr>
       <p:pic>
         <p:nvPicPr>
           <p:cNvPr id="2050" name="Picture 2" descr="C:\Users\Bob Gorman\AppData\Local\Skitch\aldt02_111315_125120_PM.jpg"/>
@@ -3163,7 +3208,642 @@
 </p:sld>
 </file>
 
-<file path=ppt/slides/slide10.xml><?xml version="1.0" encoding="utf-8"?>
+<file path=ppt/slides/slide11.xml><?xml version="1.0" encoding="utf-8"?>
+<p:sld xmlns:a="http://schemas.openxmlformats.org/drawingml/2006/main" xmlns:r="http://schemas.openxmlformats.org/officeDocument/2006/relationships" xmlns:p="http://schemas.openxmlformats.org/presentationml/2006/main">
+  <p:cSld>
+    <p:spTree>
+      <p:nvGrpSpPr>
+        <p:cNvPr id="1" name=""/>
+        <p:cNvGrpSpPr/>
+        <p:nvPr/>
+      </p:nvGrpSpPr>
+      <p:grpSpPr>
+        <a:xfrm>
+          <a:off x="0" y="0"/>
+          <a:ext cx="0" cy="0"/>
+          <a:chOff x="0" y="0"/>
+          <a:chExt cx="0" cy="0"/>
+        </a:xfrm>
+      </p:grpSpPr>
+      <p:pic>
+        <p:nvPicPr>
+          <p:cNvPr id="3076" name="Picture 4" descr="C:\Users\Bob Gorman\AppData\Local\Skitch\Screenshot_111315_011014_PM.jpg"/>
+          <p:cNvPicPr>
+            <a:picLocks noChangeAspect="1" noChangeArrowheads="1"/>
+          </p:cNvPicPr>
+          <p:nvPr/>
+        </p:nvPicPr>
+        <p:blipFill>
+          <a:blip r:embed="rId2">
+            <a:extLst>
+              <a:ext uri="{28A0092B-C50C-407E-A947-70E740481C1C}">
+                <a14:useLocalDpi xmlns:a14="http://schemas.microsoft.com/office/drawing/2010/main" val="0"/>
+              </a:ext>
+            </a:extLst>
+          </a:blip>
+          <a:srcRect/>
+          <a:stretch>
+            <a:fillRect/>
+          </a:stretch>
+        </p:blipFill>
+        <p:spPr bwMode="auto">
+          <a:xfrm>
+            <a:off x="685800" y="685800"/>
+            <a:ext cx="6781799" cy="5413313"/>
+          </a:xfrm>
+          <a:prstGeom prst="rect">
+            <a:avLst/>
+          </a:prstGeom>
+          <a:noFill/>
+          <a:extLst>
+            <a:ext uri="{909E8E84-426E-40DD-AFC4-6F175D3DCCD1}">
+              <a14:hiddenFill xmlns:a14="http://schemas.microsoft.com/office/drawing/2010/main">
+                <a:solidFill>
+                  <a:srgbClr val="FFFFFF"/>
+                </a:solidFill>
+              </a14:hiddenFill>
+            </a:ext>
+          </a:extLst>
+        </p:spPr>
+      </p:pic>
+    </p:spTree>
+    <p:extLst>
+      <p:ext uri="{BB962C8B-B14F-4D97-AF65-F5344CB8AC3E}">
+        <p14:creationId xmlns:p14="http://schemas.microsoft.com/office/powerpoint/2010/main" val="3743517916"/>
+      </p:ext>
+    </p:extLst>
+  </p:cSld>
+  <p:clrMapOvr>
+    <a:masterClrMapping/>
+  </p:clrMapOvr>
+</p:sld>
+</file>
+
+<file path=ppt/slides/slide12.xml><?xml version="1.0" encoding="utf-8"?>
+<p:sld xmlns:a="http://schemas.openxmlformats.org/drawingml/2006/main" xmlns:r="http://schemas.openxmlformats.org/officeDocument/2006/relationships" xmlns:p="http://schemas.openxmlformats.org/presentationml/2006/main">
+  <p:cSld>
+    <p:spTree>
+      <p:nvGrpSpPr>
+        <p:cNvPr id="1" name=""/>
+        <p:cNvGrpSpPr/>
+        <p:nvPr/>
+      </p:nvGrpSpPr>
+      <p:grpSpPr>
+        <a:xfrm>
+          <a:off x="0" y="0"/>
+          <a:ext cx="0" cy="0"/>
+          <a:chOff x="0" y="0"/>
+          <a:chExt cx="0" cy="0"/>
+        </a:xfrm>
+      </p:grpSpPr>
+      <p:pic>
+        <p:nvPicPr>
+          <p:cNvPr id="6146" name="Picture 2" descr="C:\Users\Bob Gorman\AppData\Local\Skitch\Screenshot_111315_011344_PM.jpg"/>
+          <p:cNvPicPr>
+            <a:picLocks noChangeAspect="1" noChangeArrowheads="1"/>
+          </p:cNvPicPr>
+          <p:nvPr/>
+        </p:nvPicPr>
+        <p:blipFill>
+          <a:blip r:embed="rId2">
+            <a:extLst>
+              <a:ext uri="{28A0092B-C50C-407E-A947-70E740481C1C}">
+                <a14:useLocalDpi xmlns:a14="http://schemas.microsoft.com/office/drawing/2010/main" val="0"/>
+              </a:ext>
+            </a:extLst>
+          </a:blip>
+          <a:srcRect/>
+          <a:stretch>
+            <a:fillRect/>
+          </a:stretch>
+        </p:blipFill>
+        <p:spPr bwMode="auto">
+          <a:xfrm>
+            <a:off x="990600" y="152400"/>
+            <a:ext cx="7250187" cy="5334000"/>
+          </a:xfrm>
+          <a:prstGeom prst="rect">
+            <a:avLst/>
+          </a:prstGeom>
+          <a:noFill/>
+          <a:extLst>
+            <a:ext uri="{909E8E84-426E-40DD-AFC4-6F175D3DCCD1}">
+              <a14:hiddenFill xmlns:a14="http://schemas.microsoft.com/office/drawing/2010/main">
+                <a:solidFill>
+                  <a:srgbClr val="FFFFFF"/>
+                </a:solidFill>
+              </a14:hiddenFill>
+            </a:ext>
+          </a:extLst>
+        </p:spPr>
+      </p:pic>
+    </p:spTree>
+    <p:extLst>
+      <p:ext uri="{BB962C8B-B14F-4D97-AF65-F5344CB8AC3E}">
+        <p14:creationId xmlns:p14="http://schemas.microsoft.com/office/powerpoint/2010/main" val="2153672897"/>
+      </p:ext>
+    </p:extLst>
+  </p:cSld>
+  <p:clrMapOvr>
+    <a:masterClrMapping/>
+  </p:clrMapOvr>
+</p:sld>
+</file>
+
+<file path=ppt/slides/slide13.xml><?xml version="1.0" encoding="utf-8"?>
+<p:sld xmlns:a="http://schemas.openxmlformats.org/drawingml/2006/main" xmlns:r="http://schemas.openxmlformats.org/officeDocument/2006/relationships" xmlns:p="http://schemas.openxmlformats.org/presentationml/2006/main">
+  <p:cSld>
+    <p:spTree>
+      <p:nvGrpSpPr>
+        <p:cNvPr id="1" name=""/>
+        <p:cNvGrpSpPr/>
+        <p:nvPr/>
+      </p:nvGrpSpPr>
+      <p:grpSpPr>
+        <a:xfrm>
+          <a:off x="0" y="0"/>
+          <a:ext cx="0" cy="0"/>
+          <a:chOff x="0" y="0"/>
+          <a:chExt cx="0" cy="0"/>
+        </a:xfrm>
+      </p:grpSpPr>
+      <p:pic>
+        <p:nvPicPr>
+          <p:cNvPr id="5122" name="Picture 2" descr="C:\Users\Bob Gorman\AppData\Local\Skitch\aldt02_111315_010202_PM.jpg"/>
+          <p:cNvPicPr>
+            <a:picLocks noChangeAspect="1" noChangeArrowheads="1"/>
+          </p:cNvPicPr>
+          <p:nvPr/>
+        </p:nvPicPr>
+        <p:blipFill>
+          <a:blip r:embed="rId2">
+            <a:extLst>
+              <a:ext uri="{28A0092B-C50C-407E-A947-70E740481C1C}">
+                <a14:useLocalDpi xmlns:a14="http://schemas.microsoft.com/office/drawing/2010/main" val="0"/>
+              </a:ext>
+            </a:extLst>
+          </a:blip>
+          <a:srcRect/>
+          <a:stretch>
+            <a:fillRect/>
+          </a:stretch>
+        </p:blipFill>
+        <p:spPr bwMode="auto">
+          <a:xfrm rot="5400000">
+            <a:off x="2514600" y="504552"/>
+            <a:ext cx="3282950" cy="5105553"/>
+          </a:xfrm>
+          <a:prstGeom prst="rect">
+            <a:avLst/>
+          </a:prstGeom>
+          <a:noFill/>
+          <a:extLst>
+            <a:ext uri="{909E8E84-426E-40DD-AFC4-6F175D3DCCD1}">
+              <a14:hiddenFill xmlns:a14="http://schemas.microsoft.com/office/drawing/2010/main">
+                <a:solidFill>
+                  <a:srgbClr val="FFFFFF"/>
+                </a:solidFill>
+              </a14:hiddenFill>
+            </a:ext>
+          </a:extLst>
+        </p:spPr>
+      </p:pic>
+    </p:spTree>
+    <p:extLst>
+      <p:ext uri="{BB962C8B-B14F-4D97-AF65-F5344CB8AC3E}">
+        <p14:creationId xmlns:p14="http://schemas.microsoft.com/office/powerpoint/2010/main" val="1191784876"/>
+      </p:ext>
+    </p:extLst>
+  </p:cSld>
+  <p:clrMapOvr>
+    <a:masterClrMapping/>
+  </p:clrMapOvr>
+</p:sld>
+</file>
+
+<file path=ppt/slides/slide14.xml><?xml version="1.0" encoding="utf-8"?>
+<p:sld xmlns:a="http://schemas.openxmlformats.org/drawingml/2006/main" xmlns:r="http://schemas.openxmlformats.org/officeDocument/2006/relationships" xmlns:p="http://schemas.openxmlformats.org/presentationml/2006/main">
+  <p:cSld>
+    <p:spTree>
+      <p:nvGrpSpPr>
+        <p:cNvPr id="1" name=""/>
+        <p:cNvGrpSpPr/>
+        <p:nvPr/>
+      </p:nvGrpSpPr>
+      <p:grpSpPr>
+        <a:xfrm>
+          <a:off x="0" y="0"/>
+          <a:ext cx="0" cy="0"/>
+          <a:chOff x="0" y="0"/>
+          <a:chExt cx="0" cy="0"/>
+        </a:xfrm>
+      </p:grpSpPr>
+      <p:pic>
+        <p:nvPicPr>
+          <p:cNvPr id="7170" name="Picture 2" descr="C:\Users\Bob Gorman\AppData\Local\Skitch\Screenshot_111315_011657_PM.jpg"/>
+          <p:cNvPicPr>
+            <a:picLocks noChangeAspect="1" noChangeArrowheads="1"/>
+          </p:cNvPicPr>
+          <p:nvPr/>
+        </p:nvPicPr>
+        <p:blipFill>
+          <a:blip r:embed="rId2">
+            <a:extLst>
+              <a:ext uri="{28A0092B-C50C-407E-A947-70E740481C1C}">
+                <a14:useLocalDpi xmlns:a14="http://schemas.microsoft.com/office/drawing/2010/main" val="0"/>
+              </a:ext>
+            </a:extLst>
+          </a:blip>
+          <a:srcRect/>
+          <a:stretch>
+            <a:fillRect/>
+          </a:stretch>
+        </p:blipFill>
+        <p:spPr bwMode="auto">
+          <a:xfrm>
+            <a:off x="762000" y="18107"/>
+            <a:ext cx="7086599" cy="5521907"/>
+          </a:xfrm>
+          <a:prstGeom prst="rect">
+            <a:avLst/>
+          </a:prstGeom>
+          <a:noFill/>
+          <a:extLst>
+            <a:ext uri="{909E8E84-426E-40DD-AFC4-6F175D3DCCD1}">
+              <a14:hiddenFill xmlns:a14="http://schemas.microsoft.com/office/drawing/2010/main">
+                <a:solidFill>
+                  <a:srgbClr val="FFFFFF"/>
+                </a:solidFill>
+              </a14:hiddenFill>
+            </a:ext>
+          </a:extLst>
+        </p:spPr>
+      </p:pic>
+      <p:sp>
+        <p:nvSpPr>
+          <p:cNvPr id="2" name="TextBox 1"/>
+          <p:cNvSpPr txBox="1"/>
+          <p:nvPr/>
+        </p:nvSpPr>
+        <p:spPr>
+          <a:xfrm>
+            <a:off x="2667000" y="2514600"/>
+            <a:ext cx="2133600" cy="369332"/>
+          </a:xfrm>
+          <a:prstGeom prst="rect">
+            <a:avLst/>
+          </a:prstGeom>
+          <a:noFill/>
+        </p:spPr>
+        <p:txBody>
+          <a:bodyPr wrap="square" rtlCol="0">
+            <a:spAutoFit/>
+          </a:bodyPr>
+          <a:lstStyle/>
+          <a:p>
+            <a:r>
+              <a:rPr lang="en-US" dirty="0" smtClean="0"/>
+              <a:t>Homeric Verse</a:t>
+            </a:r>
+            <a:endParaRPr lang="en-US" dirty="0"/>
+          </a:p>
+        </p:txBody>
+      </p:sp>
+      <p:sp>
+        <p:nvSpPr>
+          <p:cNvPr id="3" name="TextBox 2"/>
+          <p:cNvSpPr txBox="1"/>
+          <p:nvPr/>
+        </p:nvSpPr>
+        <p:spPr>
+          <a:xfrm>
+            <a:off x="5791200" y="5105400"/>
+            <a:ext cx="1444626" cy="646331"/>
+          </a:xfrm>
+          <a:prstGeom prst="rect">
+            <a:avLst/>
+          </a:prstGeom>
+          <a:noFill/>
+        </p:spPr>
+        <p:txBody>
+          <a:bodyPr wrap="none" rtlCol="0">
+            <a:spAutoFit/>
+          </a:bodyPr>
+          <a:lstStyle/>
+          <a:p>
+            <a:r>
+              <a:rPr lang="en-US" dirty="0" smtClean="0"/>
+              <a:t>Non-Homeric</a:t>
+            </a:r>
+          </a:p>
+          <a:p>
+            <a:pPr algn="ctr"/>
+            <a:r>
+              <a:rPr lang="en-US" dirty="0" smtClean="0"/>
+              <a:t>Verse</a:t>
+            </a:r>
+            <a:endParaRPr lang="en-US" dirty="0"/>
+          </a:p>
+        </p:txBody>
+      </p:sp>
+    </p:spTree>
+    <p:extLst>
+      <p:ext uri="{BB962C8B-B14F-4D97-AF65-F5344CB8AC3E}">
+        <p14:creationId xmlns:p14="http://schemas.microsoft.com/office/powerpoint/2010/main" val="1191784876"/>
+      </p:ext>
+    </p:extLst>
+  </p:cSld>
+  <p:clrMapOvr>
+    <a:masterClrMapping/>
+  </p:clrMapOvr>
+</p:sld>
+</file>
+
+<file path=ppt/slides/slide15.xml><?xml version="1.0" encoding="utf-8"?>
+<p:sld xmlns:a="http://schemas.openxmlformats.org/drawingml/2006/main" xmlns:r="http://schemas.openxmlformats.org/officeDocument/2006/relationships" xmlns:p="http://schemas.openxmlformats.org/presentationml/2006/main">
+  <p:cSld>
+    <p:spTree>
+      <p:nvGrpSpPr>
+        <p:cNvPr id="1" name=""/>
+        <p:cNvGrpSpPr/>
+        <p:nvPr/>
+      </p:nvGrpSpPr>
+      <p:grpSpPr>
+        <a:xfrm>
+          <a:off x="0" y="0"/>
+          <a:ext cx="0" cy="0"/>
+          <a:chOff x="0" y="0"/>
+          <a:chExt cx="0" cy="0"/>
+        </a:xfrm>
+      </p:grpSpPr>
+      <p:pic>
+        <p:nvPicPr>
+          <p:cNvPr id="8194" name="Picture 2" descr="C:\Users\Bob Gorman\AppData\Local\Skitch\Screenshot_111315_011820_PM.jpg"/>
+          <p:cNvPicPr>
+            <a:picLocks noChangeAspect="1" noChangeArrowheads="1"/>
+          </p:cNvPicPr>
+          <p:nvPr/>
+        </p:nvPicPr>
+        <p:blipFill>
+          <a:blip r:embed="rId2">
+            <a:extLst>
+              <a:ext uri="{28A0092B-C50C-407E-A947-70E740481C1C}">
+                <a14:useLocalDpi xmlns:a14="http://schemas.microsoft.com/office/drawing/2010/main" val="0"/>
+              </a:ext>
+            </a:extLst>
+          </a:blip>
+          <a:srcRect/>
+          <a:stretch>
+            <a:fillRect/>
+          </a:stretch>
+        </p:blipFill>
+        <p:spPr bwMode="auto">
+          <a:xfrm rot="5400000">
+            <a:off x="2654111" y="393889"/>
+            <a:ext cx="4152604" cy="5041226"/>
+          </a:xfrm>
+          <a:prstGeom prst="rect">
+            <a:avLst/>
+          </a:prstGeom>
+          <a:noFill/>
+          <a:extLst>
+            <a:ext uri="{909E8E84-426E-40DD-AFC4-6F175D3DCCD1}">
+              <a14:hiddenFill xmlns:a14="http://schemas.microsoft.com/office/drawing/2010/main">
+                <a:solidFill>
+                  <a:srgbClr val="FFFFFF"/>
+                </a:solidFill>
+              </a14:hiddenFill>
+            </a:ext>
+          </a:extLst>
+        </p:spPr>
+      </p:pic>
+    </p:spTree>
+    <p:extLst>
+      <p:ext uri="{BB962C8B-B14F-4D97-AF65-F5344CB8AC3E}">
+        <p14:creationId xmlns:p14="http://schemas.microsoft.com/office/powerpoint/2010/main" val="1191784876"/>
+      </p:ext>
+    </p:extLst>
+  </p:cSld>
+  <p:clrMapOvr>
+    <a:masterClrMapping/>
+  </p:clrMapOvr>
+</p:sld>
+</file>
+
+<file path=ppt/slides/slide16.xml><?xml version="1.0" encoding="utf-8"?>
+<p:sld xmlns:a="http://schemas.openxmlformats.org/drawingml/2006/main" xmlns:r="http://schemas.openxmlformats.org/officeDocument/2006/relationships" xmlns:p="http://schemas.openxmlformats.org/presentationml/2006/main">
+  <p:cSld>
+    <p:spTree>
+      <p:nvGrpSpPr>
+        <p:cNvPr id="1" name=""/>
+        <p:cNvGrpSpPr/>
+        <p:nvPr/>
+      </p:nvGrpSpPr>
+      <p:grpSpPr>
+        <a:xfrm>
+          <a:off x="0" y="0"/>
+          <a:ext cx="0" cy="0"/>
+          <a:chOff x="0" y="0"/>
+          <a:chExt cx="0" cy="0"/>
+        </a:xfrm>
+      </p:grpSpPr>
+      <p:pic>
+        <p:nvPicPr>
+          <p:cNvPr id="9218" name="Picture 2" descr="C:\Users\Bob Gorman\AppData\Local\Skitch\Screenshot_111315_011953_PM.jpg"/>
+          <p:cNvPicPr>
+            <a:picLocks noChangeAspect="1" noChangeArrowheads="1"/>
+          </p:cNvPicPr>
+          <p:nvPr/>
+        </p:nvPicPr>
+        <p:blipFill>
+          <a:blip r:embed="rId2">
+            <a:extLst>
+              <a:ext uri="{28A0092B-C50C-407E-A947-70E740481C1C}">
+                <a14:useLocalDpi xmlns:a14="http://schemas.microsoft.com/office/drawing/2010/main" val="0"/>
+              </a:ext>
+            </a:extLst>
+          </a:blip>
+          <a:srcRect/>
+          <a:stretch>
+            <a:fillRect/>
+          </a:stretch>
+        </p:blipFill>
+        <p:spPr bwMode="auto">
+          <a:xfrm rot="5400000">
+            <a:off x="2430249" y="161180"/>
+            <a:ext cx="4190998" cy="5087838"/>
+          </a:xfrm>
+          <a:prstGeom prst="rect">
+            <a:avLst/>
+          </a:prstGeom>
+          <a:noFill/>
+          <a:extLst>
+            <a:ext uri="{909E8E84-426E-40DD-AFC4-6F175D3DCCD1}">
+              <a14:hiddenFill xmlns:a14="http://schemas.microsoft.com/office/drawing/2010/main">
+                <a:solidFill>
+                  <a:srgbClr val="FFFFFF"/>
+                </a:solidFill>
+              </a14:hiddenFill>
+            </a:ext>
+          </a:extLst>
+        </p:spPr>
+      </p:pic>
+    </p:spTree>
+    <p:extLst>
+      <p:ext uri="{BB962C8B-B14F-4D97-AF65-F5344CB8AC3E}">
+        <p14:creationId xmlns:p14="http://schemas.microsoft.com/office/powerpoint/2010/main" val="428004107"/>
+      </p:ext>
+    </p:extLst>
+  </p:cSld>
+  <p:clrMapOvr>
+    <a:masterClrMapping/>
+  </p:clrMapOvr>
+</p:sld>
+</file>
+
+<file path=ppt/slides/slide17.xml><?xml version="1.0" encoding="utf-8"?>
+<p:sld xmlns:a="http://schemas.openxmlformats.org/drawingml/2006/main" xmlns:r="http://schemas.openxmlformats.org/officeDocument/2006/relationships" xmlns:p="http://schemas.openxmlformats.org/presentationml/2006/main">
+  <p:cSld>
+    <p:spTree>
+      <p:nvGrpSpPr>
+        <p:cNvPr id="1" name=""/>
+        <p:cNvGrpSpPr/>
+        <p:nvPr/>
+      </p:nvGrpSpPr>
+      <p:grpSpPr>
+        <a:xfrm>
+          <a:off x="0" y="0"/>
+          <a:ext cx="0" cy="0"/>
+          <a:chOff x="0" y="0"/>
+          <a:chExt cx="0" cy="0"/>
+        </a:xfrm>
+      </p:grpSpPr>
+      <p:pic>
+        <p:nvPicPr>
+          <p:cNvPr id="10242" name="Picture 2" descr="C:\Users\Bob Gorman\AppData\Local\Skitch\Screenshot_111315_012217_PM.jpg"/>
+          <p:cNvPicPr>
+            <a:picLocks noChangeAspect="1" noChangeArrowheads="1"/>
+          </p:cNvPicPr>
+          <p:nvPr/>
+        </p:nvPicPr>
+        <p:blipFill>
+          <a:blip r:embed="rId2">
+            <a:extLst>
+              <a:ext uri="{28A0092B-C50C-407E-A947-70E740481C1C}">
+                <a14:useLocalDpi xmlns:a14="http://schemas.microsoft.com/office/drawing/2010/main" val="0"/>
+              </a:ext>
+            </a:extLst>
+          </a:blip>
+          <a:srcRect/>
+          <a:stretch>
+            <a:fillRect/>
+          </a:stretch>
+        </p:blipFill>
+        <p:spPr bwMode="auto">
+          <a:xfrm rot="5400000">
+            <a:off x="2107465" y="178535"/>
+            <a:ext cx="4880273" cy="5742403"/>
+          </a:xfrm>
+          <a:prstGeom prst="rect">
+            <a:avLst/>
+          </a:prstGeom>
+          <a:noFill/>
+          <a:extLst>
+            <a:ext uri="{909E8E84-426E-40DD-AFC4-6F175D3DCCD1}">
+              <a14:hiddenFill xmlns:a14="http://schemas.microsoft.com/office/drawing/2010/main">
+                <a:solidFill>
+                  <a:srgbClr val="FFFFFF"/>
+                </a:solidFill>
+              </a14:hiddenFill>
+            </a:ext>
+          </a:extLst>
+        </p:spPr>
+      </p:pic>
+    </p:spTree>
+    <p:extLst>
+      <p:ext uri="{BB962C8B-B14F-4D97-AF65-F5344CB8AC3E}">
+        <p14:creationId xmlns:p14="http://schemas.microsoft.com/office/powerpoint/2010/main" val="428004107"/>
+      </p:ext>
+    </p:extLst>
+  </p:cSld>
+  <p:clrMapOvr>
+    <a:masterClrMapping/>
+  </p:clrMapOvr>
+</p:sld>
+</file>
+
+<file path=ppt/slides/slide18.xml><?xml version="1.0" encoding="utf-8"?>
+<p:sld xmlns:a="http://schemas.openxmlformats.org/drawingml/2006/main" xmlns:r="http://schemas.openxmlformats.org/officeDocument/2006/relationships" xmlns:p="http://schemas.openxmlformats.org/presentationml/2006/main">
+  <p:cSld>
+    <p:spTree>
+      <p:nvGrpSpPr>
+        <p:cNvPr id="1" name=""/>
+        <p:cNvGrpSpPr/>
+        <p:nvPr/>
+      </p:nvGrpSpPr>
+      <p:grpSpPr>
+        <a:xfrm>
+          <a:off x="0" y="0"/>
+          <a:ext cx="0" cy="0"/>
+          <a:chOff x="0" y="0"/>
+          <a:chExt cx="0" cy="0"/>
+        </a:xfrm>
+      </p:grpSpPr>
+      <p:pic>
+        <p:nvPicPr>
+          <p:cNvPr id="11266" name="Picture 2" descr="C:\Users\Bob Gorman\AppData\Local\Skitch\Screenshot_111315_012258_PM.jpg"/>
+          <p:cNvPicPr>
+            <a:picLocks noChangeAspect="1" noChangeArrowheads="1"/>
+          </p:cNvPicPr>
+          <p:nvPr/>
+        </p:nvPicPr>
+        <p:blipFill>
+          <a:blip r:embed="rId2">
+            <a:extLst>
+              <a:ext uri="{28A0092B-C50C-407E-A947-70E740481C1C}">
+                <a14:useLocalDpi xmlns:a14="http://schemas.microsoft.com/office/drawing/2010/main" val="0"/>
+              </a:ext>
+            </a:extLst>
+          </a:blip>
+          <a:srcRect/>
+          <a:stretch>
+            <a:fillRect/>
+          </a:stretch>
+        </p:blipFill>
+        <p:spPr bwMode="auto">
+          <a:xfrm rot="5400000">
+            <a:off x="2479713" y="34887"/>
+            <a:ext cx="4781192" cy="5625819"/>
+          </a:xfrm>
+          <a:prstGeom prst="rect">
+            <a:avLst/>
+          </a:prstGeom>
+          <a:noFill/>
+          <a:extLst>
+            <a:ext uri="{909E8E84-426E-40DD-AFC4-6F175D3DCCD1}">
+              <a14:hiddenFill xmlns:a14="http://schemas.microsoft.com/office/drawing/2010/main">
+                <a:solidFill>
+                  <a:srgbClr val="FFFFFF"/>
+                </a:solidFill>
+              </a14:hiddenFill>
+            </a:ext>
+          </a:extLst>
+        </p:spPr>
+      </p:pic>
+    </p:spTree>
+    <p:extLst>
+      <p:ext uri="{BB962C8B-B14F-4D97-AF65-F5344CB8AC3E}">
+        <p14:creationId xmlns:p14="http://schemas.microsoft.com/office/powerpoint/2010/main" val="428004107"/>
+      </p:ext>
+    </p:extLst>
+  </p:cSld>
+  <p:clrMapOvr>
+    <a:masterClrMapping/>
+  </p:clrMapOvr>
+</p:sld>
+</file>
+
+<file path=ppt/slides/slide19.xml><?xml version="1.0" encoding="utf-8"?>
 <p:sld xmlns:a="http://schemas.openxmlformats.org/drawingml/2006/main" xmlns:r="http://schemas.openxmlformats.org/officeDocument/2006/relationships" xmlns:p="http://schemas.openxmlformats.org/presentationml/2006/main">
   <p:cSld>
     <p:spTree>
@@ -3234,7 +3914,37 @@
 </p:sld>
 </file>
 
-<file path=ppt/slides/slide11.xml><?xml version="1.0" encoding="utf-8"?>
+<file path=ppt/slides/slide2.xml><?xml version="1.0" encoding="utf-8"?>
+<p:sld xmlns:a="http://schemas.openxmlformats.org/drawingml/2006/main" xmlns:r="http://schemas.openxmlformats.org/officeDocument/2006/relationships" xmlns:p="http://schemas.openxmlformats.org/presentationml/2006/main">
+  <p:cSld>
+    <p:spTree>
+      <p:nvGrpSpPr>
+        <p:cNvPr id="1" name=""/>
+        <p:cNvGrpSpPr/>
+        <p:nvPr/>
+      </p:nvGrpSpPr>
+      <p:grpSpPr>
+        <a:xfrm>
+          <a:off x="0" y="0"/>
+          <a:ext cx="0" cy="0"/>
+          <a:chOff x="0" y="0"/>
+          <a:chExt cx="0" cy="0"/>
+        </a:xfrm>
+      </p:grpSpPr>
+    </p:spTree>
+    <p:extLst>
+      <p:ext uri="{BB962C8B-B14F-4D97-AF65-F5344CB8AC3E}">
+        <p14:creationId xmlns:p14="http://schemas.microsoft.com/office/powerpoint/2010/main" val="3976027406"/>
+      </p:ext>
+    </p:extLst>
+  </p:cSld>
+  <p:clrMapOvr>
+    <a:masterClrMapping/>
+  </p:clrMapOvr>
+</p:sld>
+</file>
+
+<file path=ppt/slides/slide20.xml><?xml version="1.0" encoding="utf-8"?>
 <p:sld xmlns:a="http://schemas.openxmlformats.org/drawingml/2006/main" xmlns:r="http://schemas.openxmlformats.org/officeDocument/2006/relationships" xmlns:p="http://schemas.openxmlformats.org/presentationml/2006/main">
   <p:cSld>
     <p:spTree>
@@ -3305,7 +4015,720 @@
 </p:sld>
 </file>
 
-<file path=ppt/slides/slide12.xml><?xml version="1.0" encoding="utf-8"?>
+<file path=ppt/slides/slide21.xml><?xml version="1.0" encoding="utf-8"?>
+<p:sld xmlns:a="http://schemas.openxmlformats.org/drawingml/2006/main" xmlns:r="http://schemas.openxmlformats.org/officeDocument/2006/relationships" xmlns:p="http://schemas.openxmlformats.org/presentationml/2006/main">
+  <p:cSld>
+    <p:spTree>
+      <p:nvGrpSpPr>
+        <p:cNvPr id="1" name=""/>
+        <p:cNvGrpSpPr/>
+        <p:nvPr/>
+      </p:nvGrpSpPr>
+      <p:grpSpPr>
+        <a:xfrm>
+          <a:off x="0" y="0"/>
+          <a:ext cx="0" cy="0"/>
+          <a:chOff x="0" y="0"/>
+          <a:chExt cx="0" cy="0"/>
+        </a:xfrm>
+      </p:grpSpPr>
+      <p:pic>
+        <p:nvPicPr>
+          <p:cNvPr id="1026" name="Picture 2" descr="C:\Users\Bob Gorman\AppData\Local\Skitch\Screenshot_111315_050810_PM.jpg"/>
+          <p:cNvPicPr>
+            <a:picLocks noChangeAspect="1" noChangeArrowheads="1"/>
+          </p:cNvPicPr>
+          <p:nvPr/>
+        </p:nvPicPr>
+        <p:blipFill>
+          <a:blip r:embed="rId2">
+            <a:extLst>
+              <a:ext uri="{28A0092B-C50C-407E-A947-70E740481C1C}">
+                <a14:useLocalDpi xmlns:a14="http://schemas.microsoft.com/office/drawing/2010/main" val="0"/>
+              </a:ext>
+            </a:extLst>
+          </a:blip>
+          <a:srcRect/>
+          <a:stretch>
+            <a:fillRect/>
+          </a:stretch>
+        </p:blipFill>
+        <p:spPr bwMode="auto">
+          <a:xfrm>
+            <a:off x="914400" y="381000"/>
+            <a:ext cx="7131050" cy="2857500"/>
+          </a:xfrm>
+          <a:prstGeom prst="rect">
+            <a:avLst/>
+          </a:prstGeom>
+          <a:noFill/>
+          <a:extLst>
+            <a:ext uri="{909E8E84-426E-40DD-AFC4-6F175D3DCCD1}">
+              <a14:hiddenFill xmlns:a14="http://schemas.microsoft.com/office/drawing/2010/main">
+                <a:solidFill>
+                  <a:srgbClr val="FFFFFF"/>
+                </a:solidFill>
+              </a14:hiddenFill>
+            </a:ext>
+          </a:extLst>
+        </p:spPr>
+      </p:pic>
+      <p:pic>
+        <p:nvPicPr>
+          <p:cNvPr id="1027" name="Picture 3" descr="C:\Users\Bob Gorman\AppData\Local\Skitch\Screenshot_111315_051133_PM.jpg"/>
+          <p:cNvPicPr>
+            <a:picLocks noChangeAspect="1" noChangeArrowheads="1"/>
+          </p:cNvPicPr>
+          <p:nvPr/>
+        </p:nvPicPr>
+        <p:blipFill>
+          <a:blip r:embed="rId3">
+            <a:extLst>
+              <a:ext uri="{28A0092B-C50C-407E-A947-70E740481C1C}">
+                <a14:useLocalDpi xmlns:a14="http://schemas.microsoft.com/office/drawing/2010/main" val="0"/>
+              </a:ext>
+            </a:extLst>
+          </a:blip>
+          <a:srcRect/>
+          <a:stretch>
+            <a:fillRect/>
+          </a:stretch>
+        </p:blipFill>
+        <p:spPr bwMode="auto">
+          <a:xfrm>
+            <a:off x="1904999" y="3581400"/>
+            <a:ext cx="1842977" cy="2743200"/>
+          </a:xfrm>
+          <a:prstGeom prst="rect">
+            <a:avLst/>
+          </a:prstGeom>
+          <a:noFill/>
+          <a:extLst>
+            <a:ext uri="{909E8E84-426E-40DD-AFC4-6F175D3DCCD1}">
+              <a14:hiddenFill xmlns:a14="http://schemas.microsoft.com/office/drawing/2010/main">
+                <a:solidFill>
+                  <a:srgbClr val="FFFFFF"/>
+                </a:solidFill>
+              </a14:hiddenFill>
+            </a:ext>
+          </a:extLst>
+        </p:spPr>
+      </p:pic>
+      <p:pic>
+        <p:nvPicPr>
+          <p:cNvPr id="1028" name="Picture 4" descr="C:\Users\Bob Gorman\AppData\Local\Skitch\Screenshot_111315_051223_PM.jpg"/>
+          <p:cNvPicPr>
+            <a:picLocks noChangeAspect="1" noChangeArrowheads="1"/>
+          </p:cNvPicPr>
+          <p:nvPr/>
+        </p:nvPicPr>
+        <p:blipFill>
+          <a:blip r:embed="rId4">
+            <a:extLst>
+              <a:ext uri="{28A0092B-C50C-407E-A947-70E740481C1C}">
+                <a14:useLocalDpi xmlns:a14="http://schemas.microsoft.com/office/drawing/2010/main" val="0"/>
+              </a:ext>
+            </a:extLst>
+          </a:blip>
+          <a:srcRect/>
+          <a:stretch>
+            <a:fillRect/>
+          </a:stretch>
+        </p:blipFill>
+        <p:spPr bwMode="auto">
+          <a:xfrm>
+            <a:off x="4191000" y="3575364"/>
+            <a:ext cx="1812925" cy="2684672"/>
+          </a:xfrm>
+          <a:prstGeom prst="rect">
+            <a:avLst/>
+          </a:prstGeom>
+          <a:noFill/>
+          <a:extLst>
+            <a:ext uri="{909E8E84-426E-40DD-AFC4-6F175D3DCCD1}">
+              <a14:hiddenFill xmlns:a14="http://schemas.microsoft.com/office/drawing/2010/main">
+                <a:solidFill>
+                  <a:srgbClr val="FFFFFF"/>
+                </a:solidFill>
+              </a14:hiddenFill>
+            </a:ext>
+          </a:extLst>
+        </p:spPr>
+      </p:pic>
+    </p:spTree>
+    <p:extLst>
+      <p:ext uri="{BB962C8B-B14F-4D97-AF65-F5344CB8AC3E}">
+        <p14:creationId xmlns:p14="http://schemas.microsoft.com/office/powerpoint/2010/main" val="386409985"/>
+      </p:ext>
+    </p:extLst>
+  </p:cSld>
+  <p:clrMapOvr>
+    <a:masterClrMapping/>
+  </p:clrMapOvr>
+</p:sld>
+</file>
+
+<file path=ppt/slides/slide22.xml><?xml version="1.0" encoding="utf-8"?>
+<p:sld xmlns:a="http://schemas.openxmlformats.org/drawingml/2006/main" xmlns:r="http://schemas.openxmlformats.org/officeDocument/2006/relationships" xmlns:p="http://schemas.openxmlformats.org/presentationml/2006/main">
+  <p:cSld>
+    <p:spTree>
+      <p:nvGrpSpPr>
+        <p:cNvPr id="1" name=""/>
+        <p:cNvGrpSpPr/>
+        <p:nvPr/>
+      </p:nvGrpSpPr>
+      <p:grpSpPr>
+        <a:xfrm>
+          <a:off x="0" y="0"/>
+          <a:ext cx="0" cy="0"/>
+          <a:chOff x="0" y="0"/>
+          <a:chExt cx="0" cy="0"/>
+        </a:xfrm>
+      </p:grpSpPr>
+      <p:pic>
+        <p:nvPicPr>
+          <p:cNvPr id="9218" name="Picture 2" descr="C:\Users\Bob Gorman\AppData\Local\Skitch\Screenshot_111315_072100_PM.jpg"/>
+          <p:cNvPicPr>
+            <a:picLocks noChangeAspect="1" noChangeArrowheads="1"/>
+          </p:cNvPicPr>
+          <p:nvPr/>
+        </p:nvPicPr>
+        <p:blipFill>
+          <a:blip r:embed="rId2">
+            <a:extLst>
+              <a:ext uri="{28A0092B-C50C-407E-A947-70E740481C1C}">
+                <a14:useLocalDpi xmlns:a14="http://schemas.microsoft.com/office/drawing/2010/main" val="0"/>
+              </a:ext>
+            </a:extLst>
+          </a:blip>
+          <a:srcRect/>
+          <a:stretch>
+            <a:fillRect/>
+          </a:stretch>
+        </p:blipFill>
+        <p:spPr bwMode="auto">
+          <a:xfrm>
+            <a:off x="1379899" y="914400"/>
+            <a:ext cx="6400800" cy="4715483"/>
+          </a:xfrm>
+          <a:prstGeom prst="rect">
+            <a:avLst/>
+          </a:prstGeom>
+          <a:noFill/>
+          <a:extLst>
+            <a:ext uri="{909E8E84-426E-40DD-AFC4-6F175D3DCCD1}">
+              <a14:hiddenFill xmlns:a14="http://schemas.microsoft.com/office/drawing/2010/main">
+                <a:solidFill>
+                  <a:srgbClr val="FFFFFF"/>
+                </a:solidFill>
+              </a14:hiddenFill>
+            </a:ext>
+          </a:extLst>
+        </p:spPr>
+      </p:pic>
+      <p:pic>
+        <p:nvPicPr>
+          <p:cNvPr id="9219" name="Picture 3" descr="C:\Users\Bob Gorman\AppData\Local\Skitch\Screenshot_111315_072340_PM.jpg"/>
+          <p:cNvPicPr>
+            <a:picLocks noChangeAspect="1" noChangeArrowheads="1"/>
+          </p:cNvPicPr>
+          <p:nvPr/>
+        </p:nvPicPr>
+        <p:blipFill>
+          <a:blip r:embed="rId3">
+            <a:extLst>
+              <a:ext uri="{28A0092B-C50C-407E-A947-70E740481C1C}">
+                <a14:useLocalDpi xmlns:a14="http://schemas.microsoft.com/office/drawing/2010/main" val="0"/>
+              </a:ext>
+            </a:extLst>
+          </a:blip>
+          <a:srcRect/>
+          <a:stretch>
+            <a:fillRect/>
+          </a:stretch>
+        </p:blipFill>
+        <p:spPr bwMode="auto">
+          <a:xfrm>
+            <a:off x="500424" y="304800"/>
+            <a:ext cx="8159750" cy="876300"/>
+          </a:xfrm>
+          <a:prstGeom prst="rect">
+            <a:avLst/>
+          </a:prstGeom>
+          <a:noFill/>
+          <a:extLst>
+            <a:ext uri="{909E8E84-426E-40DD-AFC4-6F175D3DCCD1}">
+              <a14:hiddenFill xmlns:a14="http://schemas.microsoft.com/office/drawing/2010/main">
+                <a:solidFill>
+                  <a:srgbClr val="FFFFFF"/>
+                </a:solidFill>
+              </a14:hiddenFill>
+            </a:ext>
+          </a:extLst>
+        </p:spPr>
+      </p:pic>
+      <p:pic>
+        <p:nvPicPr>
+          <p:cNvPr id="9220" name="Picture 4" descr="C:\Users\Bob Gorman\AppData\Local\Skitch\Screenshot_111315_072442_PM.jpg"/>
+          <p:cNvPicPr>
+            <a:picLocks noChangeAspect="1" noChangeArrowheads="1"/>
+          </p:cNvPicPr>
+          <p:nvPr/>
+        </p:nvPicPr>
+        <p:blipFill>
+          <a:blip r:embed="rId4">
+            <a:extLst>
+              <a:ext uri="{28A0092B-C50C-407E-A947-70E740481C1C}">
+                <a14:useLocalDpi xmlns:a14="http://schemas.microsoft.com/office/drawing/2010/main" val="0"/>
+              </a:ext>
+            </a:extLst>
+          </a:blip>
+          <a:srcRect/>
+          <a:stretch>
+            <a:fillRect/>
+          </a:stretch>
+        </p:blipFill>
+        <p:spPr bwMode="auto">
+          <a:xfrm>
+            <a:off x="500424" y="5410200"/>
+            <a:ext cx="8603024" cy="1191839"/>
+          </a:xfrm>
+          <a:prstGeom prst="rect">
+            <a:avLst/>
+          </a:prstGeom>
+          <a:noFill/>
+          <a:extLst>
+            <a:ext uri="{909E8E84-426E-40DD-AFC4-6F175D3DCCD1}">
+              <a14:hiddenFill xmlns:a14="http://schemas.microsoft.com/office/drawing/2010/main">
+                <a:solidFill>
+                  <a:srgbClr val="FFFFFF"/>
+                </a:solidFill>
+              </a14:hiddenFill>
+            </a:ext>
+          </a:extLst>
+        </p:spPr>
+      </p:pic>
+    </p:spTree>
+    <p:extLst>
+      <p:ext uri="{BB962C8B-B14F-4D97-AF65-F5344CB8AC3E}">
+        <p14:creationId xmlns:p14="http://schemas.microsoft.com/office/powerpoint/2010/main" val="3212822876"/>
+      </p:ext>
+    </p:extLst>
+  </p:cSld>
+  <p:clrMapOvr>
+    <a:masterClrMapping/>
+  </p:clrMapOvr>
+</p:sld>
+</file>
+
+<file path=ppt/slides/slide23.xml><?xml version="1.0" encoding="utf-8"?>
+<p:sld xmlns:a="http://schemas.openxmlformats.org/drawingml/2006/main" xmlns:r="http://schemas.openxmlformats.org/officeDocument/2006/relationships" xmlns:p="http://schemas.openxmlformats.org/presentationml/2006/main">
+  <p:cSld>
+    <p:spTree>
+      <p:nvGrpSpPr>
+        <p:cNvPr id="1" name=""/>
+        <p:cNvGrpSpPr/>
+        <p:nvPr/>
+      </p:nvGrpSpPr>
+      <p:grpSpPr>
+        <a:xfrm>
+          <a:off x="0" y="0"/>
+          <a:ext cx="0" cy="0"/>
+          <a:chOff x="0" y="0"/>
+          <a:chExt cx="0" cy="0"/>
+        </a:xfrm>
+      </p:grpSpPr>
+      <p:pic>
+        <p:nvPicPr>
+          <p:cNvPr id="5123" name="Picture 3" descr="C:\Users\Bob Gorman\AppData\Local\Skitch\Screenshot_111315_061804_PM.jpg"/>
+          <p:cNvPicPr>
+            <a:picLocks noChangeAspect="1" noChangeArrowheads="1"/>
+          </p:cNvPicPr>
+          <p:nvPr/>
+        </p:nvPicPr>
+        <p:blipFill>
+          <a:blip r:embed="rId2">
+            <a:extLst>
+              <a:ext uri="{28A0092B-C50C-407E-A947-70E740481C1C}">
+                <a14:useLocalDpi xmlns:a14="http://schemas.microsoft.com/office/drawing/2010/main" val="0"/>
+              </a:ext>
+            </a:extLst>
+          </a:blip>
+          <a:srcRect/>
+          <a:stretch>
+            <a:fillRect/>
+          </a:stretch>
+        </p:blipFill>
+        <p:spPr bwMode="auto">
+          <a:xfrm>
+            <a:off x="609600" y="304800"/>
+            <a:ext cx="7696200" cy="4946490"/>
+          </a:xfrm>
+          <a:prstGeom prst="rect">
+            <a:avLst/>
+          </a:prstGeom>
+          <a:noFill/>
+          <a:extLst>
+            <a:ext uri="{909E8E84-426E-40DD-AFC4-6F175D3DCCD1}">
+              <a14:hiddenFill xmlns:a14="http://schemas.microsoft.com/office/drawing/2010/main">
+                <a:solidFill>
+                  <a:srgbClr val="FFFFFF"/>
+                </a:solidFill>
+              </a14:hiddenFill>
+            </a:ext>
+          </a:extLst>
+        </p:spPr>
+      </p:pic>
+      <p:pic>
+        <p:nvPicPr>
+          <p:cNvPr id="4" name="Picture 3" descr="C:\Users\Bob Gorman\AppData\Local\Skitch\Screenshot_111315_060830_PM.jpg"/>
+          <p:cNvPicPr>
+            <a:picLocks noChangeAspect="1" noChangeArrowheads="1"/>
+          </p:cNvPicPr>
+          <p:nvPr/>
+        </p:nvPicPr>
+        <p:blipFill>
+          <a:blip r:embed="rId3">
+            <a:extLst>
+              <a:ext uri="{28A0092B-C50C-407E-A947-70E740481C1C}">
+                <a14:useLocalDpi xmlns:a14="http://schemas.microsoft.com/office/drawing/2010/main" val="0"/>
+              </a:ext>
+            </a:extLst>
+          </a:blip>
+          <a:srcRect/>
+          <a:stretch>
+            <a:fillRect/>
+          </a:stretch>
+        </p:blipFill>
+        <p:spPr bwMode="auto">
+          <a:xfrm>
+            <a:off x="457200" y="5537819"/>
+            <a:ext cx="8382000" cy="896565"/>
+          </a:xfrm>
+          <a:prstGeom prst="rect">
+            <a:avLst/>
+          </a:prstGeom>
+          <a:noFill/>
+          <a:extLst>
+            <a:ext uri="{909E8E84-426E-40DD-AFC4-6F175D3DCCD1}">
+              <a14:hiddenFill xmlns:a14="http://schemas.microsoft.com/office/drawing/2010/main">
+                <a:solidFill>
+                  <a:srgbClr val="FFFFFF"/>
+                </a:solidFill>
+              </a14:hiddenFill>
+            </a:ext>
+          </a:extLst>
+        </p:spPr>
+      </p:pic>
+    </p:spTree>
+    <p:extLst>
+      <p:ext uri="{BB962C8B-B14F-4D97-AF65-F5344CB8AC3E}">
+        <p14:creationId xmlns:p14="http://schemas.microsoft.com/office/powerpoint/2010/main" val="3814601224"/>
+      </p:ext>
+    </p:extLst>
+  </p:cSld>
+  <p:clrMapOvr>
+    <a:masterClrMapping/>
+  </p:clrMapOvr>
+</p:sld>
+</file>
+
+<file path=ppt/slides/slide24.xml><?xml version="1.0" encoding="utf-8"?>
+<p:sld xmlns:a="http://schemas.openxmlformats.org/drawingml/2006/main" xmlns:r="http://schemas.openxmlformats.org/officeDocument/2006/relationships" xmlns:p="http://schemas.openxmlformats.org/presentationml/2006/main">
+  <p:cSld>
+    <p:spTree>
+      <p:nvGrpSpPr>
+        <p:cNvPr id="1" name=""/>
+        <p:cNvGrpSpPr/>
+        <p:nvPr/>
+      </p:nvGrpSpPr>
+      <p:grpSpPr>
+        <a:xfrm>
+          <a:off x="0" y="0"/>
+          <a:ext cx="0" cy="0"/>
+          <a:chOff x="0" y="0"/>
+          <a:chExt cx="0" cy="0"/>
+        </a:xfrm>
+      </p:grpSpPr>
+      <p:pic>
+        <p:nvPicPr>
+          <p:cNvPr id="9218" name="Picture 2" descr="C:\Users\Bob Gorman\AppData\Local\Skitch\Screenshot_111315_072100_PM.jpg"/>
+          <p:cNvPicPr>
+            <a:picLocks noChangeAspect="1" noChangeArrowheads="1"/>
+          </p:cNvPicPr>
+          <p:nvPr/>
+        </p:nvPicPr>
+        <p:blipFill>
+          <a:blip r:embed="rId2">
+            <a:extLst>
+              <a:ext uri="{28A0092B-C50C-407E-A947-70E740481C1C}">
+                <a14:useLocalDpi xmlns:a14="http://schemas.microsoft.com/office/drawing/2010/main" val="0"/>
+              </a:ext>
+            </a:extLst>
+          </a:blip>
+          <a:srcRect/>
+          <a:stretch>
+            <a:fillRect/>
+          </a:stretch>
+        </p:blipFill>
+        <p:spPr bwMode="auto">
+          <a:xfrm>
+            <a:off x="1379899" y="914400"/>
+            <a:ext cx="6400800" cy="4715483"/>
+          </a:xfrm>
+          <a:prstGeom prst="rect">
+            <a:avLst/>
+          </a:prstGeom>
+          <a:noFill/>
+          <a:extLst>
+            <a:ext uri="{909E8E84-426E-40DD-AFC4-6F175D3DCCD1}">
+              <a14:hiddenFill xmlns:a14="http://schemas.microsoft.com/office/drawing/2010/main">
+                <a:solidFill>
+                  <a:srgbClr val="FFFFFF"/>
+                </a:solidFill>
+              </a14:hiddenFill>
+            </a:ext>
+          </a:extLst>
+        </p:spPr>
+      </p:pic>
+      <p:pic>
+        <p:nvPicPr>
+          <p:cNvPr id="9219" name="Picture 3" descr="C:\Users\Bob Gorman\AppData\Local\Skitch\Screenshot_111315_072340_PM.jpg"/>
+          <p:cNvPicPr>
+            <a:picLocks noChangeAspect="1" noChangeArrowheads="1"/>
+          </p:cNvPicPr>
+          <p:nvPr/>
+        </p:nvPicPr>
+        <p:blipFill>
+          <a:blip r:embed="rId3">
+            <a:extLst>
+              <a:ext uri="{28A0092B-C50C-407E-A947-70E740481C1C}">
+                <a14:useLocalDpi xmlns:a14="http://schemas.microsoft.com/office/drawing/2010/main" val="0"/>
+              </a:ext>
+            </a:extLst>
+          </a:blip>
+          <a:srcRect/>
+          <a:stretch>
+            <a:fillRect/>
+          </a:stretch>
+        </p:blipFill>
+        <p:spPr bwMode="auto">
+          <a:xfrm>
+            <a:off x="500424" y="304800"/>
+            <a:ext cx="8159750" cy="876300"/>
+          </a:xfrm>
+          <a:prstGeom prst="rect">
+            <a:avLst/>
+          </a:prstGeom>
+          <a:noFill/>
+          <a:extLst>
+            <a:ext uri="{909E8E84-426E-40DD-AFC4-6F175D3DCCD1}">
+              <a14:hiddenFill xmlns:a14="http://schemas.microsoft.com/office/drawing/2010/main">
+                <a:solidFill>
+                  <a:srgbClr val="FFFFFF"/>
+                </a:solidFill>
+              </a14:hiddenFill>
+            </a:ext>
+          </a:extLst>
+        </p:spPr>
+      </p:pic>
+      <p:pic>
+        <p:nvPicPr>
+          <p:cNvPr id="9220" name="Picture 4" descr="C:\Users\Bob Gorman\AppData\Local\Skitch\Screenshot_111315_072442_PM.jpg"/>
+          <p:cNvPicPr>
+            <a:picLocks noChangeAspect="1" noChangeArrowheads="1"/>
+          </p:cNvPicPr>
+          <p:nvPr/>
+        </p:nvPicPr>
+        <p:blipFill>
+          <a:blip r:embed="rId4">
+            <a:extLst>
+              <a:ext uri="{28A0092B-C50C-407E-A947-70E740481C1C}">
+                <a14:useLocalDpi xmlns:a14="http://schemas.microsoft.com/office/drawing/2010/main" val="0"/>
+              </a:ext>
+            </a:extLst>
+          </a:blip>
+          <a:srcRect/>
+          <a:stretch>
+            <a:fillRect/>
+          </a:stretch>
+        </p:blipFill>
+        <p:spPr bwMode="auto">
+          <a:xfrm>
+            <a:off x="500424" y="5410200"/>
+            <a:ext cx="8603024" cy="1191839"/>
+          </a:xfrm>
+          <a:prstGeom prst="rect">
+            <a:avLst/>
+          </a:prstGeom>
+          <a:noFill/>
+          <a:extLst>
+            <a:ext uri="{909E8E84-426E-40DD-AFC4-6F175D3DCCD1}">
+              <a14:hiddenFill xmlns:a14="http://schemas.microsoft.com/office/drawing/2010/main">
+                <a:solidFill>
+                  <a:srgbClr val="FFFFFF"/>
+                </a:solidFill>
+              </a14:hiddenFill>
+            </a:ext>
+          </a:extLst>
+        </p:spPr>
+      </p:pic>
+    </p:spTree>
+    <p:extLst>
+      <p:ext uri="{BB962C8B-B14F-4D97-AF65-F5344CB8AC3E}">
+        <p14:creationId xmlns:p14="http://schemas.microsoft.com/office/powerpoint/2010/main" val="3045891217"/>
+      </p:ext>
+    </p:extLst>
+  </p:cSld>
+  <p:clrMapOvr>
+    <a:masterClrMapping/>
+  </p:clrMapOvr>
+</p:sld>
+</file>
+
+<file path=ppt/slides/slide25.xml><?xml version="1.0" encoding="utf-8"?>
+<p:sld xmlns:a="http://schemas.openxmlformats.org/drawingml/2006/main" xmlns:r="http://schemas.openxmlformats.org/officeDocument/2006/relationships" xmlns:p="http://schemas.openxmlformats.org/presentationml/2006/main">
+  <p:cSld>
+    <p:spTree>
+      <p:nvGrpSpPr>
+        <p:cNvPr id="1" name=""/>
+        <p:cNvGrpSpPr/>
+        <p:nvPr/>
+      </p:nvGrpSpPr>
+      <p:grpSpPr>
+        <a:xfrm>
+          <a:off x="0" y="0"/>
+          <a:ext cx="0" cy="0"/>
+          <a:chOff x="0" y="0"/>
+          <a:chExt cx="0" cy="0"/>
+        </a:xfrm>
+      </p:grpSpPr>
+      <p:pic>
+        <p:nvPicPr>
+          <p:cNvPr id="7170" name="Picture 2" descr="C:\Users\Bob Gorman\AppData\Local\Skitch\Screenshot_111315_063818_PM.jpg"/>
+          <p:cNvPicPr>
+            <a:picLocks noChangeAspect="1" noChangeArrowheads="1"/>
+          </p:cNvPicPr>
+          <p:nvPr/>
+        </p:nvPicPr>
+        <p:blipFill>
+          <a:blip r:embed="rId2">
+            <a:extLst>
+              <a:ext uri="{28A0092B-C50C-407E-A947-70E740481C1C}">
+                <a14:useLocalDpi xmlns:a14="http://schemas.microsoft.com/office/drawing/2010/main" val="0"/>
+              </a:ext>
+            </a:extLst>
+          </a:blip>
+          <a:srcRect/>
+          <a:stretch>
+            <a:fillRect/>
+          </a:stretch>
+        </p:blipFill>
+        <p:spPr bwMode="auto">
+          <a:xfrm>
+            <a:off x="1143000" y="533400"/>
+            <a:ext cx="6934199" cy="5040594"/>
+          </a:xfrm>
+          <a:prstGeom prst="rect">
+            <a:avLst/>
+          </a:prstGeom>
+          <a:noFill/>
+          <a:extLst>
+            <a:ext uri="{909E8E84-426E-40DD-AFC4-6F175D3DCCD1}">
+              <a14:hiddenFill xmlns:a14="http://schemas.microsoft.com/office/drawing/2010/main">
+                <a:solidFill>
+                  <a:srgbClr val="FFFFFF"/>
+                </a:solidFill>
+              </a14:hiddenFill>
+            </a:ext>
+          </a:extLst>
+        </p:spPr>
+      </p:pic>
+    </p:spTree>
+    <p:extLst>
+      <p:ext uri="{BB962C8B-B14F-4D97-AF65-F5344CB8AC3E}">
+        <p14:creationId xmlns:p14="http://schemas.microsoft.com/office/powerpoint/2010/main" val="2556506866"/>
+      </p:ext>
+    </p:extLst>
+  </p:cSld>
+  <p:clrMapOvr>
+    <a:masterClrMapping/>
+  </p:clrMapOvr>
+</p:sld>
+</file>
+
+<file path=ppt/slides/slide26.xml><?xml version="1.0" encoding="utf-8"?>
+<p:sld xmlns:a="http://schemas.openxmlformats.org/drawingml/2006/main" xmlns:r="http://schemas.openxmlformats.org/officeDocument/2006/relationships" xmlns:p="http://schemas.openxmlformats.org/presentationml/2006/main">
+  <p:cSld>
+    <p:spTree>
+      <p:nvGrpSpPr>
+        <p:cNvPr id="1" name=""/>
+        <p:cNvGrpSpPr/>
+        <p:nvPr/>
+      </p:nvGrpSpPr>
+      <p:grpSpPr>
+        <a:xfrm>
+          <a:off x="0" y="0"/>
+          <a:ext cx="0" cy="0"/>
+          <a:chOff x="0" y="0"/>
+          <a:chExt cx="0" cy="0"/>
+        </a:xfrm>
+      </p:grpSpPr>
+      <p:pic>
+        <p:nvPicPr>
+          <p:cNvPr id="8194" name="Picture 2" descr="C:\Users\Bob Gorman\AppData\Local\Skitch\Screenshot_111315_063925_PM.jpg"/>
+          <p:cNvPicPr>
+            <a:picLocks noChangeAspect="1" noChangeArrowheads="1"/>
+          </p:cNvPicPr>
+          <p:nvPr/>
+        </p:nvPicPr>
+        <p:blipFill>
+          <a:blip r:embed="rId2">
+            <a:extLst>
+              <a:ext uri="{28A0092B-C50C-407E-A947-70E740481C1C}">
+                <a14:useLocalDpi xmlns:a14="http://schemas.microsoft.com/office/drawing/2010/main" val="0"/>
+              </a:ext>
+            </a:extLst>
+          </a:blip>
+          <a:srcRect/>
+          <a:stretch>
+            <a:fillRect/>
+          </a:stretch>
+        </p:blipFill>
+        <p:spPr bwMode="auto">
+          <a:xfrm>
+            <a:off x="1007912" y="457200"/>
+            <a:ext cx="7145488" cy="5194184"/>
+          </a:xfrm>
+          <a:prstGeom prst="rect">
+            <a:avLst/>
+          </a:prstGeom>
+          <a:noFill/>
+          <a:extLst>
+            <a:ext uri="{909E8E84-426E-40DD-AFC4-6F175D3DCCD1}">
+              <a14:hiddenFill xmlns:a14="http://schemas.microsoft.com/office/drawing/2010/main">
+                <a:solidFill>
+                  <a:srgbClr val="FFFFFF"/>
+                </a:solidFill>
+              </a14:hiddenFill>
+            </a:ext>
+          </a:extLst>
+        </p:spPr>
+      </p:pic>
+    </p:spTree>
+    <p:extLst>
+      <p:ext uri="{BB962C8B-B14F-4D97-AF65-F5344CB8AC3E}">
+        <p14:creationId xmlns:p14="http://schemas.microsoft.com/office/powerpoint/2010/main" val="2556506866"/>
+      </p:ext>
+    </p:extLst>
+  </p:cSld>
+  <p:clrMapOvr>
+    <a:masterClrMapping/>
+  </p:clrMapOvr>
+</p:sld>
+</file>
+
+<file path=ppt/slides/slide27.xml><?xml version="1.0" encoding="utf-8"?>
 <p:sld xmlns:a="http://schemas.openxmlformats.org/drawingml/2006/main" xmlns:r="http://schemas.openxmlformats.org/officeDocument/2006/relationships" xmlns:p="http://schemas.openxmlformats.org/presentationml/2006/main">
   <p:cSld>
     <p:spTree>
@@ -3325,7 +4748,7 @@
     </p:spTree>
     <p:extLst>
       <p:ext uri="{BB962C8B-B14F-4D97-AF65-F5344CB8AC3E}">
-        <p14:creationId xmlns:p14="http://schemas.microsoft.com/office/powerpoint/2010/main" val="386409985"/>
+        <p14:creationId xmlns:p14="http://schemas.microsoft.com/office/powerpoint/2010/main" val="2556506866"/>
       </p:ext>
     </p:extLst>
   </p:cSld>
@@ -3335,7 +4758,7 @@
 </p:sld>
 </file>
 
-<file path=ppt/slides/slide13.xml><?xml version="1.0" encoding="utf-8"?>
+<file path=ppt/slides/slide28.xml><?xml version="1.0" encoding="utf-8"?>
 <p:sld xmlns:a="http://schemas.openxmlformats.org/drawingml/2006/main" xmlns:r="http://schemas.openxmlformats.org/officeDocument/2006/relationships" xmlns:p="http://schemas.openxmlformats.org/presentationml/2006/main">
   <p:cSld>
     <p:spTree>
@@ -3355,7 +4778,7 @@
     </p:spTree>
     <p:extLst>
       <p:ext uri="{BB962C8B-B14F-4D97-AF65-F5344CB8AC3E}">
-        <p14:creationId xmlns:p14="http://schemas.microsoft.com/office/powerpoint/2010/main" val="386409985"/>
+        <p14:creationId xmlns:p14="http://schemas.microsoft.com/office/powerpoint/2010/main" val="2556506866"/>
       </p:ext>
     </p:extLst>
   </p:cSld>
@@ -3365,7 +4788,67 @@
 </p:sld>
 </file>
 
-<file path=ppt/slides/slide14.xml><?xml version="1.0" encoding="utf-8"?>
+<file path=ppt/slides/slide29.xml><?xml version="1.0" encoding="utf-8"?>
+<p:sld xmlns:a="http://schemas.openxmlformats.org/drawingml/2006/main" xmlns:r="http://schemas.openxmlformats.org/officeDocument/2006/relationships" xmlns:p="http://schemas.openxmlformats.org/presentationml/2006/main">
+  <p:cSld>
+    <p:spTree>
+      <p:nvGrpSpPr>
+        <p:cNvPr id="1" name=""/>
+        <p:cNvGrpSpPr/>
+        <p:nvPr/>
+      </p:nvGrpSpPr>
+      <p:grpSpPr>
+        <a:xfrm>
+          <a:off x="0" y="0"/>
+          <a:ext cx="0" cy="0"/>
+          <a:chOff x="0" y="0"/>
+          <a:chExt cx="0" cy="0"/>
+        </a:xfrm>
+      </p:grpSpPr>
+    </p:spTree>
+    <p:extLst>
+      <p:ext uri="{BB962C8B-B14F-4D97-AF65-F5344CB8AC3E}">
+        <p14:creationId xmlns:p14="http://schemas.microsoft.com/office/powerpoint/2010/main" val="2556506866"/>
+      </p:ext>
+    </p:extLst>
+  </p:cSld>
+  <p:clrMapOvr>
+    <a:masterClrMapping/>
+  </p:clrMapOvr>
+</p:sld>
+</file>
+
+<file path=ppt/slides/slide3.xml><?xml version="1.0" encoding="utf-8"?>
+<p:sld xmlns:a="http://schemas.openxmlformats.org/drawingml/2006/main" xmlns:r="http://schemas.openxmlformats.org/officeDocument/2006/relationships" xmlns:p="http://schemas.openxmlformats.org/presentationml/2006/main">
+  <p:cSld>
+    <p:spTree>
+      <p:nvGrpSpPr>
+        <p:cNvPr id="1" name=""/>
+        <p:cNvGrpSpPr/>
+        <p:nvPr/>
+      </p:nvGrpSpPr>
+      <p:grpSpPr>
+        <a:xfrm>
+          <a:off x="0" y="0"/>
+          <a:ext cx="0" cy="0"/>
+          <a:chOff x="0" y="0"/>
+          <a:chExt cx="0" cy="0"/>
+        </a:xfrm>
+      </p:grpSpPr>
+    </p:spTree>
+    <p:extLst>
+      <p:ext uri="{BB962C8B-B14F-4D97-AF65-F5344CB8AC3E}">
+        <p14:creationId xmlns:p14="http://schemas.microsoft.com/office/powerpoint/2010/main" val="3976027406"/>
+      </p:ext>
+    </p:extLst>
+  </p:cSld>
+  <p:clrMapOvr>
+    <a:masterClrMapping/>
+  </p:clrMapOvr>
+</p:sld>
+</file>
+
+<file path=ppt/slides/slide30.xml><?xml version="1.0" encoding="utf-8"?>
 <p:sld xmlns:a="http://schemas.openxmlformats.org/drawingml/2006/main" xmlns:r="http://schemas.openxmlformats.org/officeDocument/2006/relationships" xmlns:p="http://schemas.openxmlformats.org/presentationml/2006/main">
   <p:cSld>
     <p:spTree>
@@ -3395,7 +4878,7 @@
 </p:sld>
 </file>
 
-<file path=ppt/slides/slide15.xml><?xml version="1.0" encoding="utf-8"?>
+<file path=ppt/slides/slide4.xml><?xml version="1.0" encoding="utf-8"?>
 <p:sld xmlns:a="http://schemas.openxmlformats.org/drawingml/2006/main" xmlns:r="http://schemas.openxmlformats.org/officeDocument/2006/relationships" xmlns:p="http://schemas.openxmlformats.org/presentationml/2006/main">
   <p:cSld>
     <p:spTree>
@@ -3415,220 +4898,7 @@
     </p:spTree>
     <p:extLst>
       <p:ext uri="{BB962C8B-B14F-4D97-AF65-F5344CB8AC3E}">
-        <p14:creationId xmlns:p14="http://schemas.microsoft.com/office/powerpoint/2010/main" val="3645053687"/>
-      </p:ext>
-    </p:extLst>
-  </p:cSld>
-  <p:clrMapOvr>
-    <a:masterClrMapping/>
-  </p:clrMapOvr>
-</p:sld>
-</file>
-
-<file path=ppt/slides/slide2.xml><?xml version="1.0" encoding="utf-8"?>
-<p:sld xmlns:a="http://schemas.openxmlformats.org/drawingml/2006/main" xmlns:r="http://schemas.openxmlformats.org/officeDocument/2006/relationships" xmlns:p="http://schemas.openxmlformats.org/presentationml/2006/main">
-  <p:cSld>
-    <p:spTree>
-      <p:nvGrpSpPr>
-        <p:cNvPr id="1" name=""/>
-        <p:cNvGrpSpPr/>
-        <p:nvPr/>
-      </p:nvGrpSpPr>
-      <p:grpSpPr>
-        <a:xfrm>
-          <a:off x="0" y="0"/>
-          <a:ext cx="0" cy="0"/>
-          <a:chOff x="0" y="0"/>
-          <a:chExt cx="0" cy="0"/>
-        </a:xfrm>
-      </p:grpSpPr>
-      <p:pic>
-        <p:nvPicPr>
-          <p:cNvPr id="3076" name="Picture 4" descr="C:\Users\Bob Gorman\AppData\Local\Skitch\Screenshot_111315_011014_PM.jpg"/>
-          <p:cNvPicPr>
-            <a:picLocks noChangeAspect="1" noChangeArrowheads="1"/>
-          </p:cNvPicPr>
-          <p:nvPr/>
-        </p:nvPicPr>
-        <p:blipFill>
-          <a:blip r:embed="rId2">
-            <a:extLst>
-              <a:ext uri="{28A0092B-C50C-407E-A947-70E740481C1C}">
-                <a14:useLocalDpi xmlns:a14="http://schemas.microsoft.com/office/drawing/2010/main" val="0"/>
-              </a:ext>
-            </a:extLst>
-          </a:blip>
-          <a:srcRect/>
-          <a:stretch>
-            <a:fillRect/>
-          </a:stretch>
-        </p:blipFill>
-        <p:spPr bwMode="auto">
-          <a:xfrm>
-            <a:off x="685800" y="685800"/>
-            <a:ext cx="6781799" cy="5413313"/>
-          </a:xfrm>
-          <a:prstGeom prst="rect">
-            <a:avLst/>
-          </a:prstGeom>
-          <a:noFill/>
-          <a:extLst>
-            <a:ext uri="{909E8E84-426E-40DD-AFC4-6F175D3DCCD1}">
-              <a14:hiddenFill xmlns:a14="http://schemas.microsoft.com/office/drawing/2010/main">
-                <a:solidFill>
-                  <a:srgbClr val="FFFFFF"/>
-                </a:solidFill>
-              </a14:hiddenFill>
-            </a:ext>
-          </a:extLst>
-        </p:spPr>
-      </p:pic>
-    </p:spTree>
-    <p:extLst>
-      <p:ext uri="{BB962C8B-B14F-4D97-AF65-F5344CB8AC3E}">
-        <p14:creationId xmlns:p14="http://schemas.microsoft.com/office/powerpoint/2010/main" val="3743517916"/>
-      </p:ext>
-    </p:extLst>
-  </p:cSld>
-  <p:clrMapOvr>
-    <a:masterClrMapping/>
-  </p:clrMapOvr>
-</p:sld>
-</file>
-
-<file path=ppt/slides/slide3.xml><?xml version="1.0" encoding="utf-8"?>
-<p:sld xmlns:a="http://schemas.openxmlformats.org/drawingml/2006/main" xmlns:r="http://schemas.openxmlformats.org/officeDocument/2006/relationships" xmlns:p="http://schemas.openxmlformats.org/presentationml/2006/main">
-  <p:cSld>
-    <p:spTree>
-      <p:nvGrpSpPr>
-        <p:cNvPr id="1" name=""/>
-        <p:cNvGrpSpPr/>
-        <p:nvPr/>
-      </p:nvGrpSpPr>
-      <p:grpSpPr>
-        <a:xfrm>
-          <a:off x="0" y="0"/>
-          <a:ext cx="0" cy="0"/>
-          <a:chOff x="0" y="0"/>
-          <a:chExt cx="0" cy="0"/>
-        </a:xfrm>
-      </p:grpSpPr>
-      <p:pic>
-        <p:nvPicPr>
-          <p:cNvPr id="6146" name="Picture 2" descr="C:\Users\Bob Gorman\AppData\Local\Skitch\Screenshot_111315_011344_PM.jpg"/>
-          <p:cNvPicPr>
-            <a:picLocks noChangeAspect="1" noChangeArrowheads="1"/>
-          </p:cNvPicPr>
-          <p:nvPr/>
-        </p:nvPicPr>
-        <p:blipFill>
-          <a:blip r:embed="rId2">
-            <a:extLst>
-              <a:ext uri="{28A0092B-C50C-407E-A947-70E740481C1C}">
-                <a14:useLocalDpi xmlns:a14="http://schemas.microsoft.com/office/drawing/2010/main" val="0"/>
-              </a:ext>
-            </a:extLst>
-          </a:blip>
-          <a:srcRect/>
-          <a:stretch>
-            <a:fillRect/>
-          </a:stretch>
-        </p:blipFill>
-        <p:spPr bwMode="auto">
-          <a:xfrm>
-            <a:off x="990600" y="152400"/>
-            <a:ext cx="7250187" cy="5334000"/>
-          </a:xfrm>
-          <a:prstGeom prst="rect">
-            <a:avLst/>
-          </a:prstGeom>
-          <a:noFill/>
-          <a:extLst>
-            <a:ext uri="{909E8E84-426E-40DD-AFC4-6F175D3DCCD1}">
-              <a14:hiddenFill xmlns:a14="http://schemas.microsoft.com/office/drawing/2010/main">
-                <a:solidFill>
-                  <a:srgbClr val="FFFFFF"/>
-                </a:solidFill>
-              </a14:hiddenFill>
-            </a:ext>
-          </a:extLst>
-        </p:spPr>
-      </p:pic>
-    </p:spTree>
-    <p:extLst>
-      <p:ext uri="{BB962C8B-B14F-4D97-AF65-F5344CB8AC3E}">
-        <p14:creationId xmlns:p14="http://schemas.microsoft.com/office/powerpoint/2010/main" val="2153672897"/>
-      </p:ext>
-    </p:extLst>
-  </p:cSld>
-  <p:clrMapOvr>
-    <a:masterClrMapping/>
-  </p:clrMapOvr>
-</p:sld>
-</file>
-
-<file path=ppt/slides/slide4.xml><?xml version="1.0" encoding="utf-8"?>
-<p:sld xmlns:a="http://schemas.openxmlformats.org/drawingml/2006/main" xmlns:r="http://schemas.openxmlformats.org/officeDocument/2006/relationships" xmlns:p="http://schemas.openxmlformats.org/presentationml/2006/main">
-  <p:cSld>
-    <p:spTree>
-      <p:nvGrpSpPr>
-        <p:cNvPr id="1" name=""/>
-        <p:cNvGrpSpPr/>
-        <p:nvPr/>
-      </p:nvGrpSpPr>
-      <p:grpSpPr>
-        <a:xfrm>
-          <a:off x="0" y="0"/>
-          <a:ext cx="0" cy="0"/>
-          <a:chOff x="0" y="0"/>
-          <a:chExt cx="0" cy="0"/>
-        </a:xfrm>
-      </p:grpSpPr>
-      <p:pic>
-        <p:nvPicPr>
-          <p:cNvPr id="5122" name="Picture 2" descr="C:\Users\Bob Gorman\AppData\Local\Skitch\aldt02_111315_010202_PM.jpg"/>
-          <p:cNvPicPr>
-            <a:picLocks noChangeAspect="1" noChangeArrowheads="1"/>
-          </p:cNvPicPr>
-          <p:nvPr/>
-        </p:nvPicPr>
-        <p:blipFill>
-          <a:blip r:embed="rId2">
-            <a:extLst>
-              <a:ext uri="{28A0092B-C50C-407E-A947-70E740481C1C}">
-                <a14:useLocalDpi xmlns:a14="http://schemas.microsoft.com/office/drawing/2010/main" val="0"/>
-              </a:ext>
-            </a:extLst>
-          </a:blip>
-          <a:srcRect/>
-          <a:stretch>
-            <a:fillRect/>
-          </a:stretch>
-        </p:blipFill>
-        <p:spPr bwMode="auto">
-          <a:xfrm rot="5400000">
-            <a:off x="2514600" y="504552"/>
-            <a:ext cx="3282950" cy="5105553"/>
-          </a:xfrm>
-          <a:prstGeom prst="rect">
-            <a:avLst/>
-          </a:prstGeom>
-          <a:noFill/>
-          <a:extLst>
-            <a:ext uri="{909E8E84-426E-40DD-AFC4-6F175D3DCCD1}">
-              <a14:hiddenFill xmlns:a14="http://schemas.microsoft.com/office/drawing/2010/main">
-                <a:solidFill>
-                  <a:srgbClr val="FFFFFF"/>
-                </a:solidFill>
-              </a14:hiddenFill>
-            </a:ext>
-          </a:extLst>
-        </p:spPr>
-      </p:pic>
-    </p:spTree>
-    <p:extLst>
-      <p:ext uri="{BB962C8B-B14F-4D97-AF65-F5344CB8AC3E}">
-        <p14:creationId xmlns:p14="http://schemas.microsoft.com/office/powerpoint/2010/main" val="1191784876"/>
+        <p14:creationId xmlns:p14="http://schemas.microsoft.com/office/powerpoint/2010/main" val="953151465"/>
       </p:ext>
     </p:extLst>
   </p:cSld>
@@ -3657,17 +4927,17 @@
       </p:grpSpPr>
       <p:pic>
         <p:nvPicPr>
-          <p:cNvPr id="7170" name="Picture 2" descr="C:\Users\Bob Gorman\AppData\Local\Skitch\Screenshot_111315_011657_PM.jpg"/>
+          <p:cNvPr id="1026" name="Picture 2" descr="C:\Users\Bob Gorman\AppData\Local\Skitch\Screenshot_031815_095610_PM.jpg"/>
           <p:cNvPicPr>
             <a:picLocks noChangeAspect="1" noChangeArrowheads="1"/>
           </p:cNvPicPr>
           <p:nvPr/>
         </p:nvPicPr>
         <p:blipFill>
-          <a:blip r:embed="rId2">
+          <a:blip r:embed="rId2" cstate="email">
             <a:extLst>
               <a:ext uri="{28A0092B-C50C-407E-A947-70E740481C1C}">
-                <a14:useLocalDpi xmlns:a14="http://schemas.microsoft.com/office/drawing/2010/main" val="0"/>
+                <a14:useLocalDpi xmlns:a14="http://schemas.microsoft.com/office/drawing/2010/main"/>
               </a:ext>
             </a:extLst>
           </a:blip>
@@ -3678,8 +4948,8 @@
         </p:blipFill>
         <p:spPr bwMode="auto">
           <a:xfrm>
-            <a:off x="762000" y="18107"/>
-            <a:ext cx="7086599" cy="5521907"/>
+            <a:off x="494671" y="1828800"/>
+            <a:ext cx="7924046" cy="4782983"/>
           </a:xfrm>
           <a:prstGeom prst="rect">
             <a:avLst/>
@@ -3696,16 +4966,76 @@
           </a:extLst>
         </p:spPr>
       </p:pic>
+      <p:pic>
+        <p:nvPicPr>
+          <p:cNvPr id="1027" name="Picture 3" descr="C:\Users\Bob Gorman\AppData\Local\Skitch\Screenshot_031815_095710_PM.jpg"/>
+          <p:cNvPicPr>
+            <a:picLocks noChangeAspect="1" noChangeArrowheads="1"/>
+          </p:cNvPicPr>
+          <p:nvPr/>
+        </p:nvPicPr>
+        <p:blipFill>
+          <a:blip r:embed="rId3" cstate="email">
+            <a:extLst>
+              <a:ext uri="{28A0092B-C50C-407E-A947-70E740481C1C}">
+                <a14:useLocalDpi xmlns:a14="http://schemas.microsoft.com/office/drawing/2010/main"/>
+              </a:ext>
+            </a:extLst>
+          </a:blip>
+          <a:srcRect/>
+          <a:stretch>
+            <a:fillRect/>
+          </a:stretch>
+        </p:blipFill>
+        <p:spPr bwMode="auto">
+          <a:xfrm>
+            <a:off x="467008" y="0"/>
+            <a:ext cx="8178800" cy="1911350"/>
+          </a:xfrm>
+          <a:prstGeom prst="rect">
+            <a:avLst/>
+          </a:prstGeom>
+          <a:noFill/>
+          <a:extLst>
+            <a:ext uri="{909E8E84-426E-40DD-AFC4-6F175D3DCCD1}">
+              <a14:hiddenFill xmlns:a14="http://schemas.microsoft.com/office/drawing/2010/main">
+                <a:solidFill>
+                  <a:srgbClr val="FFFFFF"/>
+                </a:solidFill>
+              </a14:hiddenFill>
+            </a:ext>
+          </a:extLst>
+        </p:spPr>
+      </p:pic>
     </p:spTree>
     <p:extLst>
       <p:ext uri="{BB962C8B-B14F-4D97-AF65-F5344CB8AC3E}">
-        <p14:creationId xmlns:p14="http://schemas.microsoft.com/office/powerpoint/2010/main" val="1191784876"/>
+        <p14:creationId xmlns:p14="http://schemas.microsoft.com/office/powerpoint/2010/main" val="899200281"/>
       </p:ext>
     </p:extLst>
   </p:cSld>
   <p:clrMapOvr>
     <a:masterClrMapping/>
   </p:clrMapOvr>
+  <mc:AlternateContent xmlns:mc="http://schemas.openxmlformats.org/markup-compatibility/2006" xmlns:p14="http://schemas.microsoft.com/office/powerpoint/2010/main">
+    <mc:Choice Requires="p14">
+      <p:transition spd="med" p14:dur="700">
+        <p:fade/>
+      </p:transition>
+    </mc:Choice>
+    <mc:Fallback xmlns="">
+      <p:transition spd="med">
+        <p:fade/>
+      </p:transition>
+    </mc:Fallback>
+  </mc:AlternateContent>
+  <p:timing>
+    <p:tnLst>
+      <p:par>
+        <p:cTn id="1" dur="indefinite" restart="never" nodeType="tmRoot"/>
+      </p:par>
+    </p:tnLst>
+  </p:timing>
 </p:sld>
 </file>
 
@@ -3728,7 +5058,7 @@
       </p:grpSpPr>
       <p:pic>
         <p:nvPicPr>
-          <p:cNvPr id="8194" name="Picture 2" descr="C:\Users\Bob Gorman\AppData\Local\Skitch\Screenshot_111315_011820_PM.jpg"/>
+          <p:cNvPr id="3074" name="Picture 2" descr="C:\Users\Bob Gorman\AppData\Local\Skitch\Screenshot_111315_052301_PM.jpg"/>
           <p:cNvPicPr>
             <a:picLocks noChangeAspect="1" noChangeArrowheads="1"/>
           </p:cNvPicPr>
@@ -3748,9 +5078,9 @@
           </a:stretch>
         </p:blipFill>
         <p:spPr bwMode="auto">
-          <a:xfrm rot="5400000">
-            <a:off x="2654111" y="393889"/>
-            <a:ext cx="4152604" cy="5041226"/>
+          <a:xfrm>
+            <a:off x="304800" y="609600"/>
+            <a:ext cx="8758806" cy="5105400"/>
           </a:xfrm>
           <a:prstGeom prst="rect">
             <a:avLst/>
@@ -3770,7 +5100,7 @@
     </p:spTree>
     <p:extLst>
       <p:ext uri="{BB962C8B-B14F-4D97-AF65-F5344CB8AC3E}">
-        <p14:creationId xmlns:p14="http://schemas.microsoft.com/office/powerpoint/2010/main" val="1191784876"/>
+        <p14:creationId xmlns:p14="http://schemas.microsoft.com/office/powerpoint/2010/main" val="953151465"/>
       </p:ext>
     </p:extLst>
   </p:cSld>
@@ -3799,7 +5129,7 @@
       </p:grpSpPr>
       <p:pic>
         <p:nvPicPr>
-          <p:cNvPr id="9218" name="Picture 2" descr="C:\Users\Bob Gorman\AppData\Local\Skitch\Screenshot_111315_011953_PM.jpg"/>
+          <p:cNvPr id="5123" name="Picture 3" descr="C:\Users\Bob Gorman\AppData\Local\Skitch\Screenshot_111315_061804_PM.jpg"/>
           <p:cNvPicPr>
             <a:picLocks noChangeAspect="1" noChangeArrowheads="1"/>
           </p:cNvPicPr>
@@ -3819,9 +5149,9 @@
           </a:stretch>
         </p:blipFill>
         <p:spPr bwMode="auto">
-          <a:xfrm rot="5400000">
-            <a:off x="2430249" y="161180"/>
-            <a:ext cx="4190998" cy="5087838"/>
+          <a:xfrm>
+            <a:off x="609600" y="304800"/>
+            <a:ext cx="7696200" cy="4946490"/>
           </a:xfrm>
           <a:prstGeom prst="rect">
             <a:avLst/>
@@ -3838,10 +5168,51 @@
           </a:extLst>
         </p:spPr>
       </p:pic>
+      <p:pic>
+        <p:nvPicPr>
+          <p:cNvPr id="4" name="Picture 3" descr="C:\Users\Bob Gorman\AppData\Local\Skitch\Screenshot_111315_060830_PM.jpg"/>
+          <p:cNvPicPr>
+            <a:picLocks noChangeAspect="1" noChangeArrowheads="1"/>
+          </p:cNvPicPr>
+          <p:nvPr/>
+        </p:nvPicPr>
+        <p:blipFill>
+          <a:blip r:embed="rId3">
+            <a:extLst>
+              <a:ext uri="{28A0092B-C50C-407E-A947-70E740481C1C}">
+                <a14:useLocalDpi xmlns:a14="http://schemas.microsoft.com/office/drawing/2010/main" val="0"/>
+              </a:ext>
+            </a:extLst>
+          </a:blip>
+          <a:srcRect/>
+          <a:stretch>
+            <a:fillRect/>
+          </a:stretch>
+        </p:blipFill>
+        <p:spPr bwMode="auto">
+          <a:xfrm>
+            <a:off x="457200" y="5537819"/>
+            <a:ext cx="8382000" cy="896565"/>
+          </a:xfrm>
+          <a:prstGeom prst="rect">
+            <a:avLst/>
+          </a:prstGeom>
+          <a:noFill/>
+          <a:extLst>
+            <a:ext uri="{909E8E84-426E-40DD-AFC4-6F175D3DCCD1}">
+              <a14:hiddenFill xmlns:a14="http://schemas.microsoft.com/office/drawing/2010/main">
+                <a:solidFill>
+                  <a:srgbClr val="FFFFFF"/>
+                </a:solidFill>
+              </a14:hiddenFill>
+            </a:ext>
+          </a:extLst>
+        </p:spPr>
+      </p:pic>
     </p:spTree>
     <p:extLst>
       <p:ext uri="{BB962C8B-B14F-4D97-AF65-F5344CB8AC3E}">
-        <p14:creationId xmlns:p14="http://schemas.microsoft.com/office/powerpoint/2010/main" val="428004107"/>
+        <p14:creationId xmlns:p14="http://schemas.microsoft.com/office/powerpoint/2010/main" val="953151465"/>
       </p:ext>
     </p:extLst>
   </p:cSld>
@@ -3870,17 +5241,17 @@
       </p:grpSpPr>
       <p:pic>
         <p:nvPicPr>
-          <p:cNvPr id="10242" name="Picture 2" descr="C:\Users\Bob Gorman\AppData\Local\Skitch\Screenshot_111315_012217_PM.jpg"/>
+          <p:cNvPr id="7170" name="Picture 2" descr="C:\Users\BOBGOR~1\AppData\Local\Temp\Screenshot_030715_103606_AM.jpg"/>
           <p:cNvPicPr>
             <a:picLocks noChangeAspect="1" noChangeArrowheads="1"/>
           </p:cNvPicPr>
           <p:nvPr/>
         </p:nvPicPr>
         <p:blipFill>
-          <a:blip r:embed="rId2">
+          <a:blip r:embed="rId2" cstate="email">
             <a:extLst>
               <a:ext uri="{28A0092B-C50C-407E-A947-70E740481C1C}">
-                <a14:useLocalDpi xmlns:a14="http://schemas.microsoft.com/office/drawing/2010/main" val="0"/>
+                <a14:useLocalDpi xmlns:a14="http://schemas.microsoft.com/office/drawing/2010/main"/>
               </a:ext>
             </a:extLst>
           </a:blip>
@@ -3890,9 +5261,9 @@
           </a:stretch>
         </p:blipFill>
         <p:spPr bwMode="auto">
-          <a:xfrm rot="5400000">
-            <a:off x="2107465" y="178535"/>
-            <a:ext cx="4880273" cy="5742403"/>
+          <a:xfrm>
+            <a:off x="88900" y="990600"/>
+            <a:ext cx="9055100" cy="3702050"/>
           </a:xfrm>
           <a:prstGeom prst="rect">
             <a:avLst/>
@@ -3912,13 +5283,32 @@
     </p:spTree>
     <p:extLst>
       <p:ext uri="{BB962C8B-B14F-4D97-AF65-F5344CB8AC3E}">
-        <p14:creationId xmlns:p14="http://schemas.microsoft.com/office/powerpoint/2010/main" val="428004107"/>
+        <p14:creationId xmlns:p14="http://schemas.microsoft.com/office/powerpoint/2010/main" val="2158375959"/>
       </p:ext>
     </p:extLst>
   </p:cSld>
   <p:clrMapOvr>
     <a:masterClrMapping/>
   </p:clrMapOvr>
+  <mc:AlternateContent xmlns:mc="http://schemas.openxmlformats.org/markup-compatibility/2006" xmlns:p14="http://schemas.microsoft.com/office/powerpoint/2010/main">
+    <mc:Choice Requires="p14">
+      <p:transition spd="med" p14:dur="700">
+        <p:fade/>
+      </p:transition>
+    </mc:Choice>
+    <mc:Fallback xmlns="">
+      <p:transition spd="med">
+        <p:fade/>
+      </p:transition>
+    </mc:Fallback>
+  </mc:AlternateContent>
+  <p:timing>
+    <p:tnLst>
+      <p:par>
+        <p:cTn id="1" dur="indefinite" restart="never" nodeType="tmRoot"/>
+      </p:par>
+    </p:tnLst>
+  </p:timing>
 </p:sld>
 </file>
 
@@ -3941,7 +5331,7 @@
       </p:grpSpPr>
       <p:pic>
         <p:nvPicPr>
-          <p:cNvPr id="11266" name="Picture 2" descr="C:\Users\Bob Gorman\AppData\Local\Skitch\Screenshot_111315_012258_PM.jpg"/>
+          <p:cNvPr id="6146" name="Picture 2" descr="C:\Users\Bob Gorman\AppData\Local\Skitch\Screenshot_111315_062316_PM.jpg"/>
           <p:cNvPicPr>
             <a:picLocks noChangeAspect="1" noChangeArrowheads="1"/>
           </p:cNvPicPr>
@@ -3961,9 +5351,9 @@
           </a:stretch>
         </p:blipFill>
         <p:spPr bwMode="auto">
-          <a:xfrm rot="5400000">
-            <a:off x="2479713" y="34887"/>
-            <a:ext cx="4781192" cy="5625819"/>
+          <a:xfrm>
+            <a:off x="228600" y="457200"/>
+            <a:ext cx="8258960" cy="2299430"/>
           </a:xfrm>
           <a:prstGeom prst="rect">
             <a:avLst/>
@@ -3980,10 +5370,133 @@
           </a:extLst>
         </p:spPr>
       </p:pic>
+      <p:pic>
+        <p:nvPicPr>
+          <p:cNvPr id="6150" name="Picture 6" descr="C:\Users\Bob Gorman\AppData\Local\Skitch\Screenshot_111315_062800_PM.jpg"/>
+          <p:cNvPicPr>
+            <a:picLocks noChangeAspect="1" noChangeArrowheads="1"/>
+          </p:cNvPicPr>
+          <p:nvPr/>
+        </p:nvPicPr>
+        <p:blipFill>
+          <a:blip r:embed="rId3">
+            <a:extLst>
+              <a:ext uri="{28A0092B-C50C-407E-A947-70E740481C1C}">
+                <a14:useLocalDpi xmlns:a14="http://schemas.microsoft.com/office/drawing/2010/main" val="0"/>
+              </a:ext>
+            </a:extLst>
+          </a:blip>
+          <a:srcRect/>
+          <a:stretch>
+            <a:fillRect/>
+          </a:stretch>
+        </p:blipFill>
+        <p:spPr bwMode="auto">
+          <a:xfrm>
+            <a:off x="762000" y="2891817"/>
+            <a:ext cx="2257968" cy="3276600"/>
+          </a:xfrm>
+          <a:prstGeom prst="rect">
+            <a:avLst/>
+          </a:prstGeom>
+          <a:noFill/>
+          <a:extLst>
+            <a:ext uri="{909E8E84-426E-40DD-AFC4-6F175D3DCCD1}">
+              <a14:hiddenFill xmlns:a14="http://schemas.microsoft.com/office/drawing/2010/main">
+                <a:solidFill>
+                  <a:srgbClr val="FFFFFF"/>
+                </a:solidFill>
+              </a14:hiddenFill>
+            </a:ext>
+          </a:extLst>
+        </p:spPr>
+      </p:pic>
+      <p:pic>
+        <p:nvPicPr>
+          <p:cNvPr id="6151" name="Picture 7" descr="C:\Users\Bob Gorman\AppData\Local\Skitch\Screenshot_111315_062858_PM.jpg"/>
+          <p:cNvPicPr>
+            <a:picLocks noChangeAspect="1" noChangeArrowheads="1"/>
+          </p:cNvPicPr>
+          <p:nvPr/>
+        </p:nvPicPr>
+        <p:blipFill>
+          <a:blip r:embed="rId4">
+            <a:extLst>
+              <a:ext uri="{28A0092B-C50C-407E-A947-70E740481C1C}">
+                <a14:useLocalDpi xmlns:a14="http://schemas.microsoft.com/office/drawing/2010/main" val="0"/>
+              </a:ext>
+            </a:extLst>
+          </a:blip>
+          <a:srcRect/>
+          <a:stretch>
+            <a:fillRect/>
+          </a:stretch>
+        </p:blipFill>
+        <p:spPr bwMode="auto">
+          <a:xfrm>
+            <a:off x="3219245" y="2891817"/>
+            <a:ext cx="2277670" cy="3373692"/>
+          </a:xfrm>
+          <a:prstGeom prst="rect">
+            <a:avLst/>
+          </a:prstGeom>
+          <a:noFill/>
+          <a:extLst>
+            <a:ext uri="{909E8E84-426E-40DD-AFC4-6F175D3DCCD1}">
+              <a14:hiddenFill xmlns:a14="http://schemas.microsoft.com/office/drawing/2010/main">
+                <a:solidFill>
+                  <a:srgbClr val="FFFFFF"/>
+                </a:solidFill>
+              </a14:hiddenFill>
+            </a:ext>
+          </a:extLst>
+        </p:spPr>
+      </p:pic>
+      <p:pic>
+        <p:nvPicPr>
+          <p:cNvPr id="6152" name="Picture 8" descr="C:\Users\Bob Gorman\AppData\Local\Skitch\Screenshot_111315_063001_PM.jpg"/>
+          <p:cNvPicPr>
+            <a:picLocks noChangeAspect="1" noChangeArrowheads="1"/>
+          </p:cNvPicPr>
+          <p:nvPr/>
+        </p:nvPicPr>
+        <p:blipFill>
+          <a:blip r:embed="rId5">
+            <a:extLst>
+              <a:ext uri="{28A0092B-C50C-407E-A947-70E740481C1C}">
+                <a14:useLocalDpi xmlns:a14="http://schemas.microsoft.com/office/drawing/2010/main" val="0"/>
+              </a:ext>
+            </a:extLst>
+          </a:blip>
+          <a:srcRect/>
+          <a:stretch>
+            <a:fillRect/>
+          </a:stretch>
+        </p:blipFill>
+        <p:spPr bwMode="auto">
+          <a:xfrm>
+            <a:off x="5442896" y="2891817"/>
+            <a:ext cx="2563235" cy="2670783"/>
+          </a:xfrm>
+          <a:prstGeom prst="rect">
+            <a:avLst/>
+          </a:prstGeom>
+          <a:noFill/>
+          <a:extLst>
+            <a:ext uri="{909E8E84-426E-40DD-AFC4-6F175D3DCCD1}">
+              <a14:hiddenFill xmlns:a14="http://schemas.microsoft.com/office/drawing/2010/main">
+                <a:solidFill>
+                  <a:srgbClr val="FFFFFF"/>
+                </a:solidFill>
+              </a14:hiddenFill>
+            </a:ext>
+          </a:extLst>
+        </p:spPr>
+      </p:pic>
     </p:spTree>
     <p:extLst>
       <p:ext uri="{BB962C8B-B14F-4D97-AF65-F5344CB8AC3E}">
-        <p14:creationId xmlns:p14="http://schemas.microsoft.com/office/powerpoint/2010/main" val="428004107"/>
+        <p14:creationId xmlns:p14="http://schemas.microsoft.com/office/powerpoint/2010/main" val="384389964"/>
       </p:ext>
     </p:extLst>
   </p:cSld>

</xml_diff>

<commit_message>
Z-score anlaysis of proiel files.
</commit_message>
<xml_diff>
--- a/SBL_talk/sbl_presentation.pptx
+++ b/SBL_talk/sbl_presentation.pptx
@@ -33,8 +33,13 @@
     <p:sldId id="293" r:id="rId27"/>
     <p:sldId id="294" r:id="rId28"/>
     <p:sldId id="295" r:id="rId29"/>
-    <p:sldId id="296" r:id="rId30"/>
-    <p:sldId id="273" r:id="rId31"/>
+    <p:sldId id="306" r:id="rId30"/>
+    <p:sldId id="296" r:id="rId31"/>
+    <p:sldId id="307" r:id="rId32"/>
+    <p:sldId id="273" r:id="rId33"/>
+    <p:sldId id="302" r:id="rId34"/>
+    <p:sldId id="303" r:id="rId35"/>
+    <p:sldId id="304" r:id="rId36"/>
   </p:sldIdLst>
   <p:sldSz cx="9144000" cy="6858000" type="screen4x3"/>
   <p:notesSz cx="6858000" cy="9144000"/>
@@ -317,7 +322,7 @@
           <a:p>
             <a:fld id="{AB94029E-6FCD-4D3D-AE41-24E942A5DE05}" type="datetimeFigureOut">
               <a:rPr lang="en-US" smtClean="0"/>
-              <a:t>11/13/2015</a:t>
+              <a:t>11/14/2015</a:t>
             </a:fld>
             <a:endParaRPr lang="en-US"/>
           </a:p>
@@ -487,7 +492,7 @@
           <a:p>
             <a:fld id="{AB94029E-6FCD-4D3D-AE41-24E942A5DE05}" type="datetimeFigureOut">
               <a:rPr lang="en-US" smtClean="0"/>
-              <a:t>11/13/2015</a:t>
+              <a:t>11/14/2015</a:t>
             </a:fld>
             <a:endParaRPr lang="en-US"/>
           </a:p>
@@ -667,7 +672,7 @@
           <a:p>
             <a:fld id="{AB94029E-6FCD-4D3D-AE41-24E942A5DE05}" type="datetimeFigureOut">
               <a:rPr lang="en-US" smtClean="0"/>
-              <a:t>11/13/2015</a:t>
+              <a:t>11/14/2015</a:t>
             </a:fld>
             <a:endParaRPr lang="en-US"/>
           </a:p>
@@ -837,7 +842,7 @@
           <a:p>
             <a:fld id="{AB94029E-6FCD-4D3D-AE41-24E942A5DE05}" type="datetimeFigureOut">
               <a:rPr lang="en-US" smtClean="0"/>
-              <a:t>11/13/2015</a:t>
+              <a:t>11/14/2015</a:t>
             </a:fld>
             <a:endParaRPr lang="en-US"/>
           </a:p>
@@ -1083,7 +1088,7 @@
           <a:p>
             <a:fld id="{AB94029E-6FCD-4D3D-AE41-24E942A5DE05}" type="datetimeFigureOut">
               <a:rPr lang="en-US" smtClean="0"/>
-              <a:t>11/13/2015</a:t>
+              <a:t>11/14/2015</a:t>
             </a:fld>
             <a:endParaRPr lang="en-US"/>
           </a:p>
@@ -1371,7 +1376,7 @@
           <a:p>
             <a:fld id="{AB94029E-6FCD-4D3D-AE41-24E942A5DE05}" type="datetimeFigureOut">
               <a:rPr lang="en-US" smtClean="0"/>
-              <a:t>11/13/2015</a:t>
+              <a:t>11/14/2015</a:t>
             </a:fld>
             <a:endParaRPr lang="en-US"/>
           </a:p>
@@ -1793,7 +1798,7 @@
           <a:p>
             <a:fld id="{AB94029E-6FCD-4D3D-AE41-24E942A5DE05}" type="datetimeFigureOut">
               <a:rPr lang="en-US" smtClean="0"/>
-              <a:t>11/13/2015</a:t>
+              <a:t>11/14/2015</a:t>
             </a:fld>
             <a:endParaRPr lang="en-US"/>
           </a:p>
@@ -1911,7 +1916,7 @@
           <a:p>
             <a:fld id="{AB94029E-6FCD-4D3D-AE41-24E942A5DE05}" type="datetimeFigureOut">
               <a:rPr lang="en-US" smtClean="0"/>
-              <a:t>11/13/2015</a:t>
+              <a:t>11/14/2015</a:t>
             </a:fld>
             <a:endParaRPr lang="en-US"/>
           </a:p>
@@ -2006,7 +2011,7 @@
           <a:p>
             <a:fld id="{AB94029E-6FCD-4D3D-AE41-24E942A5DE05}" type="datetimeFigureOut">
               <a:rPr lang="en-US" smtClean="0"/>
-              <a:t>11/13/2015</a:t>
+              <a:t>11/14/2015</a:t>
             </a:fld>
             <a:endParaRPr lang="en-US"/>
           </a:p>
@@ -2283,7 +2288,7 @@
           <a:p>
             <a:fld id="{AB94029E-6FCD-4D3D-AE41-24E942A5DE05}" type="datetimeFigureOut">
               <a:rPr lang="en-US" smtClean="0"/>
-              <a:t>11/13/2015</a:t>
+              <a:t>11/14/2015</a:t>
             </a:fld>
             <a:endParaRPr lang="en-US"/>
           </a:p>
@@ -2536,7 +2541,7 @@
           <a:p>
             <a:fld id="{AB94029E-6FCD-4D3D-AE41-24E942A5DE05}" type="datetimeFigureOut">
               <a:rPr lang="en-US" smtClean="0"/>
-              <a:t>11/13/2015</a:t>
+              <a:t>11/14/2015</a:t>
             </a:fld>
             <a:endParaRPr lang="en-US"/>
           </a:p>
@@ -2749,7 +2754,7 @@
           <a:p>
             <a:fld id="{AB94029E-6FCD-4D3D-AE41-24E942A5DE05}" type="datetimeFigureOut">
               <a:rPr lang="en-US" smtClean="0"/>
-              <a:t>11/13/2015</a:t>
+              <a:t>11/14/2015</a:t>
             </a:fld>
             <a:endParaRPr lang="en-US"/>
           </a:p>
@@ -4745,6 +4750,47 @@
           <a:chExt cx="0" cy="0"/>
         </a:xfrm>
       </p:grpSpPr>
+      <p:pic>
+        <p:nvPicPr>
+          <p:cNvPr id="1026" name="Picture 2" descr="C:\Users\Bob Gorman\AppData\Local\Skitch\Screenshot_111415_031622_PM.jpg"/>
+          <p:cNvPicPr>
+            <a:picLocks noChangeAspect="1" noChangeArrowheads="1"/>
+          </p:cNvPicPr>
+          <p:nvPr/>
+        </p:nvPicPr>
+        <p:blipFill>
+          <a:blip r:embed="rId2">
+            <a:extLst>
+              <a:ext uri="{28A0092B-C50C-407E-A947-70E740481C1C}">
+                <a14:useLocalDpi xmlns:a14="http://schemas.microsoft.com/office/drawing/2010/main" val="0"/>
+              </a:ext>
+            </a:extLst>
+          </a:blip>
+          <a:srcRect/>
+          <a:stretch>
+            <a:fillRect/>
+          </a:stretch>
+        </p:blipFill>
+        <p:spPr bwMode="auto">
+          <a:xfrm rot="5400000">
+            <a:off x="3201820" y="801697"/>
+            <a:ext cx="2463800" cy="4295441"/>
+          </a:xfrm>
+          <a:prstGeom prst="rect">
+            <a:avLst/>
+          </a:prstGeom>
+          <a:noFill/>
+          <a:extLst>
+            <a:ext uri="{909E8E84-426E-40DD-AFC4-6F175D3DCCD1}">
+              <a14:hiddenFill xmlns:a14="http://schemas.microsoft.com/office/drawing/2010/main">
+                <a:solidFill>
+                  <a:srgbClr val="FFFFFF"/>
+                </a:solidFill>
+              </a14:hiddenFill>
+            </a:ext>
+          </a:extLst>
+        </p:spPr>
+      </p:pic>
     </p:spTree>
     <p:extLst>
       <p:ext uri="{BB962C8B-B14F-4D97-AF65-F5344CB8AC3E}">
@@ -4775,6 +4821,47 @@
           <a:chExt cx="0" cy="0"/>
         </a:xfrm>
       </p:grpSpPr>
+      <p:pic>
+        <p:nvPicPr>
+          <p:cNvPr id="2050" name="Picture 2" descr="C:\Users\Bob Gorman\AppData\Local\Skitch\Screenshot_111415_031800_PM.jpg"/>
+          <p:cNvPicPr>
+            <a:picLocks noChangeAspect="1" noChangeArrowheads="1"/>
+          </p:cNvPicPr>
+          <p:nvPr/>
+        </p:nvPicPr>
+        <p:blipFill>
+          <a:blip r:embed="rId2">
+            <a:extLst>
+              <a:ext uri="{28A0092B-C50C-407E-A947-70E740481C1C}">
+                <a14:useLocalDpi xmlns:a14="http://schemas.microsoft.com/office/drawing/2010/main" val="0"/>
+              </a:ext>
+            </a:extLst>
+          </a:blip>
+          <a:srcRect/>
+          <a:stretch>
+            <a:fillRect/>
+          </a:stretch>
+        </p:blipFill>
+        <p:spPr bwMode="auto">
+          <a:xfrm>
+            <a:off x="1295400" y="381000"/>
+            <a:ext cx="6309545" cy="4948368"/>
+          </a:xfrm>
+          <a:prstGeom prst="rect">
+            <a:avLst/>
+          </a:prstGeom>
+          <a:noFill/>
+          <a:extLst>
+            <a:ext uri="{909E8E84-426E-40DD-AFC4-6F175D3DCCD1}">
+              <a14:hiddenFill xmlns:a14="http://schemas.microsoft.com/office/drawing/2010/main">
+                <a:solidFill>
+                  <a:srgbClr val="FFFFFF"/>
+                </a:solidFill>
+              </a14:hiddenFill>
+            </a:ext>
+          </a:extLst>
+        </p:spPr>
+      </p:pic>
     </p:spTree>
     <p:extLst>
       <p:ext uri="{BB962C8B-B14F-4D97-AF65-F5344CB8AC3E}">
@@ -4805,10 +4892,51 @@
           <a:chExt cx="0" cy="0"/>
         </a:xfrm>
       </p:grpSpPr>
+      <p:pic>
+        <p:nvPicPr>
+          <p:cNvPr id="5122" name="Picture 2" descr="C:\Users\Bob Gorman\AppData\Local\Skitch\Screenshot_111415_032228_PM.jpg"/>
+          <p:cNvPicPr>
+            <a:picLocks noChangeAspect="1" noChangeArrowheads="1"/>
+          </p:cNvPicPr>
+          <p:nvPr/>
+        </p:nvPicPr>
+        <p:blipFill>
+          <a:blip r:embed="rId2">
+            <a:extLst>
+              <a:ext uri="{28A0092B-C50C-407E-A947-70E740481C1C}">
+                <a14:useLocalDpi xmlns:a14="http://schemas.microsoft.com/office/drawing/2010/main" val="0"/>
+              </a:ext>
+            </a:extLst>
+          </a:blip>
+          <a:srcRect/>
+          <a:stretch>
+            <a:fillRect/>
+          </a:stretch>
+        </p:blipFill>
+        <p:spPr bwMode="auto">
+          <a:xfrm rot="5400000">
+            <a:off x="2757412" y="595388"/>
+            <a:ext cx="3162300" cy="5019524"/>
+          </a:xfrm>
+          <a:prstGeom prst="rect">
+            <a:avLst/>
+          </a:prstGeom>
+          <a:noFill/>
+          <a:extLst>
+            <a:ext uri="{909E8E84-426E-40DD-AFC4-6F175D3DCCD1}">
+              <a14:hiddenFill xmlns:a14="http://schemas.microsoft.com/office/drawing/2010/main">
+                <a:solidFill>
+                  <a:srgbClr val="FFFFFF"/>
+                </a:solidFill>
+              </a14:hiddenFill>
+            </a:ext>
+          </a:extLst>
+        </p:spPr>
+      </p:pic>
     </p:spTree>
     <p:extLst>
       <p:ext uri="{BB962C8B-B14F-4D97-AF65-F5344CB8AC3E}">
-        <p14:creationId xmlns:p14="http://schemas.microsoft.com/office/powerpoint/2010/main" val="2556506866"/>
+        <p14:creationId xmlns:p14="http://schemas.microsoft.com/office/powerpoint/2010/main" val="2668983980"/>
       </p:ext>
     </p:extLst>
   </p:cSld>
@@ -4865,10 +4993,324 @@
           <a:chExt cx="0" cy="0"/>
         </a:xfrm>
       </p:grpSpPr>
+      <p:pic>
+        <p:nvPicPr>
+          <p:cNvPr id="3074" name="Picture 2" descr="C:\Users\Bob Gorman\AppData\Local\Skitch\Screenshot_111415_031846_PM.jpg"/>
+          <p:cNvPicPr>
+            <a:picLocks noChangeAspect="1" noChangeArrowheads="1"/>
+          </p:cNvPicPr>
+          <p:nvPr/>
+        </p:nvPicPr>
+        <p:blipFill>
+          <a:blip r:embed="rId2">
+            <a:extLst>
+              <a:ext uri="{28A0092B-C50C-407E-A947-70E740481C1C}">
+                <a14:useLocalDpi xmlns:a14="http://schemas.microsoft.com/office/drawing/2010/main" val="0"/>
+              </a:ext>
+            </a:extLst>
+          </a:blip>
+          <a:srcRect/>
+          <a:stretch>
+            <a:fillRect/>
+          </a:stretch>
+        </p:blipFill>
+        <p:spPr bwMode="auto">
+          <a:xfrm>
+            <a:off x="1371600" y="609600"/>
+            <a:ext cx="6399063" cy="5018574"/>
+          </a:xfrm>
+          <a:prstGeom prst="rect">
+            <a:avLst/>
+          </a:prstGeom>
+          <a:noFill/>
+          <a:extLst>
+            <a:ext uri="{909E8E84-426E-40DD-AFC4-6F175D3DCCD1}">
+              <a14:hiddenFill xmlns:a14="http://schemas.microsoft.com/office/drawing/2010/main">
+                <a:solidFill>
+                  <a:srgbClr val="FFFFFF"/>
+                </a:solidFill>
+              </a14:hiddenFill>
+            </a:ext>
+          </a:extLst>
+        </p:spPr>
+      </p:pic>
+    </p:spTree>
+    <p:extLst>
+      <p:ext uri="{BB962C8B-B14F-4D97-AF65-F5344CB8AC3E}">
+        <p14:creationId xmlns:p14="http://schemas.microsoft.com/office/powerpoint/2010/main" val="2556506866"/>
+      </p:ext>
+    </p:extLst>
+  </p:cSld>
+  <p:clrMapOvr>
+    <a:masterClrMapping/>
+  </p:clrMapOvr>
+</p:sld>
+</file>
+
+<file path=ppt/slides/slide31.xml><?xml version="1.0" encoding="utf-8"?>
+<p:sld xmlns:a="http://schemas.openxmlformats.org/drawingml/2006/main" xmlns:r="http://schemas.openxmlformats.org/officeDocument/2006/relationships" xmlns:p="http://schemas.openxmlformats.org/presentationml/2006/main">
+  <p:cSld>
+    <p:spTree>
+      <p:nvGrpSpPr>
+        <p:cNvPr id="1" name=""/>
+        <p:cNvGrpSpPr/>
+        <p:nvPr/>
+      </p:nvGrpSpPr>
+      <p:grpSpPr>
+        <a:xfrm>
+          <a:off x="0" y="0"/>
+          <a:ext cx="0" cy="0"/>
+          <a:chOff x="0" y="0"/>
+          <a:chExt cx="0" cy="0"/>
+        </a:xfrm>
+      </p:grpSpPr>
+      <p:pic>
+        <p:nvPicPr>
+          <p:cNvPr id="6146" name="Picture 2" descr="C:\Users\Bob Gorman\AppData\Local\Skitch\Screenshot_111415_032330_PM.jpg"/>
+          <p:cNvPicPr>
+            <a:picLocks noChangeAspect="1" noChangeArrowheads="1"/>
+          </p:cNvPicPr>
+          <p:nvPr/>
+        </p:nvPicPr>
+        <p:blipFill>
+          <a:blip r:embed="rId2">
+            <a:extLst>
+              <a:ext uri="{28A0092B-C50C-407E-A947-70E740481C1C}">
+                <a14:useLocalDpi xmlns:a14="http://schemas.microsoft.com/office/drawing/2010/main" val="0"/>
+              </a:ext>
+            </a:extLst>
+          </a:blip>
+          <a:srcRect/>
+          <a:stretch>
+            <a:fillRect/>
+          </a:stretch>
+        </p:blipFill>
+        <p:spPr bwMode="auto">
+          <a:xfrm rot="5400000">
+            <a:off x="2489102" y="330298"/>
+            <a:ext cx="4394395" cy="4800600"/>
+          </a:xfrm>
+          <a:prstGeom prst="rect">
+            <a:avLst/>
+          </a:prstGeom>
+          <a:noFill/>
+          <a:extLst>
+            <a:ext uri="{909E8E84-426E-40DD-AFC4-6F175D3DCCD1}">
+              <a14:hiddenFill xmlns:a14="http://schemas.microsoft.com/office/drawing/2010/main">
+                <a:solidFill>
+                  <a:srgbClr val="FFFFFF"/>
+                </a:solidFill>
+              </a14:hiddenFill>
+            </a:ext>
+          </a:extLst>
+        </p:spPr>
+      </p:pic>
+    </p:spTree>
+    <p:extLst>
+      <p:ext uri="{BB962C8B-B14F-4D97-AF65-F5344CB8AC3E}">
+        <p14:creationId xmlns:p14="http://schemas.microsoft.com/office/powerpoint/2010/main" val="2668983980"/>
+      </p:ext>
+    </p:extLst>
+  </p:cSld>
+  <p:clrMapOvr>
+    <a:masterClrMapping/>
+  </p:clrMapOvr>
+</p:sld>
+</file>
+
+<file path=ppt/slides/slide32.xml><?xml version="1.0" encoding="utf-8"?>
+<p:sld xmlns:a="http://schemas.openxmlformats.org/drawingml/2006/main" xmlns:r="http://schemas.openxmlformats.org/officeDocument/2006/relationships" xmlns:p="http://schemas.openxmlformats.org/presentationml/2006/main">
+  <p:cSld>
+    <p:spTree>
+      <p:nvGrpSpPr>
+        <p:cNvPr id="1" name=""/>
+        <p:cNvGrpSpPr/>
+        <p:nvPr/>
+      </p:nvGrpSpPr>
+      <p:grpSpPr>
+        <a:xfrm>
+          <a:off x="0" y="0"/>
+          <a:ext cx="0" cy="0"/>
+          <a:chOff x="0" y="0"/>
+          <a:chExt cx="0" cy="0"/>
+        </a:xfrm>
+      </p:grpSpPr>
+      <p:pic>
+        <p:nvPicPr>
+          <p:cNvPr id="4098" name="Picture 2" descr="C:\Users\Bob Gorman\AppData\Local\Skitch\Screenshot_111415_032102_PM.jpg"/>
+          <p:cNvPicPr>
+            <a:picLocks noChangeAspect="1" noChangeArrowheads="1"/>
+          </p:cNvPicPr>
+          <p:nvPr/>
+        </p:nvPicPr>
+        <p:blipFill>
+          <a:blip r:embed="rId2">
+            <a:extLst>
+              <a:ext uri="{28A0092B-C50C-407E-A947-70E740481C1C}">
+                <a14:useLocalDpi xmlns:a14="http://schemas.microsoft.com/office/drawing/2010/main" val="0"/>
+              </a:ext>
+            </a:extLst>
+          </a:blip>
+          <a:srcRect/>
+          <a:stretch>
+            <a:fillRect/>
+          </a:stretch>
+        </p:blipFill>
+        <p:spPr bwMode="auto">
+          <a:xfrm>
+            <a:off x="1908175" y="1339850"/>
+            <a:ext cx="5327650" cy="4178300"/>
+          </a:xfrm>
+          <a:prstGeom prst="rect">
+            <a:avLst/>
+          </a:prstGeom>
+          <a:noFill/>
+          <a:extLst>
+            <a:ext uri="{909E8E84-426E-40DD-AFC4-6F175D3DCCD1}">
+              <a14:hiddenFill xmlns:a14="http://schemas.microsoft.com/office/drawing/2010/main">
+                <a:solidFill>
+                  <a:srgbClr val="FFFFFF"/>
+                </a:solidFill>
+              </a14:hiddenFill>
+            </a:ext>
+          </a:extLst>
+        </p:spPr>
+      </p:pic>
     </p:spTree>
     <p:extLst>
       <p:ext uri="{BB962C8B-B14F-4D97-AF65-F5344CB8AC3E}">
         <p14:creationId xmlns:p14="http://schemas.microsoft.com/office/powerpoint/2010/main" val="3645053687"/>
+      </p:ext>
+    </p:extLst>
+  </p:cSld>
+  <p:clrMapOvr>
+    <a:masterClrMapping/>
+  </p:clrMapOvr>
+</p:sld>
+</file>
+
+<file path=ppt/slides/slide33.xml><?xml version="1.0" encoding="utf-8"?>
+<p:sld xmlns:a="http://schemas.openxmlformats.org/drawingml/2006/main" xmlns:r="http://schemas.openxmlformats.org/officeDocument/2006/relationships" xmlns:p="http://schemas.openxmlformats.org/presentationml/2006/main">
+  <p:cSld>
+    <p:spTree>
+      <p:nvGrpSpPr>
+        <p:cNvPr id="1" name=""/>
+        <p:cNvGrpSpPr/>
+        <p:nvPr/>
+      </p:nvGrpSpPr>
+      <p:grpSpPr>
+        <a:xfrm>
+          <a:off x="0" y="0"/>
+          <a:ext cx="0" cy="0"/>
+          <a:chOff x="0" y="0"/>
+          <a:chExt cx="0" cy="0"/>
+        </a:xfrm>
+      </p:grpSpPr>
+      <p:pic>
+        <p:nvPicPr>
+          <p:cNvPr id="7170" name="Picture 2" descr="C:\Users\Bob Gorman\AppData\Local\Skitch\Screenshot_111415_032421_PM.jpg"/>
+          <p:cNvPicPr>
+            <a:picLocks noChangeAspect="1" noChangeArrowheads="1"/>
+          </p:cNvPicPr>
+          <p:nvPr/>
+        </p:nvPicPr>
+        <p:blipFill>
+          <a:blip r:embed="rId2">
+            <a:extLst>
+              <a:ext uri="{28A0092B-C50C-407E-A947-70E740481C1C}">
+                <a14:useLocalDpi xmlns:a14="http://schemas.microsoft.com/office/drawing/2010/main" val="0"/>
+              </a:ext>
+            </a:extLst>
+          </a:blip>
+          <a:srcRect/>
+          <a:stretch>
+            <a:fillRect/>
+          </a:stretch>
+        </p:blipFill>
+        <p:spPr bwMode="auto">
+          <a:xfrm rot="5400000">
+            <a:off x="3140340" y="-186003"/>
+            <a:ext cx="2209800" cy="5325005"/>
+          </a:xfrm>
+          <a:prstGeom prst="rect">
+            <a:avLst/>
+          </a:prstGeom>
+          <a:noFill/>
+          <a:extLst>
+            <a:ext uri="{909E8E84-426E-40DD-AFC4-6F175D3DCCD1}">
+              <a14:hiddenFill xmlns:a14="http://schemas.microsoft.com/office/drawing/2010/main">
+                <a:solidFill>
+                  <a:srgbClr val="FFFFFF"/>
+                </a:solidFill>
+              </a14:hiddenFill>
+            </a:ext>
+          </a:extLst>
+        </p:spPr>
+      </p:pic>
+    </p:spTree>
+    <p:extLst>
+      <p:ext uri="{BB962C8B-B14F-4D97-AF65-F5344CB8AC3E}">
+        <p14:creationId xmlns:p14="http://schemas.microsoft.com/office/powerpoint/2010/main" val="2668983980"/>
+      </p:ext>
+    </p:extLst>
+  </p:cSld>
+  <p:clrMapOvr>
+    <a:masterClrMapping/>
+  </p:clrMapOvr>
+</p:sld>
+</file>
+
+<file path=ppt/slides/slide34.xml><?xml version="1.0" encoding="utf-8"?>
+<p:sld xmlns:a="http://schemas.openxmlformats.org/drawingml/2006/main" xmlns:r="http://schemas.openxmlformats.org/officeDocument/2006/relationships" xmlns:p="http://schemas.openxmlformats.org/presentationml/2006/main">
+  <p:cSld>
+    <p:spTree>
+      <p:nvGrpSpPr>
+        <p:cNvPr id="1" name=""/>
+        <p:cNvGrpSpPr/>
+        <p:nvPr/>
+      </p:nvGrpSpPr>
+      <p:grpSpPr>
+        <a:xfrm>
+          <a:off x="0" y="0"/>
+          <a:ext cx="0" cy="0"/>
+          <a:chOff x="0" y="0"/>
+          <a:chExt cx="0" cy="0"/>
+        </a:xfrm>
+      </p:grpSpPr>
+    </p:spTree>
+    <p:extLst>
+      <p:ext uri="{BB962C8B-B14F-4D97-AF65-F5344CB8AC3E}">
+        <p14:creationId xmlns:p14="http://schemas.microsoft.com/office/powerpoint/2010/main" val="2668983980"/>
+      </p:ext>
+    </p:extLst>
+  </p:cSld>
+  <p:clrMapOvr>
+    <a:masterClrMapping/>
+  </p:clrMapOvr>
+</p:sld>
+</file>
+
+<file path=ppt/slides/slide35.xml><?xml version="1.0" encoding="utf-8"?>
+<p:sld xmlns:a="http://schemas.openxmlformats.org/drawingml/2006/main" xmlns:r="http://schemas.openxmlformats.org/officeDocument/2006/relationships" xmlns:p="http://schemas.openxmlformats.org/presentationml/2006/main">
+  <p:cSld>
+    <p:spTree>
+      <p:nvGrpSpPr>
+        <p:cNvPr id="1" name=""/>
+        <p:cNvGrpSpPr/>
+        <p:nvPr/>
+      </p:nvGrpSpPr>
+      <p:grpSpPr>
+        <a:xfrm>
+          <a:off x="0" y="0"/>
+          <a:ext cx="0" cy="0"/>
+          <a:chOff x="0" y="0"/>
+          <a:chExt cx="0" cy="0"/>
+        </a:xfrm>
+      </p:grpSpPr>
+    </p:spTree>
+    <p:extLst>
+      <p:ext uri="{BB962C8B-B14F-4D97-AF65-F5344CB8AC3E}">
+        <p14:creationId xmlns:p14="http://schemas.microsoft.com/office/powerpoint/2010/main" val="2668983980"/>
       </p:ext>
     </p:extLst>
   </p:cSld>

</xml_diff>

<commit_message>
Z-score analysis of proiel data.
</commit_message>
<xml_diff>
--- a/SBL_talk/sbl_presentation.pptx
+++ b/SBL_talk/sbl_presentation.pptx
@@ -38,8 +38,13 @@
     <p:sldId id="307" r:id="rId32"/>
     <p:sldId id="273" r:id="rId33"/>
     <p:sldId id="302" r:id="rId34"/>
-    <p:sldId id="303" r:id="rId35"/>
-    <p:sldId id="304" r:id="rId36"/>
+    <p:sldId id="308" r:id="rId35"/>
+    <p:sldId id="303" r:id="rId36"/>
+    <p:sldId id="304" r:id="rId37"/>
+    <p:sldId id="309" r:id="rId38"/>
+    <p:sldId id="310" r:id="rId39"/>
+    <p:sldId id="311" r:id="rId40"/>
+    <p:sldId id="312" r:id="rId41"/>
   </p:sldIdLst>
   <p:sldSz cx="9144000" cy="6858000" type="screen4x3"/>
   <p:notesSz cx="6858000" cy="9144000"/>
@@ -322,7 +327,7 @@
           <a:p>
             <a:fld id="{AB94029E-6FCD-4D3D-AE41-24E942A5DE05}" type="datetimeFigureOut">
               <a:rPr lang="en-US" smtClean="0"/>
-              <a:t>11/14/2015</a:t>
+              <a:t>11/15/2015</a:t>
             </a:fld>
             <a:endParaRPr lang="en-US"/>
           </a:p>
@@ -492,7 +497,7 @@
           <a:p>
             <a:fld id="{AB94029E-6FCD-4D3D-AE41-24E942A5DE05}" type="datetimeFigureOut">
               <a:rPr lang="en-US" smtClean="0"/>
-              <a:t>11/14/2015</a:t>
+              <a:t>11/15/2015</a:t>
             </a:fld>
             <a:endParaRPr lang="en-US"/>
           </a:p>
@@ -672,7 +677,7 @@
           <a:p>
             <a:fld id="{AB94029E-6FCD-4D3D-AE41-24E942A5DE05}" type="datetimeFigureOut">
               <a:rPr lang="en-US" smtClean="0"/>
-              <a:t>11/14/2015</a:t>
+              <a:t>11/15/2015</a:t>
             </a:fld>
             <a:endParaRPr lang="en-US"/>
           </a:p>
@@ -842,7 +847,7 @@
           <a:p>
             <a:fld id="{AB94029E-6FCD-4D3D-AE41-24E942A5DE05}" type="datetimeFigureOut">
               <a:rPr lang="en-US" smtClean="0"/>
-              <a:t>11/14/2015</a:t>
+              <a:t>11/15/2015</a:t>
             </a:fld>
             <a:endParaRPr lang="en-US"/>
           </a:p>
@@ -1088,7 +1093,7 @@
           <a:p>
             <a:fld id="{AB94029E-6FCD-4D3D-AE41-24E942A5DE05}" type="datetimeFigureOut">
               <a:rPr lang="en-US" smtClean="0"/>
-              <a:t>11/14/2015</a:t>
+              <a:t>11/15/2015</a:t>
             </a:fld>
             <a:endParaRPr lang="en-US"/>
           </a:p>
@@ -1376,7 +1381,7 @@
           <a:p>
             <a:fld id="{AB94029E-6FCD-4D3D-AE41-24E942A5DE05}" type="datetimeFigureOut">
               <a:rPr lang="en-US" smtClean="0"/>
-              <a:t>11/14/2015</a:t>
+              <a:t>11/15/2015</a:t>
             </a:fld>
             <a:endParaRPr lang="en-US"/>
           </a:p>
@@ -1798,7 +1803,7 @@
           <a:p>
             <a:fld id="{AB94029E-6FCD-4D3D-AE41-24E942A5DE05}" type="datetimeFigureOut">
               <a:rPr lang="en-US" smtClean="0"/>
-              <a:t>11/14/2015</a:t>
+              <a:t>11/15/2015</a:t>
             </a:fld>
             <a:endParaRPr lang="en-US"/>
           </a:p>
@@ -1916,7 +1921,7 @@
           <a:p>
             <a:fld id="{AB94029E-6FCD-4D3D-AE41-24E942A5DE05}" type="datetimeFigureOut">
               <a:rPr lang="en-US" smtClean="0"/>
-              <a:t>11/14/2015</a:t>
+              <a:t>11/15/2015</a:t>
             </a:fld>
             <a:endParaRPr lang="en-US"/>
           </a:p>
@@ -2011,7 +2016,7 @@
           <a:p>
             <a:fld id="{AB94029E-6FCD-4D3D-AE41-24E942A5DE05}" type="datetimeFigureOut">
               <a:rPr lang="en-US" smtClean="0"/>
-              <a:t>11/14/2015</a:t>
+              <a:t>11/15/2015</a:t>
             </a:fld>
             <a:endParaRPr lang="en-US"/>
           </a:p>
@@ -2288,7 +2293,7 @@
           <a:p>
             <a:fld id="{AB94029E-6FCD-4D3D-AE41-24E942A5DE05}" type="datetimeFigureOut">
               <a:rPr lang="en-US" smtClean="0"/>
-              <a:t>11/14/2015</a:t>
+              <a:t>11/15/2015</a:t>
             </a:fld>
             <a:endParaRPr lang="en-US"/>
           </a:p>
@@ -2541,7 +2546,7 @@
           <a:p>
             <a:fld id="{AB94029E-6FCD-4D3D-AE41-24E942A5DE05}" type="datetimeFigureOut">
               <a:rPr lang="en-US" smtClean="0"/>
-              <a:t>11/14/2015</a:t>
+              <a:t>11/15/2015</a:t>
             </a:fld>
             <a:endParaRPr lang="en-US"/>
           </a:p>
@@ -2754,7 +2759,7 @@
           <a:p>
             <a:fld id="{AB94029E-6FCD-4D3D-AE41-24E942A5DE05}" type="datetimeFigureOut">
               <a:rPr lang="en-US" smtClean="0"/>
-              <a:t>11/14/2015</a:t>
+              <a:t>11/15/2015</a:t>
             </a:fld>
             <a:endParaRPr lang="en-US"/>
           </a:p>
@@ -5277,10 +5282,51 @@
           <a:chExt cx="0" cy="0"/>
         </a:xfrm>
       </p:grpSpPr>
+      <p:pic>
+        <p:nvPicPr>
+          <p:cNvPr id="8194" name="Picture 2" descr="C:\Users\Bob Gorman\AppData\Local\Skitch\Screenshot_111315_063925_PM.jpg"/>
+          <p:cNvPicPr>
+            <a:picLocks noChangeAspect="1" noChangeArrowheads="1"/>
+          </p:cNvPicPr>
+          <p:nvPr/>
+        </p:nvPicPr>
+        <p:blipFill>
+          <a:blip r:embed="rId2">
+            <a:extLst>
+              <a:ext uri="{28A0092B-C50C-407E-A947-70E740481C1C}">
+                <a14:useLocalDpi xmlns:a14="http://schemas.microsoft.com/office/drawing/2010/main" val="0"/>
+              </a:ext>
+            </a:extLst>
+          </a:blip>
+          <a:srcRect/>
+          <a:stretch>
+            <a:fillRect/>
+          </a:stretch>
+        </p:blipFill>
+        <p:spPr bwMode="auto">
+          <a:xfrm>
+            <a:off x="1007912" y="457200"/>
+            <a:ext cx="7145488" cy="5194184"/>
+          </a:xfrm>
+          <a:prstGeom prst="rect">
+            <a:avLst/>
+          </a:prstGeom>
+          <a:noFill/>
+          <a:extLst>
+            <a:ext uri="{909E8E84-426E-40DD-AFC4-6F175D3DCCD1}">
+              <a14:hiddenFill xmlns:a14="http://schemas.microsoft.com/office/drawing/2010/main">
+                <a:solidFill>
+                  <a:srgbClr val="FFFFFF"/>
+                </a:solidFill>
+              </a14:hiddenFill>
+            </a:ext>
+          </a:extLst>
+        </p:spPr>
+      </p:pic>
     </p:spTree>
     <p:extLst>
       <p:ext uri="{BB962C8B-B14F-4D97-AF65-F5344CB8AC3E}">
-        <p14:creationId xmlns:p14="http://schemas.microsoft.com/office/powerpoint/2010/main" val="2668983980"/>
+        <p14:creationId xmlns:p14="http://schemas.microsoft.com/office/powerpoint/2010/main" val="2855310279"/>
       </p:ext>
     </p:extLst>
   </p:cSld>
@@ -5307,6 +5353,47 @@
           <a:chExt cx="0" cy="0"/>
         </a:xfrm>
       </p:grpSpPr>
+      <p:pic>
+        <p:nvPicPr>
+          <p:cNvPr id="1026" name="Picture 2" descr="C:\Users\Bob Gorman\AppData\Local\Skitch\Screenshot_111515_013039_PM.jpg"/>
+          <p:cNvPicPr>
+            <a:picLocks noChangeAspect="1" noChangeArrowheads="1"/>
+          </p:cNvPicPr>
+          <p:nvPr/>
+        </p:nvPicPr>
+        <p:blipFill>
+          <a:blip r:embed="rId2">
+            <a:extLst>
+              <a:ext uri="{28A0092B-C50C-407E-A947-70E740481C1C}">
+                <a14:useLocalDpi xmlns:a14="http://schemas.microsoft.com/office/drawing/2010/main" val="0"/>
+              </a:ext>
+            </a:extLst>
+          </a:blip>
+          <a:srcRect/>
+          <a:stretch>
+            <a:fillRect/>
+          </a:stretch>
+        </p:blipFill>
+        <p:spPr bwMode="auto">
+          <a:xfrm>
+            <a:off x="609600" y="152400"/>
+            <a:ext cx="7571130" cy="5713078"/>
+          </a:xfrm>
+          <a:prstGeom prst="rect">
+            <a:avLst/>
+          </a:prstGeom>
+          <a:noFill/>
+          <a:extLst>
+            <a:ext uri="{909E8E84-426E-40DD-AFC4-6F175D3DCCD1}">
+              <a14:hiddenFill xmlns:a14="http://schemas.microsoft.com/office/drawing/2010/main">
+                <a:solidFill>
+                  <a:srgbClr val="FFFFFF"/>
+                </a:solidFill>
+              </a14:hiddenFill>
+            </a:ext>
+          </a:extLst>
+        </p:spPr>
+      </p:pic>
     </p:spTree>
     <p:extLst>
       <p:ext uri="{BB962C8B-B14F-4D97-AF65-F5344CB8AC3E}">
@@ -5317,6 +5404,581 @@
   <p:clrMapOvr>
     <a:masterClrMapping/>
   </p:clrMapOvr>
+  <p:timing>
+    <p:tnLst>
+      <p:par>
+        <p:cTn id="1" dur="indefinite" restart="never" nodeType="tmRoot"/>
+      </p:par>
+    </p:tnLst>
+  </p:timing>
+</p:sld>
+</file>
+
+<file path=ppt/slides/slide36.xml><?xml version="1.0" encoding="utf-8"?>
+<p:sld xmlns:a="http://schemas.openxmlformats.org/drawingml/2006/main" xmlns:r="http://schemas.openxmlformats.org/officeDocument/2006/relationships" xmlns:p="http://schemas.openxmlformats.org/presentationml/2006/main">
+  <p:cSld>
+    <p:spTree>
+      <p:nvGrpSpPr>
+        <p:cNvPr id="1" name=""/>
+        <p:cNvGrpSpPr/>
+        <p:nvPr/>
+      </p:nvGrpSpPr>
+      <p:grpSpPr>
+        <a:xfrm>
+          <a:off x="0" y="0"/>
+          <a:ext cx="0" cy="0"/>
+          <a:chOff x="0" y="0"/>
+          <a:chExt cx="0" cy="0"/>
+        </a:xfrm>
+      </p:grpSpPr>
+      <p:sp>
+        <p:nvSpPr>
+          <p:cNvPr id="2" name="TextBox 1"/>
+          <p:cNvSpPr txBox="1"/>
+          <p:nvPr/>
+        </p:nvSpPr>
+        <p:spPr>
+          <a:xfrm>
+            <a:off x="1371600" y="1600200"/>
+            <a:ext cx="7010400" cy="3539430"/>
+          </a:xfrm>
+          <a:prstGeom prst="rect">
+            <a:avLst/>
+          </a:prstGeom>
+          <a:noFill/>
+        </p:spPr>
+        <p:txBody>
+          <a:bodyPr wrap="square" rtlCol="0">
+            <a:spAutoFit/>
+          </a:bodyPr>
+          <a:lstStyle/>
+          <a:p>
+            <a:pPr algn="ctr"/>
+            <a:r>
+              <a:rPr lang="en-US" sz="2800" b="1" dirty="0"/>
+              <a:t>#-</a:t>
+            </a:r>
+            <a:r>
+              <a:rPr lang="en-US" sz="2800" b="1" dirty="0" err="1"/>
+              <a:t>pred</a:t>
+            </a:r>
+            <a:r>
+              <a:rPr lang="en-US" sz="2800" b="1" dirty="0"/>
+              <a:t>*v-*</a:t>
+            </a:r>
+            <a:r>
+              <a:rPr lang="en-US" sz="2800" b="1" dirty="0" err="1"/>
+              <a:t>obl</a:t>
+            </a:r>
+            <a:r>
+              <a:rPr lang="en-US" sz="2800" b="1" dirty="0"/>
+              <a:t>*pp</a:t>
+            </a:r>
+          </a:p>
+          <a:p>
+            <a:r>
+              <a:rPr lang="en-US" sz="2800" dirty="0" smtClean="0"/>
+              <a:t>Freq. Rank # 18 </a:t>
+            </a:r>
+          </a:p>
+          <a:p>
+            <a:pPr marL="285750" indent="-285750">
+              <a:buFont typeface="Arial" panose="020B0604020202020204" pitchFamily="34" charset="0"/>
+              <a:buChar char="•"/>
+            </a:pPr>
+            <a:r>
+              <a:rPr lang="en-US" sz="2800" dirty="0" smtClean="0"/>
+              <a:t>Gospels: 938 occurrences / 71,529 tokens</a:t>
+            </a:r>
+          </a:p>
+          <a:p>
+            <a:pPr marL="285750" indent="-285750">
+              <a:buFont typeface="Arial" panose="020B0604020202020204" pitchFamily="34" charset="0"/>
+              <a:buChar char="•"/>
+            </a:pPr>
+            <a:r>
+              <a:rPr lang="en-US" sz="2800" dirty="0" smtClean="0"/>
+              <a:t>Others: 112 / 65,152</a:t>
+            </a:r>
+          </a:p>
+          <a:p>
+            <a:pPr marL="285750" indent="-285750">
+              <a:buFont typeface="Arial" panose="020B0604020202020204" pitchFamily="34" charset="0"/>
+              <a:buChar char="•"/>
+            </a:pPr>
+            <a:endParaRPr lang="en-US" sz="2800" dirty="0"/>
+          </a:p>
+          <a:p>
+            <a:r>
+              <a:rPr lang="en-US" sz="2800" dirty="0" smtClean="0"/>
+              <a:t>Frequency per #-</a:t>
+            </a:r>
+            <a:r>
+              <a:rPr lang="en-US" sz="2800" dirty="0" err="1" smtClean="0"/>
+              <a:t>pred</a:t>
+            </a:r>
+            <a:r>
+              <a:rPr lang="en-US" sz="2800" dirty="0" smtClean="0"/>
+              <a:t>*v-</a:t>
+            </a:r>
+          </a:p>
+          <a:p>
+            <a:pPr marL="457200" indent="-457200">
+              <a:buFont typeface="Arial" panose="020B0604020202020204" pitchFamily="34" charset="0"/>
+              <a:buChar char="•"/>
+            </a:pPr>
+            <a:r>
+              <a:rPr lang="en-US" sz="2800" dirty="0" smtClean="0"/>
+              <a:t>Gospels: 19.59%</a:t>
+            </a:r>
+          </a:p>
+          <a:p>
+            <a:pPr marL="457200" indent="-457200">
+              <a:buFont typeface="Arial" panose="020B0604020202020204" pitchFamily="34" charset="0"/>
+              <a:buChar char="•"/>
+            </a:pPr>
+            <a:r>
+              <a:rPr lang="en-US" sz="2800" dirty="0" smtClean="0"/>
+              <a:t>Others: 6.04%</a:t>
+            </a:r>
+            <a:endParaRPr lang="en-US" sz="2800" dirty="0"/>
+          </a:p>
+        </p:txBody>
+      </p:sp>
+    </p:spTree>
+    <p:extLst>
+      <p:ext uri="{BB962C8B-B14F-4D97-AF65-F5344CB8AC3E}">
+        <p14:creationId xmlns:p14="http://schemas.microsoft.com/office/powerpoint/2010/main" val="2668983980"/>
+      </p:ext>
+    </p:extLst>
+  </p:cSld>
+  <p:clrMapOvr>
+    <a:masterClrMapping/>
+  </p:clrMapOvr>
+  <p:timing>
+    <p:tnLst>
+      <p:par>
+        <p:cTn id="1" dur="indefinite" restart="never" nodeType="tmRoot"/>
+      </p:par>
+    </p:tnLst>
+  </p:timing>
+</p:sld>
+</file>
+
+<file path=ppt/slides/slide37.xml><?xml version="1.0" encoding="utf-8"?>
+<p:sld xmlns:a="http://schemas.openxmlformats.org/drawingml/2006/main" xmlns:r="http://schemas.openxmlformats.org/officeDocument/2006/relationships" xmlns:p="http://schemas.openxmlformats.org/presentationml/2006/main">
+  <p:cSld>
+    <p:spTree>
+      <p:nvGrpSpPr>
+        <p:cNvPr id="1" name=""/>
+        <p:cNvGrpSpPr/>
+        <p:nvPr/>
+      </p:nvGrpSpPr>
+      <p:grpSpPr>
+        <a:xfrm>
+          <a:off x="0" y="0"/>
+          <a:ext cx="0" cy="0"/>
+          <a:chOff x="0" y="0"/>
+          <a:chExt cx="0" cy="0"/>
+        </a:xfrm>
+      </p:grpSpPr>
+      <p:pic>
+        <p:nvPicPr>
+          <p:cNvPr id="2050" name="Picture 2" descr="C:\Users\Bob Gorman\AppData\Local\Skitch\Screenshot_111515_015442_PM.jpg"/>
+          <p:cNvPicPr>
+            <a:picLocks noChangeAspect="1" noChangeArrowheads="1"/>
+          </p:cNvPicPr>
+          <p:nvPr/>
+        </p:nvPicPr>
+        <p:blipFill>
+          <a:blip r:embed="rId2">
+            <a:extLst>
+              <a:ext uri="{28A0092B-C50C-407E-A947-70E740481C1C}">
+                <a14:useLocalDpi xmlns:a14="http://schemas.microsoft.com/office/drawing/2010/main" val="0"/>
+              </a:ext>
+            </a:extLst>
+          </a:blip>
+          <a:srcRect/>
+          <a:stretch>
+            <a:fillRect/>
+          </a:stretch>
+        </p:blipFill>
+        <p:spPr bwMode="auto">
+          <a:xfrm>
+            <a:off x="1143000" y="1143000"/>
+            <a:ext cx="6593541" cy="3967795"/>
+          </a:xfrm>
+          <a:prstGeom prst="rect">
+            <a:avLst/>
+          </a:prstGeom>
+          <a:noFill/>
+          <a:extLst>
+            <a:ext uri="{909E8E84-426E-40DD-AFC4-6F175D3DCCD1}">
+              <a14:hiddenFill xmlns:a14="http://schemas.microsoft.com/office/drawing/2010/main">
+                <a:solidFill>
+                  <a:srgbClr val="FFFFFF"/>
+                </a:solidFill>
+              </a14:hiddenFill>
+            </a:ext>
+          </a:extLst>
+        </p:spPr>
+      </p:pic>
+      <p:sp>
+        <p:nvSpPr>
+          <p:cNvPr id="3" name="Rectangle 2"/>
+          <p:cNvSpPr/>
+          <p:nvPr/>
+        </p:nvSpPr>
+        <p:spPr>
+          <a:xfrm>
+            <a:off x="2438400" y="354243"/>
+            <a:ext cx="3810000" cy="523220"/>
+          </a:xfrm>
+          <a:prstGeom prst="rect">
+            <a:avLst/>
+          </a:prstGeom>
+        </p:spPr>
+        <p:txBody>
+          <a:bodyPr wrap="square">
+            <a:spAutoFit/>
+          </a:bodyPr>
+          <a:lstStyle/>
+          <a:p>
+            <a:pPr algn="ctr"/>
+            <a:r>
+              <a:rPr lang="en-US" sz="2800" b="1" dirty="0"/>
+              <a:t>#-</a:t>
+            </a:r>
+            <a:r>
+              <a:rPr lang="en-US" sz="2800" b="1" dirty="0" err="1"/>
+              <a:t>pred</a:t>
+            </a:r>
+            <a:r>
+              <a:rPr lang="en-US" sz="2800" b="1" dirty="0"/>
+              <a:t>*v-*</a:t>
+            </a:r>
+            <a:r>
+              <a:rPr lang="en-US" sz="2800" b="1" dirty="0" err="1"/>
+              <a:t>obl</a:t>
+            </a:r>
+            <a:r>
+              <a:rPr lang="en-US" sz="2800" b="1" dirty="0"/>
+              <a:t>*pp</a:t>
+            </a:r>
+            <a:endParaRPr lang="en-US" sz="2800" b="1" dirty="0"/>
+          </a:p>
+        </p:txBody>
+      </p:sp>
+      <p:sp>
+        <p:nvSpPr>
+          <p:cNvPr id="4" name="Rectangle 3"/>
+          <p:cNvSpPr/>
+          <p:nvPr/>
+        </p:nvSpPr>
+        <p:spPr>
+          <a:xfrm>
+            <a:off x="1530790" y="5410199"/>
+            <a:ext cx="5625220" cy="461665"/>
+          </a:xfrm>
+          <a:prstGeom prst="rect">
+            <a:avLst/>
+          </a:prstGeom>
+        </p:spPr>
+        <p:txBody>
+          <a:bodyPr wrap="square">
+            <a:spAutoFit/>
+          </a:bodyPr>
+          <a:lstStyle/>
+          <a:p>
+            <a:r>
+              <a:rPr lang="en-US" sz="2400" dirty="0"/>
+              <a:t>Luke 1:7, καὶ </a:t>
+            </a:r>
+            <a:r>
+              <a:rPr lang="en-US" sz="2400" dirty="0" err="1"/>
+              <a:t>οὐκ</a:t>
+            </a:r>
+            <a:r>
+              <a:rPr lang="en-US" sz="2400" dirty="0"/>
+              <a:t> </a:t>
+            </a:r>
+            <a:r>
+              <a:rPr lang="en-US" sz="2400" dirty="0" err="1"/>
+              <a:t>ἦν</a:t>
+            </a:r>
+            <a:r>
+              <a:rPr lang="en-US" sz="2400" dirty="0"/>
+              <a:t> α</a:t>
+            </a:r>
+            <a:r>
+              <a:rPr lang="en-US" sz="2400" dirty="0" err="1"/>
+              <a:t>ὐτοῖς</a:t>
+            </a:r>
+            <a:r>
+              <a:rPr lang="en-US" sz="2400" dirty="0"/>
+              <a:t> </a:t>
+            </a:r>
+            <a:r>
+              <a:rPr lang="en-US" sz="2400" dirty="0" err="1"/>
+              <a:t>τέκνον</a:t>
+            </a:r>
+            <a:r>
+              <a:rPr lang="en-US" sz="2400" dirty="0"/>
+              <a:t>.</a:t>
+            </a:r>
+          </a:p>
+        </p:txBody>
+      </p:sp>
+    </p:spTree>
+    <p:extLst>
+      <p:ext uri="{BB962C8B-B14F-4D97-AF65-F5344CB8AC3E}">
+        <p14:creationId xmlns:p14="http://schemas.microsoft.com/office/powerpoint/2010/main" val="385875116"/>
+      </p:ext>
+    </p:extLst>
+  </p:cSld>
+  <p:clrMapOvr>
+    <a:masterClrMapping/>
+  </p:clrMapOvr>
+  <p:timing>
+    <p:tnLst>
+      <p:par>
+        <p:cTn id="1" dur="indefinite" restart="never" nodeType="tmRoot"/>
+      </p:par>
+    </p:tnLst>
+  </p:timing>
+</p:sld>
+</file>
+
+<file path=ppt/slides/slide38.xml><?xml version="1.0" encoding="utf-8"?>
+<p:sld xmlns:a="http://schemas.openxmlformats.org/drawingml/2006/main" xmlns:r="http://schemas.openxmlformats.org/officeDocument/2006/relationships" xmlns:p="http://schemas.openxmlformats.org/presentationml/2006/main">
+  <p:cSld>
+    <p:spTree>
+      <p:nvGrpSpPr>
+        <p:cNvPr id="1" name=""/>
+        <p:cNvGrpSpPr/>
+        <p:nvPr/>
+      </p:nvGrpSpPr>
+      <p:grpSpPr>
+        <a:xfrm>
+          <a:off x="0" y="0"/>
+          <a:ext cx="0" cy="0"/>
+          <a:chOff x="0" y="0"/>
+          <a:chExt cx="0" cy="0"/>
+        </a:xfrm>
+      </p:grpSpPr>
+      <p:pic>
+        <p:nvPicPr>
+          <p:cNvPr id="3074" name="Picture 2" descr="C:\Users\Bob Gorman\AppData\Local\Skitch\Screenshot_111515_020334_PM.jpg"/>
+          <p:cNvPicPr>
+            <a:picLocks noChangeAspect="1" noChangeArrowheads="1"/>
+          </p:cNvPicPr>
+          <p:nvPr/>
+        </p:nvPicPr>
+        <p:blipFill>
+          <a:blip r:embed="rId2">
+            <a:extLst>
+              <a:ext uri="{28A0092B-C50C-407E-A947-70E740481C1C}">
+                <a14:useLocalDpi xmlns:a14="http://schemas.microsoft.com/office/drawing/2010/main" val="0"/>
+              </a:ext>
+            </a:extLst>
+          </a:blip>
+          <a:srcRect/>
+          <a:stretch>
+            <a:fillRect/>
+          </a:stretch>
+        </p:blipFill>
+        <p:spPr bwMode="auto">
+          <a:xfrm>
+            <a:off x="2051742" y="855532"/>
+            <a:ext cx="5181600" cy="4524513"/>
+          </a:xfrm>
+          <a:prstGeom prst="rect">
+            <a:avLst/>
+          </a:prstGeom>
+          <a:noFill/>
+          <a:extLst>
+            <a:ext uri="{909E8E84-426E-40DD-AFC4-6F175D3DCCD1}">
+              <a14:hiddenFill xmlns:a14="http://schemas.microsoft.com/office/drawing/2010/main">
+                <a:solidFill>
+                  <a:srgbClr val="FFFFFF"/>
+                </a:solidFill>
+              </a14:hiddenFill>
+            </a:ext>
+          </a:extLst>
+        </p:spPr>
+      </p:pic>
+      <p:sp>
+        <p:nvSpPr>
+          <p:cNvPr id="4" name="Rectangle 3"/>
+          <p:cNvSpPr/>
+          <p:nvPr/>
+        </p:nvSpPr>
+        <p:spPr>
+          <a:xfrm>
+            <a:off x="2819400" y="332312"/>
+            <a:ext cx="3581400" cy="523220"/>
+          </a:xfrm>
+          <a:prstGeom prst="rect">
+            <a:avLst/>
+          </a:prstGeom>
+        </p:spPr>
+        <p:txBody>
+          <a:bodyPr wrap="square">
+            <a:spAutoFit/>
+          </a:bodyPr>
+          <a:lstStyle/>
+          <a:p>
+            <a:pPr algn="ctr"/>
+            <a:r>
+              <a:rPr lang="en-US" sz="2800" b="1" dirty="0"/>
+              <a:t>#-</a:t>
+            </a:r>
+            <a:r>
+              <a:rPr lang="en-US" sz="2800" b="1" dirty="0" err="1"/>
+              <a:t>pred</a:t>
+            </a:r>
+            <a:r>
+              <a:rPr lang="en-US" sz="2800" b="1" dirty="0"/>
+              <a:t>*v-*</a:t>
+            </a:r>
+            <a:r>
+              <a:rPr lang="en-US" sz="2800" b="1" dirty="0" err="1"/>
+              <a:t>obl</a:t>
+            </a:r>
+            <a:r>
+              <a:rPr lang="en-US" sz="2800" b="1" dirty="0"/>
+              <a:t>*pp</a:t>
+            </a:r>
+            <a:endParaRPr lang="en-US" sz="2800" b="1" dirty="0"/>
+          </a:p>
+        </p:txBody>
+      </p:sp>
+      <p:sp>
+        <p:nvSpPr>
+          <p:cNvPr id="5" name="Rectangle 4"/>
+          <p:cNvSpPr/>
+          <p:nvPr/>
+        </p:nvSpPr>
+        <p:spPr>
+          <a:xfrm>
+            <a:off x="1524000" y="5715000"/>
+            <a:ext cx="6396495" cy="523220"/>
+          </a:xfrm>
+          <a:prstGeom prst="rect">
+            <a:avLst/>
+          </a:prstGeom>
+        </p:spPr>
+        <p:txBody>
+          <a:bodyPr wrap="none">
+            <a:spAutoFit/>
+          </a:bodyPr>
+          <a:lstStyle/>
+          <a:p>
+            <a:r>
+              <a:rPr lang="en-US" sz="2800" dirty="0"/>
+              <a:t>Luke 1:11, </a:t>
+            </a:r>
+            <a:r>
+              <a:rPr lang="en-US" sz="2800" baseline="30000" dirty="0"/>
+              <a:t> </a:t>
+            </a:r>
+            <a:r>
+              <a:rPr lang="en-US" sz="2800" dirty="0" err="1"/>
+              <a:t>ὤφθη</a:t>
+            </a:r>
+            <a:r>
+              <a:rPr lang="en-US" sz="2800" dirty="0"/>
+              <a:t> </a:t>
+            </a:r>
+            <a:r>
+              <a:rPr lang="en-US" sz="2800" dirty="0" err="1"/>
+              <a:t>δὲ</a:t>
+            </a:r>
+            <a:r>
+              <a:rPr lang="en-US" sz="2800" dirty="0"/>
+              <a:t> α</a:t>
+            </a:r>
+            <a:r>
+              <a:rPr lang="en-US" sz="2800" dirty="0" err="1"/>
+              <a:t>ὐτῷ</a:t>
+            </a:r>
+            <a:r>
+              <a:rPr lang="en-US" sz="2800" dirty="0"/>
+              <a:t> </a:t>
+            </a:r>
+            <a:r>
+              <a:rPr lang="en-US" sz="2800" dirty="0" err="1"/>
+              <a:t>ἄγγελος</a:t>
+            </a:r>
+            <a:r>
+              <a:rPr lang="en-US" sz="2800" dirty="0"/>
+              <a:t> </a:t>
+            </a:r>
+            <a:r>
+              <a:rPr lang="en-US" sz="2800" dirty="0" err="1"/>
+              <a:t>κυρίου</a:t>
+            </a:r>
+            <a:r>
+              <a:rPr lang="en-US" dirty="0"/>
+              <a:t>.</a:t>
+            </a:r>
+          </a:p>
+        </p:txBody>
+      </p:sp>
+    </p:spTree>
+    <p:extLst>
+      <p:ext uri="{BB962C8B-B14F-4D97-AF65-F5344CB8AC3E}">
+        <p14:creationId xmlns:p14="http://schemas.microsoft.com/office/powerpoint/2010/main" val="385875116"/>
+      </p:ext>
+    </p:extLst>
+  </p:cSld>
+  <p:clrMapOvr>
+    <a:masterClrMapping/>
+  </p:clrMapOvr>
+  <p:timing>
+    <p:tnLst>
+      <p:par>
+        <p:cTn id="1" dur="indefinite" restart="never" nodeType="tmRoot"/>
+      </p:par>
+    </p:tnLst>
+  </p:timing>
+</p:sld>
+</file>
+
+<file path=ppt/slides/slide39.xml><?xml version="1.0" encoding="utf-8"?>
+<p:sld xmlns:a="http://schemas.openxmlformats.org/drawingml/2006/main" xmlns:r="http://schemas.openxmlformats.org/officeDocument/2006/relationships" xmlns:p="http://schemas.openxmlformats.org/presentationml/2006/main">
+  <p:cSld>
+    <p:spTree>
+      <p:nvGrpSpPr>
+        <p:cNvPr id="1" name=""/>
+        <p:cNvGrpSpPr/>
+        <p:nvPr/>
+      </p:nvGrpSpPr>
+      <p:grpSpPr>
+        <a:xfrm>
+          <a:off x="0" y="0"/>
+          <a:ext cx="0" cy="0"/>
+          <a:chOff x="0" y="0"/>
+          <a:chExt cx="0" cy="0"/>
+        </a:xfrm>
+      </p:grpSpPr>
+    </p:spTree>
+    <p:extLst>
+      <p:ext uri="{BB962C8B-B14F-4D97-AF65-F5344CB8AC3E}">
+        <p14:creationId xmlns:p14="http://schemas.microsoft.com/office/powerpoint/2010/main" val="385875116"/>
+      </p:ext>
+    </p:extLst>
+  </p:cSld>
+  <p:clrMapOvr>
+    <a:masterClrMapping/>
+  </p:clrMapOvr>
+  <p:timing>
+    <p:tnLst>
+      <p:par>
+        <p:cTn id="1" dur="indefinite" restart="never" nodeType="tmRoot"/>
+      </p:par>
+    </p:tnLst>
+  </p:timing>
 </p:sld>
 </file>
 
@@ -5341,6 +6003,36 @@
     <p:extLst>
       <p:ext uri="{BB962C8B-B14F-4D97-AF65-F5344CB8AC3E}">
         <p14:creationId xmlns:p14="http://schemas.microsoft.com/office/powerpoint/2010/main" val="953151465"/>
+      </p:ext>
+    </p:extLst>
+  </p:cSld>
+  <p:clrMapOvr>
+    <a:masterClrMapping/>
+  </p:clrMapOvr>
+</p:sld>
+</file>
+
+<file path=ppt/slides/slide40.xml><?xml version="1.0" encoding="utf-8"?>
+<p:sld xmlns:a="http://schemas.openxmlformats.org/drawingml/2006/main" xmlns:r="http://schemas.openxmlformats.org/officeDocument/2006/relationships" xmlns:p="http://schemas.openxmlformats.org/presentationml/2006/main">
+  <p:cSld>
+    <p:spTree>
+      <p:nvGrpSpPr>
+        <p:cNvPr id="1" name=""/>
+        <p:cNvGrpSpPr/>
+        <p:nvPr/>
+      </p:nvGrpSpPr>
+      <p:grpSpPr>
+        <a:xfrm>
+          <a:off x="0" y="0"/>
+          <a:ext cx="0" cy="0"/>
+          <a:chOff x="0" y="0"/>
+          <a:chExt cx="0" cy="0"/>
+        </a:xfrm>
+      </p:grpSpPr>
+    </p:spTree>
+    <p:extLst>
+      <p:ext uri="{BB962C8B-B14F-4D97-AF65-F5344CB8AC3E}">
+        <p14:creationId xmlns:p14="http://schemas.microsoft.com/office/powerpoint/2010/main" val="385875116"/>
       </p:ext>
     </p:extLst>
   </p:cSld>

</xml_diff>

<commit_message>
Analysis of proiel stats.
</commit_message>
<xml_diff>
--- a/SBL_talk/sbl_presentation.pptx
+++ b/SBL_talk/sbl_presentation.pptx
@@ -45,6 +45,11 @@
     <p:sldId id="310" r:id="rId39"/>
     <p:sldId id="311" r:id="rId40"/>
     <p:sldId id="312" r:id="rId41"/>
+    <p:sldId id="313" r:id="rId42"/>
+    <p:sldId id="314" r:id="rId43"/>
+    <p:sldId id="317" r:id="rId44"/>
+    <p:sldId id="315" r:id="rId45"/>
+    <p:sldId id="316" r:id="rId46"/>
   </p:sldIdLst>
   <p:sldSz cx="9144000" cy="6858000" type="screen4x3"/>
   <p:notesSz cx="6858000" cy="9144000"/>
@@ -5665,7 +5670,6 @@
               <a:rPr lang="en-US" sz="2800" b="1" dirty="0"/>
               <a:t>*pp</a:t>
             </a:r>
-            <a:endParaRPr lang="en-US" sz="2800" b="1" dirty="0"/>
           </a:p>
         </p:txBody>
       </p:sp>
@@ -5849,7 +5853,6 @@
               <a:rPr lang="en-US" sz="2800" b="1" dirty="0"/>
               <a:t>*pp</a:t>
             </a:r>
-            <a:endParaRPr lang="en-US" sz="2800" b="1" dirty="0"/>
           </a:p>
         </p:txBody>
       </p:sp>
@@ -5962,6 +5965,169 @@
           <a:chExt cx="0" cy="0"/>
         </a:xfrm>
       </p:grpSpPr>
+      <p:pic>
+        <p:nvPicPr>
+          <p:cNvPr id="1026" name="Picture 2" descr="C:\Users\Bob Gorman\AppData\Local\Skitch\Screenshot_111515_110506_PM.jpg"/>
+          <p:cNvPicPr>
+            <a:picLocks noChangeAspect="1" noChangeArrowheads="1"/>
+          </p:cNvPicPr>
+          <p:nvPr/>
+        </p:nvPicPr>
+        <p:blipFill>
+          <a:blip r:embed="rId2">
+            <a:extLst>
+              <a:ext uri="{28A0092B-C50C-407E-A947-70E740481C1C}">
+                <a14:useLocalDpi xmlns:a14="http://schemas.microsoft.com/office/drawing/2010/main" val="0"/>
+              </a:ext>
+            </a:extLst>
+          </a:blip>
+          <a:srcRect/>
+          <a:stretch>
+            <a:fillRect/>
+          </a:stretch>
+        </p:blipFill>
+        <p:spPr bwMode="auto">
+          <a:xfrm>
+            <a:off x="1828800" y="914400"/>
+            <a:ext cx="5067300" cy="4627789"/>
+          </a:xfrm>
+          <a:prstGeom prst="rect">
+            <a:avLst/>
+          </a:prstGeom>
+          <a:noFill/>
+          <a:extLst>
+            <a:ext uri="{909E8E84-426E-40DD-AFC4-6F175D3DCCD1}">
+              <a14:hiddenFill xmlns:a14="http://schemas.microsoft.com/office/drawing/2010/main">
+                <a:solidFill>
+                  <a:srgbClr val="FFFFFF"/>
+                </a:solidFill>
+              </a14:hiddenFill>
+            </a:ext>
+          </a:extLst>
+        </p:spPr>
+      </p:pic>
+      <p:sp>
+        <p:nvSpPr>
+          <p:cNvPr id="2" name="Rectangle 1"/>
+          <p:cNvSpPr/>
+          <p:nvPr/>
+        </p:nvSpPr>
+        <p:spPr>
+          <a:xfrm>
+            <a:off x="2209800" y="301720"/>
+            <a:ext cx="3962400" cy="461665"/>
+          </a:xfrm>
+          <a:prstGeom prst="rect">
+            <a:avLst/>
+          </a:prstGeom>
+        </p:spPr>
+        <p:txBody>
+          <a:bodyPr wrap="square">
+            <a:spAutoFit/>
+          </a:bodyPr>
+          <a:lstStyle/>
+          <a:p>
+            <a:pPr algn="ctr"/>
+            <a:r>
+              <a:rPr lang="en-US" sz="2400" b="1" dirty="0"/>
+              <a:t>#-</a:t>
+            </a:r>
+            <a:r>
+              <a:rPr lang="en-US" sz="2400" b="1" dirty="0" err="1"/>
+              <a:t>pred</a:t>
+            </a:r>
+            <a:r>
+              <a:rPr lang="en-US" sz="2400" b="1" dirty="0"/>
+              <a:t>*v-*</a:t>
+            </a:r>
+            <a:r>
+              <a:rPr lang="en-US" sz="2400" b="1" dirty="0" err="1"/>
+              <a:t>obl</a:t>
+            </a:r>
+            <a:r>
+              <a:rPr lang="en-US" sz="2400" b="1" dirty="0"/>
+              <a:t>*pp</a:t>
+            </a:r>
+            <a:endParaRPr lang="en-US" sz="2400" b="1" dirty="0"/>
+          </a:p>
+        </p:txBody>
+      </p:sp>
+      <p:sp>
+        <p:nvSpPr>
+          <p:cNvPr id="3" name="Rectangle 2"/>
+          <p:cNvSpPr/>
+          <p:nvPr/>
+        </p:nvSpPr>
+        <p:spPr>
+          <a:xfrm>
+            <a:off x="1524000" y="5867399"/>
+            <a:ext cx="5820577" cy="461665"/>
+          </a:xfrm>
+          <a:prstGeom prst="rect">
+            <a:avLst/>
+          </a:prstGeom>
+        </p:spPr>
+        <p:txBody>
+          <a:bodyPr wrap="square">
+            <a:spAutoFit/>
+          </a:bodyPr>
+          <a:lstStyle/>
+          <a:p>
+            <a:r>
+              <a:rPr lang="en-US" sz="2400" dirty="0"/>
+              <a:t>Luke 1:38, </a:t>
+            </a:r>
+            <a:r>
+              <a:rPr lang="en-US" sz="2400" dirty="0" err="1"/>
+              <a:t>γένοιτό</a:t>
+            </a:r>
+            <a:r>
+              <a:rPr lang="en-US" sz="2400" dirty="0"/>
+              <a:t> </a:t>
+            </a:r>
+            <a:r>
+              <a:rPr lang="en-US" sz="2400" dirty="0" err="1"/>
+              <a:t>μοι</a:t>
+            </a:r>
+            <a:r>
+              <a:rPr lang="en-US" sz="2400" dirty="0"/>
+              <a:t> κα</a:t>
+            </a:r>
+            <a:r>
+              <a:rPr lang="en-US" sz="2400" dirty="0" err="1"/>
+              <a:t>τὰ</a:t>
+            </a:r>
+            <a:r>
+              <a:rPr lang="en-US" sz="2400" dirty="0"/>
+              <a:t> </a:t>
+            </a:r>
+            <a:r>
+              <a:rPr lang="en-US" sz="2400" dirty="0" err="1"/>
+              <a:t>τὸ</a:t>
+            </a:r>
+            <a:r>
+              <a:rPr lang="en-US" sz="2400" dirty="0"/>
+              <a:t> </a:t>
+            </a:r>
+            <a:r>
+              <a:rPr lang="en-US" sz="2400" dirty="0" err="1"/>
+              <a:t>ῥῆμά</a:t>
+            </a:r>
+            <a:r>
+              <a:rPr lang="en-US" sz="2400" dirty="0"/>
+              <a:t> </a:t>
+            </a:r>
+            <a:r>
+              <a:rPr lang="en-US" sz="2400" dirty="0" err="1"/>
+              <a:t>σου</a:t>
+            </a:r>
+            <a:r>
+              <a:rPr lang="en-US" sz="2400" dirty="0"/>
+              <a:t>.</a:t>
+            </a:r>
+          </a:p>
+        </p:txBody>
+      </p:sp>
     </p:spTree>
     <p:extLst>
       <p:ext uri="{BB962C8B-B14F-4D97-AF65-F5344CB8AC3E}">
@@ -6029,10 +6195,544 @@
           <a:chExt cx="0" cy="0"/>
         </a:xfrm>
       </p:grpSpPr>
+      <p:pic>
+        <p:nvPicPr>
+          <p:cNvPr id="2050" name="Picture 2" descr="C:\Users\Bob Gorman\AppData\Local\Skitch\Screenshot_111515_115032_PM.jpg"/>
+          <p:cNvPicPr>
+            <a:picLocks noChangeAspect="1" noChangeArrowheads="1"/>
+          </p:cNvPicPr>
+          <p:nvPr/>
+        </p:nvPicPr>
+        <p:blipFill>
+          <a:blip r:embed="rId2">
+            <a:extLst>
+              <a:ext uri="{28A0092B-C50C-407E-A947-70E740481C1C}">
+                <a14:useLocalDpi xmlns:a14="http://schemas.microsoft.com/office/drawing/2010/main" val="0"/>
+              </a:ext>
+            </a:extLst>
+          </a:blip>
+          <a:srcRect/>
+          <a:stretch>
+            <a:fillRect/>
+          </a:stretch>
+        </p:blipFill>
+        <p:spPr bwMode="auto">
+          <a:xfrm>
+            <a:off x="304801" y="769544"/>
+            <a:ext cx="8476184" cy="4971840"/>
+          </a:xfrm>
+          <a:prstGeom prst="rect">
+            <a:avLst/>
+          </a:prstGeom>
+          <a:noFill/>
+          <a:extLst>
+            <a:ext uri="{909E8E84-426E-40DD-AFC4-6F175D3DCCD1}">
+              <a14:hiddenFill xmlns:a14="http://schemas.microsoft.com/office/drawing/2010/main">
+                <a:solidFill>
+                  <a:srgbClr val="FFFFFF"/>
+                </a:solidFill>
+              </a14:hiddenFill>
+            </a:ext>
+          </a:extLst>
+        </p:spPr>
+      </p:pic>
+      <p:sp>
+        <p:nvSpPr>
+          <p:cNvPr id="2" name="TextBox 1"/>
+          <p:cNvSpPr txBox="1"/>
+          <p:nvPr/>
+        </p:nvSpPr>
+        <p:spPr>
+          <a:xfrm>
+            <a:off x="2895600" y="238780"/>
+            <a:ext cx="3048000" cy="523220"/>
+          </a:xfrm>
+          <a:prstGeom prst="rect">
+            <a:avLst/>
+          </a:prstGeom>
+          <a:noFill/>
+        </p:spPr>
+        <p:txBody>
+          <a:bodyPr wrap="square" rtlCol="0">
+            <a:spAutoFit/>
+          </a:bodyPr>
+          <a:lstStyle/>
+          <a:p>
+            <a:r>
+              <a:rPr lang="en-US" sz="2800" dirty="0" smtClean="0"/>
+              <a:t>Polybius 1.7</a:t>
+            </a:r>
+            <a:endParaRPr lang="en-US" sz="2800" dirty="0"/>
+          </a:p>
+        </p:txBody>
+      </p:sp>
     </p:spTree>
     <p:extLst>
       <p:ext uri="{BB962C8B-B14F-4D97-AF65-F5344CB8AC3E}">
         <p14:creationId xmlns:p14="http://schemas.microsoft.com/office/powerpoint/2010/main" val="385875116"/>
+      </p:ext>
+    </p:extLst>
+  </p:cSld>
+  <p:clrMapOvr>
+    <a:masterClrMapping/>
+  </p:clrMapOvr>
+</p:sld>
+</file>
+
+<file path=ppt/slides/slide41.xml><?xml version="1.0" encoding="utf-8"?>
+<p:sld xmlns:a="http://schemas.openxmlformats.org/drawingml/2006/main" xmlns:r="http://schemas.openxmlformats.org/officeDocument/2006/relationships" xmlns:p="http://schemas.openxmlformats.org/presentationml/2006/main">
+  <p:cSld>
+    <p:spTree>
+      <p:nvGrpSpPr>
+        <p:cNvPr id="1" name=""/>
+        <p:cNvGrpSpPr/>
+        <p:nvPr/>
+      </p:nvGrpSpPr>
+      <p:grpSpPr>
+        <a:xfrm>
+          <a:off x="0" y="0"/>
+          <a:ext cx="0" cy="0"/>
+          <a:chOff x="0" y="0"/>
+          <a:chExt cx="0" cy="0"/>
+        </a:xfrm>
+      </p:grpSpPr>
+      <p:pic>
+        <p:nvPicPr>
+          <p:cNvPr id="3074" name="Picture 2" descr="C:\Users\Bob Gorman\AppData\Local\Skitch\Screenshot_111615_120017_AM.jpg"/>
+          <p:cNvPicPr>
+            <a:picLocks noChangeAspect="1" noChangeArrowheads="1"/>
+          </p:cNvPicPr>
+          <p:nvPr/>
+        </p:nvPicPr>
+        <p:blipFill>
+          <a:blip r:embed="rId2">
+            <a:extLst>
+              <a:ext uri="{28A0092B-C50C-407E-A947-70E740481C1C}">
+                <a14:useLocalDpi xmlns:a14="http://schemas.microsoft.com/office/drawing/2010/main" val="0"/>
+              </a:ext>
+            </a:extLst>
+          </a:blip>
+          <a:srcRect/>
+          <a:stretch>
+            <a:fillRect/>
+          </a:stretch>
+        </p:blipFill>
+        <p:spPr bwMode="auto">
+          <a:xfrm>
+            <a:off x="1524000" y="1143000"/>
+            <a:ext cx="6248399" cy="4614455"/>
+          </a:xfrm>
+          <a:prstGeom prst="rect">
+            <a:avLst/>
+          </a:prstGeom>
+          <a:noFill/>
+          <a:extLst>
+            <a:ext uri="{909E8E84-426E-40DD-AFC4-6F175D3DCCD1}">
+              <a14:hiddenFill xmlns:a14="http://schemas.microsoft.com/office/drawing/2010/main">
+                <a:solidFill>
+                  <a:srgbClr val="FFFFFF"/>
+                </a:solidFill>
+              </a14:hiddenFill>
+            </a:ext>
+          </a:extLst>
+        </p:spPr>
+      </p:pic>
+      <p:pic>
+        <p:nvPicPr>
+          <p:cNvPr id="3075" name="Picture 3" descr="C:\Users\Bob Gorman\AppData\Local\Skitch\Screenshot_111615_120158_AM.jpg"/>
+          <p:cNvPicPr>
+            <a:picLocks noChangeAspect="1" noChangeArrowheads="1"/>
+          </p:cNvPicPr>
+          <p:nvPr/>
+        </p:nvPicPr>
+        <p:blipFill>
+          <a:blip r:embed="rId3">
+            <a:extLst>
+              <a:ext uri="{28A0092B-C50C-407E-A947-70E740481C1C}">
+                <a14:useLocalDpi xmlns:a14="http://schemas.microsoft.com/office/drawing/2010/main" val="0"/>
+              </a:ext>
+            </a:extLst>
+          </a:blip>
+          <a:srcRect/>
+          <a:stretch>
+            <a:fillRect/>
+          </a:stretch>
+        </p:blipFill>
+        <p:spPr bwMode="auto">
+          <a:xfrm>
+            <a:off x="304801" y="398968"/>
+            <a:ext cx="8763000" cy="591631"/>
+          </a:xfrm>
+          <a:prstGeom prst="rect">
+            <a:avLst/>
+          </a:prstGeom>
+          <a:noFill/>
+          <a:extLst>
+            <a:ext uri="{909E8E84-426E-40DD-AFC4-6F175D3DCCD1}">
+              <a14:hiddenFill xmlns:a14="http://schemas.microsoft.com/office/drawing/2010/main">
+                <a:solidFill>
+                  <a:srgbClr val="FFFFFF"/>
+                </a:solidFill>
+              </a14:hiddenFill>
+            </a:ext>
+          </a:extLst>
+        </p:spPr>
+      </p:pic>
+      <p:sp>
+        <p:nvSpPr>
+          <p:cNvPr id="2" name="TextBox 1"/>
+          <p:cNvSpPr txBox="1"/>
+          <p:nvPr/>
+        </p:nvSpPr>
+        <p:spPr>
+          <a:xfrm>
+            <a:off x="3276600" y="5905925"/>
+            <a:ext cx="3276600" cy="523220"/>
+          </a:xfrm>
+          <a:prstGeom prst="rect">
+            <a:avLst/>
+          </a:prstGeom>
+          <a:noFill/>
+        </p:spPr>
+        <p:txBody>
+          <a:bodyPr wrap="square" rtlCol="0">
+            <a:spAutoFit/>
+          </a:bodyPr>
+          <a:lstStyle/>
+          <a:p>
+            <a:r>
+              <a:rPr lang="en-US" sz="2800" dirty="0" smtClean="0"/>
+              <a:t>#-</a:t>
+            </a:r>
+            <a:r>
+              <a:rPr lang="en-US" sz="2800" dirty="0" err="1" smtClean="0"/>
+              <a:t>pred</a:t>
+            </a:r>
+            <a:r>
+              <a:rPr lang="en-US" sz="2800" dirty="0" smtClean="0"/>
+              <a:t>-v-</a:t>
+            </a:r>
+            <a:r>
+              <a:rPr lang="en-US" sz="2800" dirty="0" err="1" smtClean="0"/>
+              <a:t>adv</a:t>
+            </a:r>
+            <a:r>
+              <a:rPr lang="en-US" sz="2800" dirty="0" smtClean="0"/>
+              <a:t>-v-</a:t>
+            </a:r>
+            <a:r>
+              <a:rPr lang="en-US" sz="2800" dirty="0" err="1" smtClean="0"/>
+              <a:t>auxp</a:t>
+            </a:r>
+            <a:endParaRPr lang="en-US" sz="2800" dirty="0"/>
+          </a:p>
+        </p:txBody>
+      </p:sp>
+    </p:spTree>
+    <p:extLst>
+      <p:ext uri="{BB962C8B-B14F-4D97-AF65-F5344CB8AC3E}">
+        <p14:creationId xmlns:p14="http://schemas.microsoft.com/office/powerpoint/2010/main" val="359706117"/>
+      </p:ext>
+    </p:extLst>
+  </p:cSld>
+  <p:clrMapOvr>
+    <a:masterClrMapping/>
+  </p:clrMapOvr>
+</p:sld>
+</file>
+
+<file path=ppt/slides/slide42.xml><?xml version="1.0" encoding="utf-8"?>
+<p:sld xmlns:a="http://schemas.openxmlformats.org/drawingml/2006/main" xmlns:r="http://schemas.openxmlformats.org/officeDocument/2006/relationships" xmlns:p="http://schemas.openxmlformats.org/presentationml/2006/main">
+  <p:cSld>
+    <p:spTree>
+      <p:nvGrpSpPr>
+        <p:cNvPr id="1" name=""/>
+        <p:cNvGrpSpPr/>
+        <p:nvPr/>
+      </p:nvGrpSpPr>
+      <p:grpSpPr>
+        <a:xfrm>
+          <a:off x="0" y="0"/>
+          <a:ext cx="0" cy="0"/>
+          <a:chOff x="0" y="0"/>
+          <a:chExt cx="0" cy="0"/>
+        </a:xfrm>
+      </p:grpSpPr>
+      <p:sp>
+        <p:nvSpPr>
+          <p:cNvPr id="2" name="Rectangle 1"/>
+          <p:cNvSpPr/>
+          <p:nvPr/>
+        </p:nvSpPr>
+        <p:spPr>
+          <a:xfrm>
+            <a:off x="2590800" y="914400"/>
+            <a:ext cx="3145476" cy="523220"/>
+          </a:xfrm>
+          <a:prstGeom prst="rect">
+            <a:avLst/>
+          </a:prstGeom>
+        </p:spPr>
+        <p:txBody>
+          <a:bodyPr wrap="none">
+            <a:spAutoFit/>
+          </a:bodyPr>
+          <a:lstStyle/>
+          <a:p>
+            <a:pPr lvl="0"/>
+            <a:r>
+              <a:rPr lang="en-US" sz="2800" dirty="0">
+                <a:solidFill>
+                  <a:prstClr val="black"/>
+                </a:solidFill>
+              </a:rPr>
+              <a:t>#-</a:t>
+            </a:r>
+            <a:r>
+              <a:rPr lang="en-US" sz="2800" dirty="0" err="1">
+                <a:solidFill>
+                  <a:prstClr val="black"/>
+                </a:solidFill>
+              </a:rPr>
+              <a:t>pred</a:t>
+            </a:r>
+            <a:r>
+              <a:rPr lang="en-US" sz="2800" dirty="0">
+                <a:solidFill>
+                  <a:prstClr val="black"/>
+                </a:solidFill>
+              </a:rPr>
+              <a:t>-v-</a:t>
+            </a:r>
+            <a:r>
+              <a:rPr lang="en-US" sz="2800" dirty="0" err="1">
+                <a:solidFill>
+                  <a:prstClr val="black"/>
+                </a:solidFill>
+              </a:rPr>
+              <a:t>adv</a:t>
+            </a:r>
+            <a:r>
+              <a:rPr lang="en-US" sz="2800" dirty="0">
+                <a:solidFill>
+                  <a:prstClr val="black"/>
+                </a:solidFill>
+              </a:rPr>
+              <a:t>-v-</a:t>
+            </a:r>
+            <a:r>
+              <a:rPr lang="en-US" sz="2800" dirty="0" err="1">
+                <a:solidFill>
+                  <a:prstClr val="black"/>
+                </a:solidFill>
+              </a:rPr>
+              <a:t>auxp</a:t>
+            </a:r>
+            <a:endParaRPr lang="en-US" sz="2800" dirty="0">
+              <a:solidFill>
+                <a:prstClr val="black"/>
+              </a:solidFill>
+            </a:endParaRPr>
+          </a:p>
+        </p:txBody>
+      </p:sp>
+      <p:sp>
+        <p:nvSpPr>
+          <p:cNvPr id="3" name="TextBox 2"/>
+          <p:cNvSpPr txBox="1"/>
+          <p:nvPr/>
+        </p:nvSpPr>
+        <p:spPr>
+          <a:xfrm>
+            <a:off x="914400" y="1828800"/>
+            <a:ext cx="7696200" cy="4832092"/>
+          </a:xfrm>
+          <a:prstGeom prst="rect">
+            <a:avLst/>
+          </a:prstGeom>
+          <a:noFill/>
+        </p:spPr>
+        <p:txBody>
+          <a:bodyPr wrap="square" rtlCol="0">
+            <a:spAutoFit/>
+          </a:bodyPr>
+          <a:lstStyle/>
+          <a:p>
+            <a:r>
+              <a:rPr lang="en-US" sz="2800" dirty="0" smtClean="0"/>
+              <a:t>Representative of “heavy” circumstantial participle</a:t>
+            </a:r>
+            <a:br>
+              <a:rPr lang="en-US" sz="2800" dirty="0" smtClean="0"/>
+            </a:br>
+            <a:endParaRPr lang="en-US" sz="2800" dirty="0" smtClean="0"/>
+          </a:p>
+          <a:p>
+            <a:r>
+              <a:rPr lang="en-US" sz="2800" dirty="0" smtClean="0"/>
+              <a:t>Distinctive of historical prose, e.g.:</a:t>
+            </a:r>
+          </a:p>
+          <a:p>
+            <a:pPr marL="457200" indent="-457200">
+              <a:buFont typeface="Arial" panose="020B0604020202020204" pitchFamily="34" charset="0"/>
+              <a:buChar char="•"/>
+            </a:pPr>
+            <a:r>
+              <a:rPr lang="en-US" sz="2800" dirty="0" smtClean="0"/>
+              <a:t>Polybius 1: frequency = 24.9% of #-</a:t>
+            </a:r>
+            <a:r>
+              <a:rPr lang="en-US" sz="2800" dirty="0" err="1" smtClean="0"/>
+              <a:t>pred</a:t>
+            </a:r>
+            <a:r>
+              <a:rPr lang="en-US" sz="2800" dirty="0" smtClean="0"/>
+              <a:t>-v</a:t>
+            </a:r>
+            <a:br>
+              <a:rPr lang="en-US" sz="2800" dirty="0" smtClean="0"/>
+            </a:br>
+            <a:r>
+              <a:rPr lang="en-US" sz="2800" dirty="0" smtClean="0"/>
+              <a:t>(178 times / 26,894 tokens)</a:t>
+            </a:r>
+            <a:br>
+              <a:rPr lang="en-US" sz="2800" dirty="0" smtClean="0"/>
+            </a:br>
+            <a:endParaRPr lang="en-US" sz="2800" dirty="0" smtClean="0"/>
+          </a:p>
+          <a:p>
+            <a:pPr marL="457200" indent="-457200">
+              <a:buFont typeface="Arial" panose="020B0604020202020204" pitchFamily="34" charset="0"/>
+              <a:buChar char="•"/>
+            </a:pPr>
+            <a:r>
+              <a:rPr lang="en-US" sz="2800" dirty="0" smtClean="0"/>
+              <a:t>Aeschylus: frequency = 3% of #-</a:t>
+            </a:r>
+            <a:r>
+              <a:rPr lang="en-US" sz="2800" dirty="0" err="1" smtClean="0"/>
+              <a:t>pred</a:t>
+            </a:r>
+            <a:r>
+              <a:rPr lang="en-US" sz="2800" smtClean="0"/>
+              <a:t>-v</a:t>
+            </a:r>
+            <a:br>
+              <a:rPr lang="en-US" sz="2800" smtClean="0"/>
+            </a:br>
+            <a:r>
+              <a:rPr lang="en-US" sz="2800" smtClean="0"/>
+              <a:t>(14 times / 45, 682 tokens)</a:t>
+            </a:r>
+            <a:endParaRPr lang="en-US" sz="2800" dirty="0" smtClean="0"/>
+          </a:p>
+          <a:p>
+            <a:endParaRPr lang="en-US" sz="2800" dirty="0"/>
+          </a:p>
+          <a:p>
+            <a:endParaRPr lang="en-US" sz="2800" dirty="0" smtClean="0"/>
+          </a:p>
+          <a:p>
+            <a:endParaRPr lang="en-US" sz="2800" dirty="0"/>
+          </a:p>
+        </p:txBody>
+      </p:sp>
+    </p:spTree>
+    <p:extLst>
+      <p:ext uri="{BB962C8B-B14F-4D97-AF65-F5344CB8AC3E}">
+        <p14:creationId xmlns:p14="http://schemas.microsoft.com/office/powerpoint/2010/main" val="359706117"/>
+      </p:ext>
+    </p:extLst>
+  </p:cSld>
+  <p:clrMapOvr>
+    <a:masterClrMapping/>
+  </p:clrMapOvr>
+</p:sld>
+</file>
+
+<file path=ppt/slides/slide43.xml><?xml version="1.0" encoding="utf-8"?>
+<p:sld xmlns:a="http://schemas.openxmlformats.org/drawingml/2006/main" xmlns:r="http://schemas.openxmlformats.org/officeDocument/2006/relationships" xmlns:p="http://schemas.openxmlformats.org/presentationml/2006/main">
+  <p:cSld>
+    <p:spTree>
+      <p:nvGrpSpPr>
+        <p:cNvPr id="1" name=""/>
+        <p:cNvGrpSpPr/>
+        <p:nvPr/>
+      </p:nvGrpSpPr>
+      <p:grpSpPr>
+        <a:xfrm>
+          <a:off x="0" y="0"/>
+          <a:ext cx="0" cy="0"/>
+          <a:chOff x="0" y="0"/>
+          <a:chExt cx="0" cy="0"/>
+        </a:xfrm>
+      </p:grpSpPr>
+    </p:spTree>
+    <p:extLst>
+      <p:ext uri="{BB962C8B-B14F-4D97-AF65-F5344CB8AC3E}">
+        <p14:creationId xmlns:p14="http://schemas.microsoft.com/office/powerpoint/2010/main" val="21488030"/>
+      </p:ext>
+    </p:extLst>
+  </p:cSld>
+  <p:clrMapOvr>
+    <a:masterClrMapping/>
+  </p:clrMapOvr>
+</p:sld>
+</file>
+
+<file path=ppt/slides/slide44.xml><?xml version="1.0" encoding="utf-8"?>
+<p:sld xmlns:a="http://schemas.openxmlformats.org/drawingml/2006/main" xmlns:r="http://schemas.openxmlformats.org/officeDocument/2006/relationships" xmlns:p="http://schemas.openxmlformats.org/presentationml/2006/main">
+  <p:cSld>
+    <p:spTree>
+      <p:nvGrpSpPr>
+        <p:cNvPr id="1" name=""/>
+        <p:cNvGrpSpPr/>
+        <p:nvPr/>
+      </p:nvGrpSpPr>
+      <p:grpSpPr>
+        <a:xfrm>
+          <a:off x="0" y="0"/>
+          <a:ext cx="0" cy="0"/>
+          <a:chOff x="0" y="0"/>
+          <a:chExt cx="0" cy="0"/>
+        </a:xfrm>
+      </p:grpSpPr>
+    </p:spTree>
+    <p:extLst>
+      <p:ext uri="{BB962C8B-B14F-4D97-AF65-F5344CB8AC3E}">
+        <p14:creationId xmlns:p14="http://schemas.microsoft.com/office/powerpoint/2010/main" val="21488030"/>
+      </p:ext>
+    </p:extLst>
+  </p:cSld>
+  <p:clrMapOvr>
+    <a:masterClrMapping/>
+  </p:clrMapOvr>
+</p:sld>
+</file>
+
+<file path=ppt/slides/slide45.xml><?xml version="1.0" encoding="utf-8"?>
+<p:sld xmlns:a="http://schemas.openxmlformats.org/drawingml/2006/main" xmlns:r="http://schemas.openxmlformats.org/officeDocument/2006/relationships" xmlns:p="http://schemas.openxmlformats.org/presentationml/2006/main">
+  <p:cSld>
+    <p:spTree>
+      <p:nvGrpSpPr>
+        <p:cNvPr id="1" name=""/>
+        <p:cNvGrpSpPr/>
+        <p:nvPr/>
+      </p:nvGrpSpPr>
+      <p:grpSpPr>
+        <a:xfrm>
+          <a:off x="0" y="0"/>
+          <a:ext cx="0" cy="0"/>
+          <a:chOff x="0" y="0"/>
+          <a:chExt cx="0" cy="0"/>
+        </a:xfrm>
+      </p:grpSpPr>
+    </p:spTree>
+    <p:extLst>
+      <p:ext uri="{BB962C8B-B14F-4D97-AF65-F5344CB8AC3E}">
+        <p14:creationId xmlns:p14="http://schemas.microsoft.com/office/powerpoint/2010/main" val="21488030"/>
       </p:ext>
     </p:extLst>
   </p:cSld>

</xml_diff>

<commit_message>
Stat files for rel sWords from PROIEL files.
</commit_message>
<xml_diff>
--- a/SBL_talk/sbl_presentation.pptx
+++ b/SBL_talk/sbl_presentation.pptx
@@ -29,27 +29,28 @@
     <p:sldId id="298" r:id="rId23"/>
     <p:sldId id="299" r:id="rId24"/>
     <p:sldId id="300" r:id="rId25"/>
-    <p:sldId id="292" r:id="rId26"/>
-    <p:sldId id="293" r:id="rId27"/>
-    <p:sldId id="294" r:id="rId28"/>
-    <p:sldId id="295" r:id="rId29"/>
-    <p:sldId id="306" r:id="rId30"/>
-    <p:sldId id="296" r:id="rId31"/>
-    <p:sldId id="307" r:id="rId32"/>
-    <p:sldId id="273" r:id="rId33"/>
-    <p:sldId id="302" r:id="rId34"/>
-    <p:sldId id="308" r:id="rId35"/>
-    <p:sldId id="303" r:id="rId36"/>
-    <p:sldId id="304" r:id="rId37"/>
-    <p:sldId id="309" r:id="rId38"/>
-    <p:sldId id="310" r:id="rId39"/>
-    <p:sldId id="311" r:id="rId40"/>
-    <p:sldId id="312" r:id="rId41"/>
-    <p:sldId id="313" r:id="rId42"/>
-    <p:sldId id="314" r:id="rId43"/>
-    <p:sldId id="317" r:id="rId44"/>
-    <p:sldId id="315" r:id="rId45"/>
-    <p:sldId id="316" r:id="rId46"/>
+    <p:sldId id="318" r:id="rId26"/>
+    <p:sldId id="292" r:id="rId27"/>
+    <p:sldId id="293" r:id="rId28"/>
+    <p:sldId id="294" r:id="rId29"/>
+    <p:sldId id="295" r:id="rId30"/>
+    <p:sldId id="306" r:id="rId31"/>
+    <p:sldId id="296" r:id="rId32"/>
+    <p:sldId id="307" r:id="rId33"/>
+    <p:sldId id="273" r:id="rId34"/>
+    <p:sldId id="302" r:id="rId35"/>
+    <p:sldId id="308" r:id="rId36"/>
+    <p:sldId id="303" r:id="rId37"/>
+    <p:sldId id="304" r:id="rId38"/>
+    <p:sldId id="309" r:id="rId39"/>
+    <p:sldId id="310" r:id="rId40"/>
+    <p:sldId id="311" r:id="rId41"/>
+    <p:sldId id="312" r:id="rId42"/>
+    <p:sldId id="313" r:id="rId43"/>
+    <p:sldId id="314" r:id="rId44"/>
+    <p:sldId id="317" r:id="rId45"/>
+    <p:sldId id="315" r:id="rId46"/>
+    <p:sldId id="316" r:id="rId47"/>
   </p:sldIdLst>
   <p:sldSz cx="9144000" cy="6858000" type="screen4x3"/>
   <p:notesSz cx="6858000" cy="9144000"/>
@@ -332,7 +333,7 @@
           <a:p>
             <a:fld id="{AB94029E-6FCD-4D3D-AE41-24E942A5DE05}" type="datetimeFigureOut">
               <a:rPr lang="en-US" smtClean="0"/>
-              <a:t>11/15/2015</a:t>
+              <a:t>11/16/2015</a:t>
             </a:fld>
             <a:endParaRPr lang="en-US"/>
           </a:p>
@@ -502,7 +503,7 @@
           <a:p>
             <a:fld id="{AB94029E-6FCD-4D3D-AE41-24E942A5DE05}" type="datetimeFigureOut">
               <a:rPr lang="en-US" smtClean="0"/>
-              <a:t>11/15/2015</a:t>
+              <a:t>11/16/2015</a:t>
             </a:fld>
             <a:endParaRPr lang="en-US"/>
           </a:p>
@@ -682,7 +683,7 @@
           <a:p>
             <a:fld id="{AB94029E-6FCD-4D3D-AE41-24E942A5DE05}" type="datetimeFigureOut">
               <a:rPr lang="en-US" smtClean="0"/>
-              <a:t>11/15/2015</a:t>
+              <a:t>11/16/2015</a:t>
             </a:fld>
             <a:endParaRPr lang="en-US"/>
           </a:p>
@@ -852,7 +853,7 @@
           <a:p>
             <a:fld id="{AB94029E-6FCD-4D3D-AE41-24E942A5DE05}" type="datetimeFigureOut">
               <a:rPr lang="en-US" smtClean="0"/>
-              <a:t>11/15/2015</a:t>
+              <a:t>11/16/2015</a:t>
             </a:fld>
             <a:endParaRPr lang="en-US"/>
           </a:p>
@@ -1098,7 +1099,7 @@
           <a:p>
             <a:fld id="{AB94029E-6FCD-4D3D-AE41-24E942A5DE05}" type="datetimeFigureOut">
               <a:rPr lang="en-US" smtClean="0"/>
-              <a:t>11/15/2015</a:t>
+              <a:t>11/16/2015</a:t>
             </a:fld>
             <a:endParaRPr lang="en-US"/>
           </a:p>
@@ -1386,7 +1387,7 @@
           <a:p>
             <a:fld id="{AB94029E-6FCD-4D3D-AE41-24E942A5DE05}" type="datetimeFigureOut">
               <a:rPr lang="en-US" smtClean="0"/>
-              <a:t>11/15/2015</a:t>
+              <a:t>11/16/2015</a:t>
             </a:fld>
             <a:endParaRPr lang="en-US"/>
           </a:p>
@@ -1808,7 +1809,7 @@
           <a:p>
             <a:fld id="{AB94029E-6FCD-4D3D-AE41-24E942A5DE05}" type="datetimeFigureOut">
               <a:rPr lang="en-US" smtClean="0"/>
-              <a:t>11/15/2015</a:t>
+              <a:t>11/16/2015</a:t>
             </a:fld>
             <a:endParaRPr lang="en-US"/>
           </a:p>
@@ -1926,7 +1927,7 @@
           <a:p>
             <a:fld id="{AB94029E-6FCD-4D3D-AE41-24E942A5DE05}" type="datetimeFigureOut">
               <a:rPr lang="en-US" smtClean="0"/>
-              <a:t>11/15/2015</a:t>
+              <a:t>11/16/2015</a:t>
             </a:fld>
             <a:endParaRPr lang="en-US"/>
           </a:p>
@@ -2021,7 +2022,7 @@
           <a:p>
             <a:fld id="{AB94029E-6FCD-4D3D-AE41-24E942A5DE05}" type="datetimeFigureOut">
               <a:rPr lang="en-US" smtClean="0"/>
-              <a:t>11/15/2015</a:t>
+              <a:t>11/16/2015</a:t>
             </a:fld>
             <a:endParaRPr lang="en-US"/>
           </a:p>
@@ -2298,7 +2299,7 @@
           <a:p>
             <a:fld id="{AB94029E-6FCD-4D3D-AE41-24E942A5DE05}" type="datetimeFigureOut">
               <a:rPr lang="en-US" smtClean="0"/>
-              <a:t>11/15/2015</a:t>
+              <a:t>11/16/2015</a:t>
             </a:fld>
             <a:endParaRPr lang="en-US"/>
           </a:p>
@@ -2551,7 +2552,7 @@
           <a:p>
             <a:fld id="{AB94029E-6FCD-4D3D-AE41-24E942A5DE05}" type="datetimeFigureOut">
               <a:rPr lang="en-US" smtClean="0"/>
-              <a:t>11/15/2015</a:t>
+              <a:t>11/16/2015</a:t>
             </a:fld>
             <a:endParaRPr lang="en-US"/>
           </a:p>
@@ -2764,7 +2765,7 @@
           <a:p>
             <a:fld id="{AB94029E-6FCD-4D3D-AE41-24E942A5DE05}" type="datetimeFigureOut">
               <a:rPr lang="en-US" smtClean="0"/>
-              <a:t>11/15/2015</a:t>
+              <a:t>11/16/2015</a:t>
             </a:fld>
             <a:endParaRPr lang="en-US"/>
           </a:p>
@@ -4620,6 +4621,77 @@
       </p:grpSpPr>
       <p:pic>
         <p:nvPicPr>
+          <p:cNvPr id="1026" name="Picture 2" descr="C:\Users\Bob Gorman\AppData\Local\Skitch\Screenshot_111615_090719_AM.jpg"/>
+          <p:cNvPicPr>
+            <a:picLocks noChangeAspect="1" noChangeArrowheads="1"/>
+          </p:cNvPicPr>
+          <p:nvPr/>
+        </p:nvPicPr>
+        <p:blipFill>
+          <a:blip r:embed="rId2">
+            <a:extLst>
+              <a:ext uri="{28A0092B-C50C-407E-A947-70E740481C1C}">
+                <a14:useLocalDpi xmlns:a14="http://schemas.microsoft.com/office/drawing/2010/main" val="0"/>
+              </a:ext>
+            </a:extLst>
+          </a:blip>
+          <a:srcRect/>
+          <a:stretch>
+            <a:fillRect/>
+          </a:stretch>
+        </p:blipFill>
+        <p:spPr bwMode="auto">
+          <a:xfrm>
+            <a:off x="0" y="1506352"/>
+            <a:ext cx="8839200" cy="1358425"/>
+          </a:xfrm>
+          <a:prstGeom prst="rect">
+            <a:avLst/>
+          </a:prstGeom>
+          <a:noFill/>
+          <a:extLst>
+            <a:ext uri="{909E8E84-426E-40DD-AFC4-6F175D3DCCD1}">
+              <a14:hiddenFill xmlns:a14="http://schemas.microsoft.com/office/drawing/2010/main">
+                <a:solidFill>
+                  <a:srgbClr val="FFFFFF"/>
+                </a:solidFill>
+              </a14:hiddenFill>
+            </a:ext>
+          </a:extLst>
+        </p:spPr>
+      </p:pic>
+    </p:spTree>
+    <p:extLst>
+      <p:ext uri="{BB962C8B-B14F-4D97-AF65-F5344CB8AC3E}">
+        <p14:creationId xmlns:p14="http://schemas.microsoft.com/office/powerpoint/2010/main" val="3730724125"/>
+      </p:ext>
+    </p:extLst>
+  </p:cSld>
+  <p:clrMapOvr>
+    <a:masterClrMapping/>
+  </p:clrMapOvr>
+</p:sld>
+</file>
+
+<file path=ppt/slides/slide26.xml><?xml version="1.0" encoding="utf-8"?>
+<p:sld xmlns:a="http://schemas.openxmlformats.org/drawingml/2006/main" xmlns:r="http://schemas.openxmlformats.org/officeDocument/2006/relationships" xmlns:p="http://schemas.openxmlformats.org/presentationml/2006/main">
+  <p:cSld>
+    <p:spTree>
+      <p:nvGrpSpPr>
+        <p:cNvPr id="1" name=""/>
+        <p:cNvGrpSpPr/>
+        <p:nvPr/>
+      </p:nvGrpSpPr>
+      <p:grpSpPr>
+        <a:xfrm>
+          <a:off x="0" y="0"/>
+          <a:ext cx="0" cy="0"/>
+          <a:chOff x="0" y="0"/>
+          <a:chExt cx="0" cy="0"/>
+        </a:xfrm>
+      </p:grpSpPr>
+      <p:pic>
+        <p:nvPicPr>
           <p:cNvPr id="7170" name="Picture 2" descr="C:\Users\Bob Gorman\AppData\Local\Skitch\Screenshot_111315_063818_PM.jpg"/>
           <p:cNvPicPr>
             <a:picLocks noChangeAspect="1" noChangeArrowheads="1"/>
@@ -4672,7 +4744,7 @@
 </p:sld>
 </file>
 
-<file path=ppt/slides/slide26.xml><?xml version="1.0" encoding="utf-8"?>
+<file path=ppt/slides/slide27.xml><?xml version="1.0" encoding="utf-8"?>
 <p:sld xmlns:a="http://schemas.openxmlformats.org/drawingml/2006/main" xmlns:r="http://schemas.openxmlformats.org/officeDocument/2006/relationships" xmlns:p="http://schemas.openxmlformats.org/presentationml/2006/main">
   <p:cSld>
     <p:spTree>
@@ -4743,7 +4815,7 @@
 </p:sld>
 </file>
 
-<file path=ppt/slides/slide27.xml><?xml version="1.0" encoding="utf-8"?>
+<file path=ppt/slides/slide28.xml><?xml version="1.0" encoding="utf-8"?>
 <p:sld xmlns:a="http://schemas.openxmlformats.org/drawingml/2006/main" xmlns:r="http://schemas.openxmlformats.org/officeDocument/2006/relationships" xmlns:p="http://schemas.openxmlformats.org/presentationml/2006/main">
   <p:cSld>
     <p:spTree>
@@ -4814,7 +4886,7 @@
 </p:sld>
 </file>
 
-<file path=ppt/slides/slide28.xml><?xml version="1.0" encoding="utf-8"?>
+<file path=ppt/slides/slide29.xml><?xml version="1.0" encoding="utf-8"?>
 <p:sld xmlns:a="http://schemas.openxmlformats.org/drawingml/2006/main" xmlns:r="http://schemas.openxmlformats.org/officeDocument/2006/relationships" xmlns:p="http://schemas.openxmlformats.org/presentationml/2006/main">
   <p:cSld>
     <p:spTree>
@@ -4876,77 +4948,6 @@
     <p:extLst>
       <p:ext uri="{BB962C8B-B14F-4D97-AF65-F5344CB8AC3E}">
         <p14:creationId xmlns:p14="http://schemas.microsoft.com/office/powerpoint/2010/main" val="2556506866"/>
-      </p:ext>
-    </p:extLst>
-  </p:cSld>
-  <p:clrMapOvr>
-    <a:masterClrMapping/>
-  </p:clrMapOvr>
-</p:sld>
-</file>
-
-<file path=ppt/slides/slide29.xml><?xml version="1.0" encoding="utf-8"?>
-<p:sld xmlns:a="http://schemas.openxmlformats.org/drawingml/2006/main" xmlns:r="http://schemas.openxmlformats.org/officeDocument/2006/relationships" xmlns:p="http://schemas.openxmlformats.org/presentationml/2006/main">
-  <p:cSld>
-    <p:spTree>
-      <p:nvGrpSpPr>
-        <p:cNvPr id="1" name=""/>
-        <p:cNvGrpSpPr/>
-        <p:nvPr/>
-      </p:nvGrpSpPr>
-      <p:grpSpPr>
-        <a:xfrm>
-          <a:off x="0" y="0"/>
-          <a:ext cx="0" cy="0"/>
-          <a:chOff x="0" y="0"/>
-          <a:chExt cx="0" cy="0"/>
-        </a:xfrm>
-      </p:grpSpPr>
-      <p:pic>
-        <p:nvPicPr>
-          <p:cNvPr id="5122" name="Picture 2" descr="C:\Users\Bob Gorman\AppData\Local\Skitch\Screenshot_111415_032228_PM.jpg"/>
-          <p:cNvPicPr>
-            <a:picLocks noChangeAspect="1" noChangeArrowheads="1"/>
-          </p:cNvPicPr>
-          <p:nvPr/>
-        </p:nvPicPr>
-        <p:blipFill>
-          <a:blip r:embed="rId2">
-            <a:extLst>
-              <a:ext uri="{28A0092B-C50C-407E-A947-70E740481C1C}">
-                <a14:useLocalDpi xmlns:a14="http://schemas.microsoft.com/office/drawing/2010/main" val="0"/>
-              </a:ext>
-            </a:extLst>
-          </a:blip>
-          <a:srcRect/>
-          <a:stretch>
-            <a:fillRect/>
-          </a:stretch>
-        </p:blipFill>
-        <p:spPr bwMode="auto">
-          <a:xfrm rot="5400000">
-            <a:off x="2757412" y="595388"/>
-            <a:ext cx="3162300" cy="5019524"/>
-          </a:xfrm>
-          <a:prstGeom prst="rect">
-            <a:avLst/>
-          </a:prstGeom>
-          <a:noFill/>
-          <a:extLst>
-            <a:ext uri="{909E8E84-426E-40DD-AFC4-6F175D3DCCD1}">
-              <a14:hiddenFill xmlns:a14="http://schemas.microsoft.com/office/drawing/2010/main">
-                <a:solidFill>
-                  <a:srgbClr val="FFFFFF"/>
-                </a:solidFill>
-              </a14:hiddenFill>
-            </a:ext>
-          </a:extLst>
-        </p:spPr>
-      </p:pic>
-    </p:spTree>
-    <p:extLst>
-      <p:ext uri="{BB962C8B-B14F-4D97-AF65-F5344CB8AC3E}">
-        <p14:creationId xmlns:p14="http://schemas.microsoft.com/office/powerpoint/2010/main" val="2668983980"/>
       </p:ext>
     </p:extLst>
   </p:cSld>
@@ -5005,6 +5006,77 @@
       </p:grpSpPr>
       <p:pic>
         <p:nvPicPr>
+          <p:cNvPr id="5122" name="Picture 2" descr="C:\Users\Bob Gorman\AppData\Local\Skitch\Screenshot_111415_032228_PM.jpg"/>
+          <p:cNvPicPr>
+            <a:picLocks noChangeAspect="1" noChangeArrowheads="1"/>
+          </p:cNvPicPr>
+          <p:nvPr/>
+        </p:nvPicPr>
+        <p:blipFill>
+          <a:blip r:embed="rId2">
+            <a:extLst>
+              <a:ext uri="{28A0092B-C50C-407E-A947-70E740481C1C}">
+                <a14:useLocalDpi xmlns:a14="http://schemas.microsoft.com/office/drawing/2010/main" val="0"/>
+              </a:ext>
+            </a:extLst>
+          </a:blip>
+          <a:srcRect/>
+          <a:stretch>
+            <a:fillRect/>
+          </a:stretch>
+        </p:blipFill>
+        <p:spPr bwMode="auto">
+          <a:xfrm rot="5400000">
+            <a:off x="2757412" y="595388"/>
+            <a:ext cx="3162300" cy="5019524"/>
+          </a:xfrm>
+          <a:prstGeom prst="rect">
+            <a:avLst/>
+          </a:prstGeom>
+          <a:noFill/>
+          <a:extLst>
+            <a:ext uri="{909E8E84-426E-40DD-AFC4-6F175D3DCCD1}">
+              <a14:hiddenFill xmlns:a14="http://schemas.microsoft.com/office/drawing/2010/main">
+                <a:solidFill>
+                  <a:srgbClr val="FFFFFF"/>
+                </a:solidFill>
+              </a14:hiddenFill>
+            </a:ext>
+          </a:extLst>
+        </p:spPr>
+      </p:pic>
+    </p:spTree>
+    <p:extLst>
+      <p:ext uri="{BB962C8B-B14F-4D97-AF65-F5344CB8AC3E}">
+        <p14:creationId xmlns:p14="http://schemas.microsoft.com/office/powerpoint/2010/main" val="2668983980"/>
+      </p:ext>
+    </p:extLst>
+  </p:cSld>
+  <p:clrMapOvr>
+    <a:masterClrMapping/>
+  </p:clrMapOvr>
+</p:sld>
+</file>
+
+<file path=ppt/slides/slide31.xml><?xml version="1.0" encoding="utf-8"?>
+<p:sld xmlns:a="http://schemas.openxmlformats.org/drawingml/2006/main" xmlns:r="http://schemas.openxmlformats.org/officeDocument/2006/relationships" xmlns:p="http://schemas.openxmlformats.org/presentationml/2006/main">
+  <p:cSld>
+    <p:spTree>
+      <p:nvGrpSpPr>
+        <p:cNvPr id="1" name=""/>
+        <p:cNvGrpSpPr/>
+        <p:nvPr/>
+      </p:nvGrpSpPr>
+      <p:grpSpPr>
+        <a:xfrm>
+          <a:off x="0" y="0"/>
+          <a:ext cx="0" cy="0"/>
+          <a:chOff x="0" y="0"/>
+          <a:chExt cx="0" cy="0"/>
+        </a:xfrm>
+      </p:grpSpPr>
+      <p:pic>
+        <p:nvPicPr>
           <p:cNvPr id="3074" name="Picture 2" descr="C:\Users\Bob Gorman\AppData\Local\Skitch\Screenshot_111415_031846_PM.jpg"/>
           <p:cNvPicPr>
             <a:picLocks noChangeAspect="1" noChangeArrowheads="1"/>
@@ -5057,7 +5129,7 @@
 </p:sld>
 </file>
 
-<file path=ppt/slides/slide31.xml><?xml version="1.0" encoding="utf-8"?>
+<file path=ppt/slides/slide32.xml><?xml version="1.0" encoding="utf-8"?>
 <p:sld xmlns:a="http://schemas.openxmlformats.org/drawingml/2006/main" xmlns:r="http://schemas.openxmlformats.org/officeDocument/2006/relationships" xmlns:p="http://schemas.openxmlformats.org/presentationml/2006/main">
   <p:cSld>
     <p:spTree>
@@ -5128,7 +5200,7 @@
 </p:sld>
 </file>
 
-<file path=ppt/slides/slide32.xml><?xml version="1.0" encoding="utf-8"?>
+<file path=ppt/slides/slide33.xml><?xml version="1.0" encoding="utf-8"?>
 <p:sld xmlns:a="http://schemas.openxmlformats.org/drawingml/2006/main" xmlns:r="http://schemas.openxmlformats.org/officeDocument/2006/relationships" xmlns:p="http://schemas.openxmlformats.org/presentationml/2006/main">
   <p:cSld>
     <p:spTree>
@@ -5199,7 +5271,7 @@
 </p:sld>
 </file>
 
-<file path=ppt/slides/slide33.xml><?xml version="1.0" encoding="utf-8"?>
+<file path=ppt/slides/slide34.xml><?xml version="1.0" encoding="utf-8"?>
 <p:sld xmlns:a="http://schemas.openxmlformats.org/drawingml/2006/main" xmlns:r="http://schemas.openxmlformats.org/officeDocument/2006/relationships" xmlns:p="http://schemas.openxmlformats.org/presentationml/2006/main">
   <p:cSld>
     <p:spTree>
@@ -5270,7 +5342,7 @@
 </p:sld>
 </file>
 
-<file path=ppt/slides/slide34.xml><?xml version="1.0" encoding="utf-8"?>
+<file path=ppt/slides/slide35.xml><?xml version="1.0" encoding="utf-8"?>
 <p:sld xmlns:a="http://schemas.openxmlformats.org/drawingml/2006/main" xmlns:r="http://schemas.openxmlformats.org/officeDocument/2006/relationships" xmlns:p="http://schemas.openxmlformats.org/presentationml/2006/main">
   <p:cSld>
     <p:spTree>
@@ -5341,7 +5413,7 @@
 </p:sld>
 </file>
 
-<file path=ppt/slides/slide35.xml><?xml version="1.0" encoding="utf-8"?>
+<file path=ppt/slides/slide36.xml><?xml version="1.0" encoding="utf-8"?>
 <p:sld xmlns:a="http://schemas.openxmlformats.org/drawingml/2006/main" xmlns:r="http://schemas.openxmlformats.org/officeDocument/2006/relationships" xmlns:p="http://schemas.openxmlformats.org/presentationml/2006/main">
   <p:cSld>
     <p:spTree>
@@ -5419,7 +5491,7 @@
 </p:sld>
 </file>
 
-<file path=ppt/slides/slide36.xml><?xml version="1.0" encoding="utf-8"?>
+<file path=ppt/slides/slide37.xml><?xml version="1.0" encoding="utf-8"?>
 <p:sld xmlns:a="http://schemas.openxmlformats.org/drawingml/2006/main" xmlns:r="http://schemas.openxmlformats.org/officeDocument/2006/relationships" xmlns:p="http://schemas.openxmlformats.org/presentationml/2006/main">
   <p:cSld>
     <p:spTree>
@@ -5570,7 +5642,7 @@
 </p:sld>
 </file>
 
-<file path=ppt/slides/slide37.xml><?xml version="1.0" encoding="utf-8"?>
+<file path=ppt/slides/slide38.xml><?xml version="1.0" encoding="utf-8"?>
 <p:sld xmlns:a="http://schemas.openxmlformats.org/drawingml/2006/main" xmlns:r="http://schemas.openxmlformats.org/officeDocument/2006/relationships" xmlns:p="http://schemas.openxmlformats.org/presentationml/2006/main">
   <p:cSld>
     <p:spTree>
@@ -5753,7 +5825,7 @@
 </p:sld>
 </file>
 
-<file path=ppt/slides/slide38.xml><?xml version="1.0" encoding="utf-8"?>
+<file path=ppt/slides/slide39.xml><?xml version="1.0" encoding="utf-8"?>
 <p:sld xmlns:a="http://schemas.openxmlformats.org/drawingml/2006/main" xmlns:r="http://schemas.openxmlformats.org/officeDocument/2006/relationships" xmlns:p="http://schemas.openxmlformats.org/presentationml/2006/main">
   <p:cSld>
     <p:spTree>
@@ -5923,206 +5995,6 @@
             </a:r>
             <a:r>
               <a:rPr lang="en-US" dirty="0"/>
-              <a:t>.</a:t>
-            </a:r>
-          </a:p>
-        </p:txBody>
-      </p:sp>
-    </p:spTree>
-    <p:extLst>
-      <p:ext uri="{BB962C8B-B14F-4D97-AF65-F5344CB8AC3E}">
-        <p14:creationId xmlns:p14="http://schemas.microsoft.com/office/powerpoint/2010/main" val="385875116"/>
-      </p:ext>
-    </p:extLst>
-  </p:cSld>
-  <p:clrMapOvr>
-    <a:masterClrMapping/>
-  </p:clrMapOvr>
-  <p:timing>
-    <p:tnLst>
-      <p:par>
-        <p:cTn id="1" dur="indefinite" restart="never" nodeType="tmRoot"/>
-      </p:par>
-    </p:tnLst>
-  </p:timing>
-</p:sld>
-</file>
-
-<file path=ppt/slides/slide39.xml><?xml version="1.0" encoding="utf-8"?>
-<p:sld xmlns:a="http://schemas.openxmlformats.org/drawingml/2006/main" xmlns:r="http://schemas.openxmlformats.org/officeDocument/2006/relationships" xmlns:p="http://schemas.openxmlformats.org/presentationml/2006/main">
-  <p:cSld>
-    <p:spTree>
-      <p:nvGrpSpPr>
-        <p:cNvPr id="1" name=""/>
-        <p:cNvGrpSpPr/>
-        <p:nvPr/>
-      </p:nvGrpSpPr>
-      <p:grpSpPr>
-        <a:xfrm>
-          <a:off x="0" y="0"/>
-          <a:ext cx="0" cy="0"/>
-          <a:chOff x="0" y="0"/>
-          <a:chExt cx="0" cy="0"/>
-        </a:xfrm>
-      </p:grpSpPr>
-      <p:pic>
-        <p:nvPicPr>
-          <p:cNvPr id="1026" name="Picture 2" descr="C:\Users\Bob Gorman\AppData\Local\Skitch\Screenshot_111515_110506_PM.jpg"/>
-          <p:cNvPicPr>
-            <a:picLocks noChangeAspect="1" noChangeArrowheads="1"/>
-          </p:cNvPicPr>
-          <p:nvPr/>
-        </p:nvPicPr>
-        <p:blipFill>
-          <a:blip r:embed="rId2">
-            <a:extLst>
-              <a:ext uri="{28A0092B-C50C-407E-A947-70E740481C1C}">
-                <a14:useLocalDpi xmlns:a14="http://schemas.microsoft.com/office/drawing/2010/main" val="0"/>
-              </a:ext>
-            </a:extLst>
-          </a:blip>
-          <a:srcRect/>
-          <a:stretch>
-            <a:fillRect/>
-          </a:stretch>
-        </p:blipFill>
-        <p:spPr bwMode="auto">
-          <a:xfrm>
-            <a:off x="1828800" y="914400"/>
-            <a:ext cx="5067300" cy="4627789"/>
-          </a:xfrm>
-          <a:prstGeom prst="rect">
-            <a:avLst/>
-          </a:prstGeom>
-          <a:noFill/>
-          <a:extLst>
-            <a:ext uri="{909E8E84-426E-40DD-AFC4-6F175D3DCCD1}">
-              <a14:hiddenFill xmlns:a14="http://schemas.microsoft.com/office/drawing/2010/main">
-                <a:solidFill>
-                  <a:srgbClr val="FFFFFF"/>
-                </a:solidFill>
-              </a14:hiddenFill>
-            </a:ext>
-          </a:extLst>
-        </p:spPr>
-      </p:pic>
-      <p:sp>
-        <p:nvSpPr>
-          <p:cNvPr id="2" name="Rectangle 1"/>
-          <p:cNvSpPr/>
-          <p:nvPr/>
-        </p:nvSpPr>
-        <p:spPr>
-          <a:xfrm>
-            <a:off x="2209800" y="301720"/>
-            <a:ext cx="3962400" cy="461665"/>
-          </a:xfrm>
-          <a:prstGeom prst="rect">
-            <a:avLst/>
-          </a:prstGeom>
-        </p:spPr>
-        <p:txBody>
-          <a:bodyPr wrap="square">
-            <a:spAutoFit/>
-          </a:bodyPr>
-          <a:lstStyle/>
-          <a:p>
-            <a:pPr algn="ctr"/>
-            <a:r>
-              <a:rPr lang="en-US" sz="2400" b="1" dirty="0"/>
-              <a:t>#-</a:t>
-            </a:r>
-            <a:r>
-              <a:rPr lang="en-US" sz="2400" b="1" dirty="0" err="1"/>
-              <a:t>pred</a:t>
-            </a:r>
-            <a:r>
-              <a:rPr lang="en-US" sz="2400" b="1" dirty="0"/>
-              <a:t>*v-*</a:t>
-            </a:r>
-            <a:r>
-              <a:rPr lang="en-US" sz="2400" b="1" dirty="0" err="1"/>
-              <a:t>obl</a:t>
-            </a:r>
-            <a:r>
-              <a:rPr lang="en-US" sz="2400" b="1" dirty="0"/>
-              <a:t>*pp</a:t>
-            </a:r>
-            <a:endParaRPr lang="en-US" sz="2400" b="1" dirty="0"/>
-          </a:p>
-        </p:txBody>
-      </p:sp>
-      <p:sp>
-        <p:nvSpPr>
-          <p:cNvPr id="3" name="Rectangle 2"/>
-          <p:cNvSpPr/>
-          <p:nvPr/>
-        </p:nvSpPr>
-        <p:spPr>
-          <a:xfrm>
-            <a:off x="1524000" y="5867399"/>
-            <a:ext cx="5820577" cy="461665"/>
-          </a:xfrm>
-          <a:prstGeom prst="rect">
-            <a:avLst/>
-          </a:prstGeom>
-        </p:spPr>
-        <p:txBody>
-          <a:bodyPr wrap="square">
-            <a:spAutoFit/>
-          </a:bodyPr>
-          <a:lstStyle/>
-          <a:p>
-            <a:r>
-              <a:rPr lang="en-US" sz="2400" dirty="0"/>
-              <a:t>Luke 1:38, </a:t>
-            </a:r>
-            <a:r>
-              <a:rPr lang="en-US" sz="2400" dirty="0" err="1"/>
-              <a:t>γένοιτό</a:t>
-            </a:r>
-            <a:r>
-              <a:rPr lang="en-US" sz="2400" dirty="0"/>
-              <a:t> </a:t>
-            </a:r>
-            <a:r>
-              <a:rPr lang="en-US" sz="2400" dirty="0" err="1"/>
-              <a:t>μοι</a:t>
-            </a:r>
-            <a:r>
-              <a:rPr lang="en-US" sz="2400" dirty="0"/>
-              <a:t> κα</a:t>
-            </a:r>
-            <a:r>
-              <a:rPr lang="en-US" sz="2400" dirty="0" err="1"/>
-              <a:t>τὰ</a:t>
-            </a:r>
-            <a:r>
-              <a:rPr lang="en-US" sz="2400" dirty="0"/>
-              <a:t> </a:t>
-            </a:r>
-            <a:r>
-              <a:rPr lang="en-US" sz="2400" dirty="0" err="1"/>
-              <a:t>τὸ</a:t>
-            </a:r>
-            <a:r>
-              <a:rPr lang="en-US" sz="2400" dirty="0"/>
-              <a:t> </a:t>
-            </a:r>
-            <a:r>
-              <a:rPr lang="en-US" sz="2400" dirty="0" err="1"/>
-              <a:t>ῥῆμά</a:t>
-            </a:r>
-            <a:r>
-              <a:rPr lang="en-US" sz="2400" dirty="0"/>
-              <a:t> </a:t>
-            </a:r>
-            <a:r>
-              <a:rPr lang="en-US" sz="2400" dirty="0" err="1"/>
-              <a:t>σου</a:t>
-            </a:r>
-            <a:r>
-              <a:rPr lang="en-US" sz="2400" dirty="0"/>
               <a:t>.</a:t>
             </a:r>
           </a:p>
@@ -6197,6 +6069,205 @@
       </p:grpSpPr>
       <p:pic>
         <p:nvPicPr>
+          <p:cNvPr id="1026" name="Picture 2" descr="C:\Users\Bob Gorman\AppData\Local\Skitch\Screenshot_111515_110506_PM.jpg"/>
+          <p:cNvPicPr>
+            <a:picLocks noChangeAspect="1" noChangeArrowheads="1"/>
+          </p:cNvPicPr>
+          <p:nvPr/>
+        </p:nvPicPr>
+        <p:blipFill>
+          <a:blip r:embed="rId2">
+            <a:extLst>
+              <a:ext uri="{28A0092B-C50C-407E-A947-70E740481C1C}">
+                <a14:useLocalDpi xmlns:a14="http://schemas.microsoft.com/office/drawing/2010/main" val="0"/>
+              </a:ext>
+            </a:extLst>
+          </a:blip>
+          <a:srcRect/>
+          <a:stretch>
+            <a:fillRect/>
+          </a:stretch>
+        </p:blipFill>
+        <p:spPr bwMode="auto">
+          <a:xfrm>
+            <a:off x="1828800" y="914400"/>
+            <a:ext cx="5067300" cy="4627789"/>
+          </a:xfrm>
+          <a:prstGeom prst="rect">
+            <a:avLst/>
+          </a:prstGeom>
+          <a:noFill/>
+          <a:extLst>
+            <a:ext uri="{909E8E84-426E-40DD-AFC4-6F175D3DCCD1}">
+              <a14:hiddenFill xmlns:a14="http://schemas.microsoft.com/office/drawing/2010/main">
+                <a:solidFill>
+                  <a:srgbClr val="FFFFFF"/>
+                </a:solidFill>
+              </a14:hiddenFill>
+            </a:ext>
+          </a:extLst>
+        </p:spPr>
+      </p:pic>
+      <p:sp>
+        <p:nvSpPr>
+          <p:cNvPr id="2" name="Rectangle 1"/>
+          <p:cNvSpPr/>
+          <p:nvPr/>
+        </p:nvSpPr>
+        <p:spPr>
+          <a:xfrm>
+            <a:off x="2209800" y="301720"/>
+            <a:ext cx="3962400" cy="461665"/>
+          </a:xfrm>
+          <a:prstGeom prst="rect">
+            <a:avLst/>
+          </a:prstGeom>
+        </p:spPr>
+        <p:txBody>
+          <a:bodyPr wrap="square">
+            <a:spAutoFit/>
+          </a:bodyPr>
+          <a:lstStyle/>
+          <a:p>
+            <a:pPr algn="ctr"/>
+            <a:r>
+              <a:rPr lang="en-US" sz="2400" b="1" dirty="0"/>
+              <a:t>#-</a:t>
+            </a:r>
+            <a:r>
+              <a:rPr lang="en-US" sz="2400" b="1" dirty="0" err="1"/>
+              <a:t>pred</a:t>
+            </a:r>
+            <a:r>
+              <a:rPr lang="en-US" sz="2400" b="1" dirty="0"/>
+              <a:t>*v-*</a:t>
+            </a:r>
+            <a:r>
+              <a:rPr lang="en-US" sz="2400" b="1" dirty="0" err="1"/>
+              <a:t>obl</a:t>
+            </a:r>
+            <a:r>
+              <a:rPr lang="en-US" sz="2400" b="1" dirty="0"/>
+              <a:t>*pp</a:t>
+            </a:r>
+          </a:p>
+        </p:txBody>
+      </p:sp>
+      <p:sp>
+        <p:nvSpPr>
+          <p:cNvPr id="3" name="Rectangle 2"/>
+          <p:cNvSpPr/>
+          <p:nvPr/>
+        </p:nvSpPr>
+        <p:spPr>
+          <a:xfrm>
+            <a:off x="1524000" y="5867399"/>
+            <a:ext cx="5820577" cy="461665"/>
+          </a:xfrm>
+          <a:prstGeom prst="rect">
+            <a:avLst/>
+          </a:prstGeom>
+        </p:spPr>
+        <p:txBody>
+          <a:bodyPr wrap="square">
+            <a:spAutoFit/>
+          </a:bodyPr>
+          <a:lstStyle/>
+          <a:p>
+            <a:r>
+              <a:rPr lang="en-US" sz="2400" dirty="0"/>
+              <a:t>Luke 1:38, </a:t>
+            </a:r>
+            <a:r>
+              <a:rPr lang="en-US" sz="2400" dirty="0" err="1"/>
+              <a:t>γένοιτό</a:t>
+            </a:r>
+            <a:r>
+              <a:rPr lang="en-US" sz="2400" dirty="0"/>
+              <a:t> </a:t>
+            </a:r>
+            <a:r>
+              <a:rPr lang="en-US" sz="2400" dirty="0" err="1"/>
+              <a:t>μοι</a:t>
+            </a:r>
+            <a:r>
+              <a:rPr lang="en-US" sz="2400" dirty="0"/>
+              <a:t> κα</a:t>
+            </a:r>
+            <a:r>
+              <a:rPr lang="en-US" sz="2400" dirty="0" err="1"/>
+              <a:t>τὰ</a:t>
+            </a:r>
+            <a:r>
+              <a:rPr lang="en-US" sz="2400" dirty="0"/>
+              <a:t> </a:t>
+            </a:r>
+            <a:r>
+              <a:rPr lang="en-US" sz="2400" dirty="0" err="1"/>
+              <a:t>τὸ</a:t>
+            </a:r>
+            <a:r>
+              <a:rPr lang="en-US" sz="2400" dirty="0"/>
+              <a:t> </a:t>
+            </a:r>
+            <a:r>
+              <a:rPr lang="en-US" sz="2400" dirty="0" err="1"/>
+              <a:t>ῥῆμά</a:t>
+            </a:r>
+            <a:r>
+              <a:rPr lang="en-US" sz="2400" dirty="0"/>
+              <a:t> </a:t>
+            </a:r>
+            <a:r>
+              <a:rPr lang="en-US" sz="2400" dirty="0" err="1"/>
+              <a:t>σου</a:t>
+            </a:r>
+            <a:r>
+              <a:rPr lang="en-US" sz="2400" dirty="0"/>
+              <a:t>.</a:t>
+            </a:r>
+          </a:p>
+        </p:txBody>
+      </p:sp>
+    </p:spTree>
+    <p:extLst>
+      <p:ext uri="{BB962C8B-B14F-4D97-AF65-F5344CB8AC3E}">
+        <p14:creationId xmlns:p14="http://schemas.microsoft.com/office/powerpoint/2010/main" val="385875116"/>
+      </p:ext>
+    </p:extLst>
+  </p:cSld>
+  <p:clrMapOvr>
+    <a:masterClrMapping/>
+  </p:clrMapOvr>
+  <p:timing>
+    <p:tnLst>
+      <p:par>
+        <p:cTn id="1" dur="indefinite" restart="never" nodeType="tmRoot"/>
+      </p:par>
+    </p:tnLst>
+  </p:timing>
+</p:sld>
+</file>
+
+<file path=ppt/slides/slide41.xml><?xml version="1.0" encoding="utf-8"?>
+<p:sld xmlns:a="http://schemas.openxmlformats.org/drawingml/2006/main" xmlns:r="http://schemas.openxmlformats.org/officeDocument/2006/relationships" xmlns:p="http://schemas.openxmlformats.org/presentationml/2006/main">
+  <p:cSld>
+    <p:spTree>
+      <p:nvGrpSpPr>
+        <p:cNvPr id="1" name=""/>
+        <p:cNvGrpSpPr/>
+        <p:nvPr/>
+      </p:nvGrpSpPr>
+      <p:grpSpPr>
+        <a:xfrm>
+          <a:off x="0" y="0"/>
+          <a:ext cx="0" cy="0"/>
+          <a:chOff x="0" y="0"/>
+          <a:chExt cx="0" cy="0"/>
+        </a:xfrm>
+      </p:grpSpPr>
+      <p:pic>
+        <p:nvPicPr>
           <p:cNvPr id="2050" name="Picture 2" descr="C:\Users\Bob Gorman\AppData\Local\Skitch\Screenshot_111515_115032_PM.jpg"/>
           <p:cNvPicPr>
             <a:picLocks noChangeAspect="1" noChangeArrowheads="1"/>
@@ -6279,7 +6350,7 @@
 </p:sld>
 </file>
 
-<file path=ppt/slides/slide41.xml><?xml version="1.0" encoding="utf-8"?>
+<file path=ppt/slides/slide42.xml><?xml version="1.0" encoding="utf-8"?>
 <p:sld xmlns:a="http://schemas.openxmlformats.org/drawingml/2006/main" xmlns:r="http://schemas.openxmlformats.org/officeDocument/2006/relationships" xmlns:p="http://schemas.openxmlformats.org/presentationml/2006/main">
   <p:cSld>
     <p:spTree>
@@ -6441,7 +6512,7 @@
 </p:sld>
 </file>
 
-<file path=ppt/slides/slide42.xml><?xml version="1.0" encoding="utf-8"?>
+<file path=ppt/slides/slide43.xml><?xml version="1.0" encoding="utf-8"?>
 <p:sld xmlns:a="http://schemas.openxmlformats.org/drawingml/2006/main" xmlns:r="http://schemas.openxmlformats.org/officeDocument/2006/relationships" xmlns:p="http://schemas.openxmlformats.org/presentationml/2006/main">
   <p:cSld>
     <p:spTree>
@@ -6643,36 +6714,6 @@
     <p:extLst>
       <p:ext uri="{BB962C8B-B14F-4D97-AF65-F5344CB8AC3E}">
         <p14:creationId xmlns:p14="http://schemas.microsoft.com/office/powerpoint/2010/main" val="359706117"/>
-      </p:ext>
-    </p:extLst>
-  </p:cSld>
-  <p:clrMapOvr>
-    <a:masterClrMapping/>
-  </p:clrMapOvr>
-</p:sld>
-</file>
-
-<file path=ppt/slides/slide43.xml><?xml version="1.0" encoding="utf-8"?>
-<p:sld xmlns:a="http://schemas.openxmlformats.org/drawingml/2006/main" xmlns:r="http://schemas.openxmlformats.org/officeDocument/2006/relationships" xmlns:p="http://schemas.openxmlformats.org/presentationml/2006/main">
-  <p:cSld>
-    <p:spTree>
-      <p:nvGrpSpPr>
-        <p:cNvPr id="1" name=""/>
-        <p:cNvGrpSpPr/>
-        <p:nvPr/>
-      </p:nvGrpSpPr>
-      <p:grpSpPr>
-        <a:xfrm>
-          <a:off x="0" y="0"/>
-          <a:ext cx="0" cy="0"/>
-          <a:chOff x="0" y="0"/>
-          <a:chExt cx="0" cy="0"/>
-        </a:xfrm>
-      </p:grpSpPr>
-    </p:spTree>
-    <p:extLst>
-      <p:ext uri="{BB962C8B-B14F-4D97-AF65-F5344CB8AC3E}">
-        <p14:creationId xmlns:p14="http://schemas.microsoft.com/office/powerpoint/2010/main" val="21488030"/>
       </p:ext>
     </p:extLst>
   </p:cSld>
@@ -6713,6 +6754,36 @@
 </file>
 
 <file path=ppt/slides/slide45.xml><?xml version="1.0" encoding="utf-8"?>
+<p:sld xmlns:a="http://schemas.openxmlformats.org/drawingml/2006/main" xmlns:r="http://schemas.openxmlformats.org/officeDocument/2006/relationships" xmlns:p="http://schemas.openxmlformats.org/presentationml/2006/main">
+  <p:cSld>
+    <p:spTree>
+      <p:nvGrpSpPr>
+        <p:cNvPr id="1" name=""/>
+        <p:cNvGrpSpPr/>
+        <p:nvPr/>
+      </p:nvGrpSpPr>
+      <p:grpSpPr>
+        <a:xfrm>
+          <a:off x="0" y="0"/>
+          <a:ext cx="0" cy="0"/>
+          <a:chOff x="0" y="0"/>
+          <a:chExt cx="0" cy="0"/>
+        </a:xfrm>
+      </p:grpSpPr>
+    </p:spTree>
+    <p:extLst>
+      <p:ext uri="{BB962C8B-B14F-4D97-AF65-F5344CB8AC3E}">
+        <p14:creationId xmlns:p14="http://schemas.microsoft.com/office/powerpoint/2010/main" val="21488030"/>
+      </p:ext>
+    </p:extLst>
+  </p:cSld>
+  <p:clrMapOvr>
+    <a:masterClrMapping/>
+  </p:clrMapOvr>
+</p:sld>
+</file>
+
+<file path=ppt/slides/slide46.xml><?xml version="1.0" encoding="utf-8"?>
 <p:sld xmlns:a="http://schemas.openxmlformats.org/drawingml/2006/main" xmlns:r="http://schemas.openxmlformats.org/officeDocument/2006/relationships" xmlns:p="http://schemas.openxmlformats.org/presentationml/2006/main">
   <p:cSld>
     <p:spTree>

</xml_diff>

<commit_message>
Add slides to SBL presentation.
</commit_message>
<xml_diff>
--- a/SBL_talk/sbl_presentation.pptx
+++ b/SBL_talk/sbl_presentation.pptx
@@ -5,52 +5,59 @@
     <p:sldMasterId id="2147483648" r:id="rId1"/>
   </p:sldMasterIdLst>
   <p:sldIdLst>
-    <p:sldId id="277" r:id="rId2"/>
-    <p:sldId id="284" r:id="rId3"/>
-    <p:sldId id="285" r:id="rId4"/>
-    <p:sldId id="278" r:id="rId5"/>
-    <p:sldId id="282" r:id="rId6"/>
-    <p:sldId id="279" r:id="rId7"/>
-    <p:sldId id="280" r:id="rId8"/>
-    <p:sldId id="286" r:id="rId9"/>
-    <p:sldId id="291" r:id="rId10"/>
-    <p:sldId id="260" r:id="rId11"/>
-    <p:sldId id="261" r:id="rId12"/>
-    <p:sldId id="267" r:id="rId13"/>
-    <p:sldId id="263" r:id="rId14"/>
-    <p:sldId id="265" r:id="rId15"/>
-    <p:sldId id="266" r:id="rId16"/>
-    <p:sldId id="268" r:id="rId17"/>
-    <p:sldId id="269" r:id="rId18"/>
-    <p:sldId id="270" r:id="rId19"/>
-    <p:sldId id="271" r:id="rId20"/>
-    <p:sldId id="274" r:id="rId21"/>
-    <p:sldId id="275" r:id="rId22"/>
-    <p:sldId id="298" r:id="rId23"/>
-    <p:sldId id="299" r:id="rId24"/>
-    <p:sldId id="300" r:id="rId25"/>
-    <p:sldId id="318" r:id="rId26"/>
-    <p:sldId id="292" r:id="rId27"/>
-    <p:sldId id="293" r:id="rId28"/>
-    <p:sldId id="294" r:id="rId29"/>
-    <p:sldId id="295" r:id="rId30"/>
-    <p:sldId id="306" r:id="rId31"/>
-    <p:sldId id="296" r:id="rId32"/>
-    <p:sldId id="307" r:id="rId33"/>
-    <p:sldId id="273" r:id="rId34"/>
-    <p:sldId id="302" r:id="rId35"/>
-    <p:sldId id="308" r:id="rId36"/>
-    <p:sldId id="303" r:id="rId37"/>
-    <p:sldId id="304" r:id="rId38"/>
-    <p:sldId id="309" r:id="rId39"/>
-    <p:sldId id="310" r:id="rId40"/>
-    <p:sldId id="311" r:id="rId41"/>
-    <p:sldId id="312" r:id="rId42"/>
-    <p:sldId id="313" r:id="rId43"/>
-    <p:sldId id="314" r:id="rId44"/>
-    <p:sldId id="317" r:id="rId45"/>
-    <p:sldId id="315" r:id="rId46"/>
-    <p:sldId id="316" r:id="rId47"/>
+    <p:sldId id="327" r:id="rId2"/>
+    <p:sldId id="277" r:id="rId3"/>
+    <p:sldId id="284" r:id="rId4"/>
+    <p:sldId id="285" r:id="rId5"/>
+    <p:sldId id="278" r:id="rId6"/>
+    <p:sldId id="282" r:id="rId7"/>
+    <p:sldId id="279" r:id="rId8"/>
+    <p:sldId id="280" r:id="rId9"/>
+    <p:sldId id="286" r:id="rId10"/>
+    <p:sldId id="291" r:id="rId11"/>
+    <p:sldId id="260" r:id="rId12"/>
+    <p:sldId id="261" r:id="rId13"/>
+    <p:sldId id="267" r:id="rId14"/>
+    <p:sldId id="263" r:id="rId15"/>
+    <p:sldId id="265" r:id="rId16"/>
+    <p:sldId id="266" r:id="rId17"/>
+    <p:sldId id="268" r:id="rId18"/>
+    <p:sldId id="269" r:id="rId19"/>
+    <p:sldId id="270" r:id="rId20"/>
+    <p:sldId id="271" r:id="rId21"/>
+    <p:sldId id="274" r:id="rId22"/>
+    <p:sldId id="275" r:id="rId23"/>
+    <p:sldId id="298" r:id="rId24"/>
+    <p:sldId id="299" r:id="rId25"/>
+    <p:sldId id="300" r:id="rId26"/>
+    <p:sldId id="318" r:id="rId27"/>
+    <p:sldId id="292" r:id="rId28"/>
+    <p:sldId id="293" r:id="rId29"/>
+    <p:sldId id="294" r:id="rId30"/>
+    <p:sldId id="295" r:id="rId31"/>
+    <p:sldId id="306" r:id="rId32"/>
+    <p:sldId id="296" r:id="rId33"/>
+    <p:sldId id="307" r:id="rId34"/>
+    <p:sldId id="273" r:id="rId35"/>
+    <p:sldId id="302" r:id="rId36"/>
+    <p:sldId id="308" r:id="rId37"/>
+    <p:sldId id="303" r:id="rId38"/>
+    <p:sldId id="304" r:id="rId39"/>
+    <p:sldId id="309" r:id="rId40"/>
+    <p:sldId id="310" r:id="rId41"/>
+    <p:sldId id="311" r:id="rId42"/>
+    <p:sldId id="312" r:id="rId43"/>
+    <p:sldId id="313" r:id="rId44"/>
+    <p:sldId id="314" r:id="rId45"/>
+    <p:sldId id="316" r:id="rId46"/>
+    <p:sldId id="323" r:id="rId47"/>
+    <p:sldId id="322" r:id="rId48"/>
+    <p:sldId id="324" r:id="rId49"/>
+    <p:sldId id="319" r:id="rId50"/>
+    <p:sldId id="320" r:id="rId51"/>
+    <p:sldId id="321" r:id="rId52"/>
+    <p:sldId id="325" r:id="rId53"/>
+    <p:sldId id="326" r:id="rId54"/>
   </p:sldIdLst>
   <p:sldSz cx="9144000" cy="6858000" type="screen4x3"/>
   <p:notesSz cx="6858000" cy="9144000"/>
@@ -3140,10 +3147,131 @@
           <a:chExt cx="0" cy="0"/>
         </a:xfrm>
       </p:grpSpPr>
+      <p:sp>
+        <p:nvSpPr>
+          <p:cNvPr id="2" name="Title 1"/>
+          <p:cNvSpPr>
+            <a:spLocks noGrp="1"/>
+          </p:cNvSpPr>
+          <p:nvPr>
+            <p:ph type="ctrTitle"/>
+          </p:nvPr>
+        </p:nvSpPr>
+        <p:spPr/>
+        <p:txBody>
+          <a:bodyPr/>
+          <a:lstStyle/>
+          <a:p>
+            <a:r>
+              <a:rPr lang="en-US" dirty="0" smtClean="0"/>
+              <a:t>Syntactic </a:t>
+            </a:r>
+            <a:r>
+              <a:rPr lang="en-US" dirty="0" err="1" smtClean="0"/>
+              <a:t>Stylometry</a:t>
+            </a:r>
+            <a:r>
+              <a:rPr lang="en-US" dirty="0" smtClean="0"/>
+              <a:t> on the Basis of Ancient Greek Treebanks</a:t>
+            </a:r>
+            <a:endParaRPr lang="en-US" dirty="0"/>
+          </a:p>
+        </p:txBody>
+      </p:sp>
+      <p:sp>
+        <p:nvSpPr>
+          <p:cNvPr id="3" name="Subtitle 2"/>
+          <p:cNvSpPr>
+            <a:spLocks noGrp="1"/>
+          </p:cNvSpPr>
+          <p:nvPr>
+            <p:ph type="subTitle" idx="1"/>
+          </p:nvPr>
+        </p:nvSpPr>
+        <p:spPr/>
+        <p:txBody>
+          <a:bodyPr>
+            <a:normAutofit fontScale="85000" lnSpcReduction="20000"/>
+          </a:bodyPr>
+          <a:lstStyle/>
+          <a:p>
+            <a:r>
+              <a:rPr lang="en-US" dirty="0" smtClean="0"/>
+              <a:t>Global Education and Research Technology</a:t>
+            </a:r>
+          </a:p>
+          <a:p>
+            <a:r>
+              <a:rPr lang="en-US" dirty="0" smtClean="0"/>
+              <a:t>SBL</a:t>
+            </a:r>
+          </a:p>
+          <a:p>
+            <a:r>
+              <a:rPr lang="en-US" dirty="0" smtClean="0"/>
+              <a:t>Atlanta, GA</a:t>
+            </a:r>
+          </a:p>
+          <a:p>
+            <a:r>
+              <a:rPr lang="en-US" dirty="0" smtClean="0"/>
+              <a:t>November 22, 2015</a:t>
+            </a:r>
+            <a:endParaRPr lang="en-US" dirty="0"/>
+          </a:p>
+        </p:txBody>
+      </p:sp>
+      <p:sp>
+        <p:nvSpPr>
+          <p:cNvPr id="4" name="Rectangle 3"/>
+          <p:cNvSpPr/>
+          <p:nvPr/>
+        </p:nvSpPr>
+        <p:spPr>
+          <a:xfrm>
+            <a:off x="304800" y="381000"/>
+            <a:ext cx="3953903" cy="954107"/>
+          </a:xfrm>
+          <a:prstGeom prst="rect">
+            <a:avLst/>
+          </a:prstGeom>
+        </p:spPr>
+        <p:txBody>
+          <a:bodyPr wrap="none">
+            <a:spAutoFit/>
+          </a:bodyPr>
+          <a:lstStyle/>
+          <a:p>
+            <a:r>
+              <a:rPr lang="en-US" sz="2800" dirty="0" smtClean="0">
+                <a:solidFill>
+                  <a:prstClr val="black">
+                    <a:tint val="75000"/>
+                  </a:prstClr>
+                </a:solidFill>
+              </a:rPr>
+              <a:t>Robert Gorman</a:t>
+            </a:r>
+          </a:p>
+          <a:p>
+            <a:r>
+              <a:rPr lang="en-US" sz="2800" dirty="0" smtClean="0">
+                <a:solidFill>
+                  <a:prstClr val="black">
+                    <a:tint val="75000"/>
+                  </a:prstClr>
+                </a:solidFill>
+              </a:rPr>
+              <a:t>Univ. of Nebraska-Lincoln </a:t>
+            </a:r>
+            <a:endParaRPr lang="en-US" sz="2800" dirty="0"/>
+          </a:p>
+        </p:txBody>
+      </p:sp>
     </p:spTree>
     <p:extLst>
       <p:ext uri="{BB962C8B-B14F-4D97-AF65-F5344CB8AC3E}">
-        <p14:creationId xmlns:p14="http://schemas.microsoft.com/office/powerpoint/2010/main" val="1519797498"/>
+        <p14:creationId xmlns:p14="http://schemas.microsoft.com/office/powerpoint/2010/main" val="2537779233"/>
       </p:ext>
     </p:extLst>
   </p:cSld>
@@ -3154,6 +3282,200 @@
 </file>
 
 <file path=ppt/slides/slide10.xml><?xml version="1.0" encoding="utf-8"?>
+<p:sld xmlns:a="http://schemas.openxmlformats.org/drawingml/2006/main" xmlns:r="http://schemas.openxmlformats.org/officeDocument/2006/relationships" xmlns:p="http://schemas.openxmlformats.org/presentationml/2006/main">
+  <p:cSld>
+    <p:spTree>
+      <p:nvGrpSpPr>
+        <p:cNvPr id="1" name=""/>
+        <p:cNvGrpSpPr/>
+        <p:nvPr/>
+      </p:nvGrpSpPr>
+      <p:grpSpPr>
+        <a:xfrm>
+          <a:off x="0" y="0"/>
+          <a:ext cx="0" cy="0"/>
+          <a:chOff x="0" y="0"/>
+          <a:chExt cx="0" cy="0"/>
+        </a:xfrm>
+      </p:grpSpPr>
+      <p:pic>
+        <p:nvPicPr>
+          <p:cNvPr id="6146" name="Picture 2" descr="C:\Users\Bob Gorman\AppData\Local\Skitch\Screenshot_111315_062316_PM.jpg"/>
+          <p:cNvPicPr>
+            <a:picLocks noChangeAspect="1" noChangeArrowheads="1"/>
+          </p:cNvPicPr>
+          <p:nvPr/>
+        </p:nvPicPr>
+        <p:blipFill>
+          <a:blip r:embed="rId2">
+            <a:extLst>
+              <a:ext uri="{28A0092B-C50C-407E-A947-70E740481C1C}">
+                <a14:useLocalDpi xmlns:a14="http://schemas.microsoft.com/office/drawing/2010/main" val="0"/>
+              </a:ext>
+            </a:extLst>
+          </a:blip>
+          <a:srcRect/>
+          <a:stretch>
+            <a:fillRect/>
+          </a:stretch>
+        </p:blipFill>
+        <p:spPr bwMode="auto">
+          <a:xfrm>
+            <a:off x="228600" y="457200"/>
+            <a:ext cx="8258960" cy="2299430"/>
+          </a:xfrm>
+          <a:prstGeom prst="rect">
+            <a:avLst/>
+          </a:prstGeom>
+          <a:noFill/>
+          <a:extLst>
+            <a:ext uri="{909E8E84-426E-40DD-AFC4-6F175D3DCCD1}">
+              <a14:hiddenFill xmlns:a14="http://schemas.microsoft.com/office/drawing/2010/main">
+                <a:solidFill>
+                  <a:srgbClr val="FFFFFF"/>
+                </a:solidFill>
+              </a14:hiddenFill>
+            </a:ext>
+          </a:extLst>
+        </p:spPr>
+      </p:pic>
+      <p:pic>
+        <p:nvPicPr>
+          <p:cNvPr id="6150" name="Picture 6" descr="C:\Users\Bob Gorman\AppData\Local\Skitch\Screenshot_111315_062800_PM.jpg"/>
+          <p:cNvPicPr>
+            <a:picLocks noChangeAspect="1" noChangeArrowheads="1"/>
+          </p:cNvPicPr>
+          <p:nvPr/>
+        </p:nvPicPr>
+        <p:blipFill>
+          <a:blip r:embed="rId3">
+            <a:extLst>
+              <a:ext uri="{28A0092B-C50C-407E-A947-70E740481C1C}">
+                <a14:useLocalDpi xmlns:a14="http://schemas.microsoft.com/office/drawing/2010/main" val="0"/>
+              </a:ext>
+            </a:extLst>
+          </a:blip>
+          <a:srcRect/>
+          <a:stretch>
+            <a:fillRect/>
+          </a:stretch>
+        </p:blipFill>
+        <p:spPr bwMode="auto">
+          <a:xfrm>
+            <a:off x="762000" y="2891817"/>
+            <a:ext cx="2257968" cy="3276600"/>
+          </a:xfrm>
+          <a:prstGeom prst="rect">
+            <a:avLst/>
+          </a:prstGeom>
+          <a:noFill/>
+          <a:extLst>
+            <a:ext uri="{909E8E84-426E-40DD-AFC4-6F175D3DCCD1}">
+              <a14:hiddenFill xmlns:a14="http://schemas.microsoft.com/office/drawing/2010/main">
+                <a:solidFill>
+                  <a:srgbClr val="FFFFFF"/>
+                </a:solidFill>
+              </a14:hiddenFill>
+            </a:ext>
+          </a:extLst>
+        </p:spPr>
+      </p:pic>
+      <p:pic>
+        <p:nvPicPr>
+          <p:cNvPr id="6151" name="Picture 7" descr="C:\Users\Bob Gorman\AppData\Local\Skitch\Screenshot_111315_062858_PM.jpg"/>
+          <p:cNvPicPr>
+            <a:picLocks noChangeAspect="1" noChangeArrowheads="1"/>
+          </p:cNvPicPr>
+          <p:nvPr/>
+        </p:nvPicPr>
+        <p:blipFill>
+          <a:blip r:embed="rId4">
+            <a:extLst>
+              <a:ext uri="{28A0092B-C50C-407E-A947-70E740481C1C}">
+                <a14:useLocalDpi xmlns:a14="http://schemas.microsoft.com/office/drawing/2010/main" val="0"/>
+              </a:ext>
+            </a:extLst>
+          </a:blip>
+          <a:srcRect/>
+          <a:stretch>
+            <a:fillRect/>
+          </a:stretch>
+        </p:blipFill>
+        <p:spPr bwMode="auto">
+          <a:xfrm>
+            <a:off x="3219245" y="2891817"/>
+            <a:ext cx="2277670" cy="3373692"/>
+          </a:xfrm>
+          <a:prstGeom prst="rect">
+            <a:avLst/>
+          </a:prstGeom>
+          <a:noFill/>
+          <a:extLst>
+            <a:ext uri="{909E8E84-426E-40DD-AFC4-6F175D3DCCD1}">
+              <a14:hiddenFill xmlns:a14="http://schemas.microsoft.com/office/drawing/2010/main">
+                <a:solidFill>
+                  <a:srgbClr val="FFFFFF"/>
+                </a:solidFill>
+              </a14:hiddenFill>
+            </a:ext>
+          </a:extLst>
+        </p:spPr>
+      </p:pic>
+      <p:pic>
+        <p:nvPicPr>
+          <p:cNvPr id="6152" name="Picture 8" descr="C:\Users\Bob Gorman\AppData\Local\Skitch\Screenshot_111315_063001_PM.jpg"/>
+          <p:cNvPicPr>
+            <a:picLocks noChangeAspect="1" noChangeArrowheads="1"/>
+          </p:cNvPicPr>
+          <p:nvPr/>
+        </p:nvPicPr>
+        <p:blipFill>
+          <a:blip r:embed="rId5">
+            <a:extLst>
+              <a:ext uri="{28A0092B-C50C-407E-A947-70E740481C1C}">
+                <a14:useLocalDpi xmlns:a14="http://schemas.microsoft.com/office/drawing/2010/main" val="0"/>
+              </a:ext>
+            </a:extLst>
+          </a:blip>
+          <a:srcRect/>
+          <a:stretch>
+            <a:fillRect/>
+          </a:stretch>
+        </p:blipFill>
+        <p:spPr bwMode="auto">
+          <a:xfrm>
+            <a:off x="5442896" y="2891817"/>
+            <a:ext cx="2563235" cy="2670783"/>
+          </a:xfrm>
+          <a:prstGeom prst="rect">
+            <a:avLst/>
+          </a:prstGeom>
+          <a:noFill/>
+          <a:extLst>
+            <a:ext uri="{909E8E84-426E-40DD-AFC4-6F175D3DCCD1}">
+              <a14:hiddenFill xmlns:a14="http://schemas.microsoft.com/office/drawing/2010/main">
+                <a:solidFill>
+                  <a:srgbClr val="FFFFFF"/>
+                </a:solidFill>
+              </a14:hiddenFill>
+            </a:ext>
+          </a:extLst>
+        </p:spPr>
+      </p:pic>
+    </p:spTree>
+    <p:extLst>
+      <p:ext uri="{BB962C8B-B14F-4D97-AF65-F5344CB8AC3E}">
+        <p14:creationId xmlns:p14="http://schemas.microsoft.com/office/powerpoint/2010/main" val="384389964"/>
+      </p:ext>
+    </p:extLst>
+  </p:cSld>
+  <p:clrMapOvr>
+    <a:masterClrMapping/>
+  </p:clrMapOvr>
+</p:sld>
+</file>
+
+<file path=ppt/slides/slide11.xml><?xml version="1.0" encoding="utf-8"?>
 <p:sld xmlns:a="http://schemas.openxmlformats.org/drawingml/2006/main" xmlns:r="http://schemas.openxmlformats.org/officeDocument/2006/relationships" xmlns:p="http://schemas.openxmlformats.org/presentationml/2006/main">
   <p:cSld>
     <p:spTree>
@@ -3224,7 +3546,7 @@
 </p:sld>
 </file>
 
-<file path=ppt/slides/slide11.xml><?xml version="1.0" encoding="utf-8"?>
+<file path=ppt/slides/slide12.xml><?xml version="1.0" encoding="utf-8"?>
 <p:sld xmlns:a="http://schemas.openxmlformats.org/drawingml/2006/main" xmlns:r="http://schemas.openxmlformats.org/officeDocument/2006/relationships" xmlns:p="http://schemas.openxmlformats.org/presentationml/2006/main">
   <p:cSld>
     <p:spTree>
@@ -3295,7 +3617,7 @@
 </p:sld>
 </file>
 
-<file path=ppt/slides/slide12.xml><?xml version="1.0" encoding="utf-8"?>
+<file path=ppt/slides/slide13.xml><?xml version="1.0" encoding="utf-8"?>
 <p:sld xmlns:a="http://schemas.openxmlformats.org/drawingml/2006/main" xmlns:r="http://schemas.openxmlformats.org/officeDocument/2006/relationships" xmlns:p="http://schemas.openxmlformats.org/presentationml/2006/main">
   <p:cSld>
     <p:spTree>
@@ -3366,7 +3688,7 @@
 </p:sld>
 </file>
 
-<file path=ppt/slides/slide13.xml><?xml version="1.0" encoding="utf-8"?>
+<file path=ppt/slides/slide14.xml><?xml version="1.0" encoding="utf-8"?>
 <p:sld xmlns:a="http://schemas.openxmlformats.org/drawingml/2006/main" xmlns:r="http://schemas.openxmlformats.org/officeDocument/2006/relationships" xmlns:p="http://schemas.openxmlformats.org/presentationml/2006/main">
   <p:cSld>
     <p:spTree>
@@ -3437,7 +3759,7 @@
 </p:sld>
 </file>
 
-<file path=ppt/slides/slide14.xml><?xml version="1.0" encoding="utf-8"?>
+<file path=ppt/slides/slide15.xml><?xml version="1.0" encoding="utf-8"?>
 <p:sld xmlns:a="http://schemas.openxmlformats.org/drawingml/2006/main" xmlns:r="http://schemas.openxmlformats.org/officeDocument/2006/relationships" xmlns:p="http://schemas.openxmlformats.org/presentationml/2006/main">
   <p:cSld>
     <p:spTree>
@@ -3575,7 +3897,7 @@
 </p:sld>
 </file>
 
-<file path=ppt/slides/slide15.xml><?xml version="1.0" encoding="utf-8"?>
+<file path=ppt/slides/slide16.xml><?xml version="1.0" encoding="utf-8"?>
 <p:sld xmlns:a="http://schemas.openxmlformats.org/drawingml/2006/main" xmlns:r="http://schemas.openxmlformats.org/officeDocument/2006/relationships" xmlns:p="http://schemas.openxmlformats.org/presentationml/2006/main">
   <p:cSld>
     <p:spTree>
@@ -3646,7 +3968,7 @@
 </p:sld>
 </file>
 
-<file path=ppt/slides/slide16.xml><?xml version="1.0" encoding="utf-8"?>
+<file path=ppt/slides/slide17.xml><?xml version="1.0" encoding="utf-8"?>
 <p:sld xmlns:a="http://schemas.openxmlformats.org/drawingml/2006/main" xmlns:r="http://schemas.openxmlformats.org/officeDocument/2006/relationships" xmlns:p="http://schemas.openxmlformats.org/presentationml/2006/main">
   <p:cSld>
     <p:spTree>
@@ -3717,7 +4039,7 @@
 </p:sld>
 </file>
 
-<file path=ppt/slides/slide17.xml><?xml version="1.0" encoding="utf-8"?>
+<file path=ppt/slides/slide18.xml><?xml version="1.0" encoding="utf-8"?>
 <p:sld xmlns:a="http://schemas.openxmlformats.org/drawingml/2006/main" xmlns:r="http://schemas.openxmlformats.org/officeDocument/2006/relationships" xmlns:p="http://schemas.openxmlformats.org/presentationml/2006/main">
   <p:cSld>
     <p:spTree>
@@ -3788,7 +4110,7 @@
 </p:sld>
 </file>
 
-<file path=ppt/slides/slide18.xml><?xml version="1.0" encoding="utf-8"?>
+<file path=ppt/slides/slide19.xml><?xml version="1.0" encoding="utf-8"?>
 <p:sld xmlns:a="http://schemas.openxmlformats.org/drawingml/2006/main" xmlns:r="http://schemas.openxmlformats.org/officeDocument/2006/relationships" xmlns:p="http://schemas.openxmlformats.org/presentationml/2006/main">
   <p:cSld>
     <p:spTree>
@@ -3859,7 +4181,37 @@
 </p:sld>
 </file>
 
-<file path=ppt/slides/slide19.xml><?xml version="1.0" encoding="utf-8"?>
+<file path=ppt/slides/slide2.xml><?xml version="1.0" encoding="utf-8"?>
+<p:sld xmlns:a="http://schemas.openxmlformats.org/drawingml/2006/main" xmlns:r="http://schemas.openxmlformats.org/officeDocument/2006/relationships" xmlns:p="http://schemas.openxmlformats.org/presentationml/2006/main">
+  <p:cSld>
+    <p:spTree>
+      <p:nvGrpSpPr>
+        <p:cNvPr id="1" name=""/>
+        <p:cNvGrpSpPr/>
+        <p:nvPr/>
+      </p:nvGrpSpPr>
+      <p:grpSpPr>
+        <a:xfrm>
+          <a:off x="0" y="0"/>
+          <a:ext cx="0" cy="0"/>
+          <a:chOff x="0" y="0"/>
+          <a:chExt cx="0" cy="0"/>
+        </a:xfrm>
+      </p:grpSpPr>
+    </p:spTree>
+    <p:extLst>
+      <p:ext uri="{BB962C8B-B14F-4D97-AF65-F5344CB8AC3E}">
+        <p14:creationId xmlns:p14="http://schemas.microsoft.com/office/powerpoint/2010/main" val="1519797498"/>
+      </p:ext>
+    </p:extLst>
+  </p:cSld>
+  <p:clrMapOvr>
+    <a:masterClrMapping/>
+  </p:clrMapOvr>
+</p:sld>
+</file>
+
+<file path=ppt/slides/slide20.xml><?xml version="1.0" encoding="utf-8"?>
 <p:sld xmlns:a="http://schemas.openxmlformats.org/drawingml/2006/main" xmlns:r="http://schemas.openxmlformats.org/officeDocument/2006/relationships" xmlns:p="http://schemas.openxmlformats.org/presentationml/2006/main">
   <p:cSld>
     <p:spTree>
@@ -3930,37 +4282,7 @@
 </p:sld>
 </file>
 
-<file path=ppt/slides/slide2.xml><?xml version="1.0" encoding="utf-8"?>
-<p:sld xmlns:a="http://schemas.openxmlformats.org/drawingml/2006/main" xmlns:r="http://schemas.openxmlformats.org/officeDocument/2006/relationships" xmlns:p="http://schemas.openxmlformats.org/presentationml/2006/main">
-  <p:cSld>
-    <p:spTree>
-      <p:nvGrpSpPr>
-        <p:cNvPr id="1" name=""/>
-        <p:cNvGrpSpPr/>
-        <p:nvPr/>
-      </p:nvGrpSpPr>
-      <p:grpSpPr>
-        <a:xfrm>
-          <a:off x="0" y="0"/>
-          <a:ext cx="0" cy="0"/>
-          <a:chOff x="0" y="0"/>
-          <a:chExt cx="0" cy="0"/>
-        </a:xfrm>
-      </p:grpSpPr>
-    </p:spTree>
-    <p:extLst>
-      <p:ext uri="{BB962C8B-B14F-4D97-AF65-F5344CB8AC3E}">
-        <p14:creationId xmlns:p14="http://schemas.microsoft.com/office/powerpoint/2010/main" val="3976027406"/>
-      </p:ext>
-    </p:extLst>
-  </p:cSld>
-  <p:clrMapOvr>
-    <a:masterClrMapping/>
-  </p:clrMapOvr>
-</p:sld>
-</file>
-
-<file path=ppt/slides/slide20.xml><?xml version="1.0" encoding="utf-8"?>
+<file path=ppt/slides/slide21.xml><?xml version="1.0" encoding="utf-8"?>
 <p:sld xmlns:a="http://schemas.openxmlformats.org/drawingml/2006/main" xmlns:r="http://schemas.openxmlformats.org/officeDocument/2006/relationships" xmlns:p="http://schemas.openxmlformats.org/presentationml/2006/main">
   <p:cSld>
     <p:spTree>
@@ -4031,7 +4353,7 @@
 </p:sld>
 </file>
 
-<file path=ppt/slides/slide21.xml><?xml version="1.0" encoding="utf-8"?>
+<file path=ppt/slides/slide22.xml><?xml version="1.0" encoding="utf-8"?>
 <p:sld xmlns:a="http://schemas.openxmlformats.org/drawingml/2006/main" xmlns:r="http://schemas.openxmlformats.org/officeDocument/2006/relationships" xmlns:p="http://schemas.openxmlformats.org/presentationml/2006/main">
   <p:cSld>
     <p:spTree>
@@ -4184,7 +4506,7 @@
 </p:sld>
 </file>
 
-<file path=ppt/slides/slide22.xml><?xml version="1.0" encoding="utf-8"?>
+<file path=ppt/slides/slide23.xml><?xml version="1.0" encoding="utf-8"?>
 <p:sld xmlns:a="http://schemas.openxmlformats.org/drawingml/2006/main" xmlns:r="http://schemas.openxmlformats.org/officeDocument/2006/relationships" xmlns:p="http://schemas.openxmlformats.org/presentationml/2006/main">
   <p:cSld>
     <p:spTree>
@@ -4337,7 +4659,7 @@
 </p:sld>
 </file>
 
-<file path=ppt/slides/slide23.xml><?xml version="1.0" encoding="utf-8"?>
+<file path=ppt/slides/slide24.xml><?xml version="1.0" encoding="utf-8"?>
 <p:sld xmlns:a="http://schemas.openxmlformats.org/drawingml/2006/main" xmlns:r="http://schemas.openxmlformats.org/officeDocument/2006/relationships" xmlns:p="http://schemas.openxmlformats.org/presentationml/2006/main">
   <p:cSld>
     <p:spTree>
@@ -4449,7 +4771,7 @@
 </p:sld>
 </file>
 
-<file path=ppt/slides/slide24.xml><?xml version="1.0" encoding="utf-8"?>
+<file path=ppt/slides/slide25.xml><?xml version="1.0" encoding="utf-8"?>
 <p:sld xmlns:a="http://schemas.openxmlformats.org/drawingml/2006/main" xmlns:r="http://schemas.openxmlformats.org/officeDocument/2006/relationships" xmlns:p="http://schemas.openxmlformats.org/presentationml/2006/main">
   <p:cSld>
     <p:spTree>
@@ -4602,7 +4924,7 @@
 </p:sld>
 </file>
 
-<file path=ppt/slides/slide25.xml><?xml version="1.0" encoding="utf-8"?>
+<file path=ppt/slides/slide26.xml><?xml version="1.0" encoding="utf-8"?>
 <p:sld xmlns:a="http://schemas.openxmlformats.org/drawingml/2006/main" xmlns:r="http://schemas.openxmlformats.org/officeDocument/2006/relationships" xmlns:p="http://schemas.openxmlformats.org/presentationml/2006/main">
   <p:cSld>
     <p:spTree>
@@ -4673,7 +4995,7 @@
 </p:sld>
 </file>
 
-<file path=ppt/slides/slide26.xml><?xml version="1.0" encoding="utf-8"?>
+<file path=ppt/slides/slide27.xml><?xml version="1.0" encoding="utf-8"?>
 <p:sld xmlns:a="http://schemas.openxmlformats.org/drawingml/2006/main" xmlns:r="http://schemas.openxmlformats.org/officeDocument/2006/relationships" xmlns:p="http://schemas.openxmlformats.org/presentationml/2006/main">
   <p:cSld>
     <p:spTree>
@@ -4744,7 +5066,7 @@
 </p:sld>
 </file>
 
-<file path=ppt/slides/slide27.xml><?xml version="1.0" encoding="utf-8"?>
+<file path=ppt/slides/slide28.xml><?xml version="1.0" encoding="utf-8"?>
 <p:sld xmlns:a="http://schemas.openxmlformats.org/drawingml/2006/main" xmlns:r="http://schemas.openxmlformats.org/officeDocument/2006/relationships" xmlns:p="http://schemas.openxmlformats.org/presentationml/2006/main">
   <p:cSld>
     <p:spTree>
@@ -4815,7 +5137,7 @@
 </p:sld>
 </file>
 
-<file path=ppt/slides/slide28.xml><?xml version="1.0" encoding="utf-8"?>
+<file path=ppt/slides/slide29.xml><?xml version="1.0" encoding="utf-8"?>
 <p:sld xmlns:a="http://schemas.openxmlformats.org/drawingml/2006/main" xmlns:r="http://schemas.openxmlformats.org/officeDocument/2006/relationships" xmlns:p="http://schemas.openxmlformats.org/presentationml/2006/main">
   <p:cSld>
     <p:spTree>
@@ -4857,77 +5179,6 @@
           <a:xfrm rot="5400000">
             <a:off x="3201820" y="801697"/>
             <a:ext cx="2463800" cy="4295441"/>
-          </a:xfrm>
-          <a:prstGeom prst="rect">
-            <a:avLst/>
-          </a:prstGeom>
-          <a:noFill/>
-          <a:extLst>
-            <a:ext uri="{909E8E84-426E-40DD-AFC4-6F175D3DCCD1}">
-              <a14:hiddenFill xmlns:a14="http://schemas.microsoft.com/office/drawing/2010/main">
-                <a:solidFill>
-                  <a:srgbClr val="FFFFFF"/>
-                </a:solidFill>
-              </a14:hiddenFill>
-            </a:ext>
-          </a:extLst>
-        </p:spPr>
-      </p:pic>
-    </p:spTree>
-    <p:extLst>
-      <p:ext uri="{BB962C8B-B14F-4D97-AF65-F5344CB8AC3E}">
-        <p14:creationId xmlns:p14="http://schemas.microsoft.com/office/powerpoint/2010/main" val="2556506866"/>
-      </p:ext>
-    </p:extLst>
-  </p:cSld>
-  <p:clrMapOvr>
-    <a:masterClrMapping/>
-  </p:clrMapOvr>
-</p:sld>
-</file>
-
-<file path=ppt/slides/slide29.xml><?xml version="1.0" encoding="utf-8"?>
-<p:sld xmlns:a="http://schemas.openxmlformats.org/drawingml/2006/main" xmlns:r="http://schemas.openxmlformats.org/officeDocument/2006/relationships" xmlns:p="http://schemas.openxmlformats.org/presentationml/2006/main">
-  <p:cSld>
-    <p:spTree>
-      <p:nvGrpSpPr>
-        <p:cNvPr id="1" name=""/>
-        <p:cNvGrpSpPr/>
-        <p:nvPr/>
-      </p:nvGrpSpPr>
-      <p:grpSpPr>
-        <a:xfrm>
-          <a:off x="0" y="0"/>
-          <a:ext cx="0" cy="0"/>
-          <a:chOff x="0" y="0"/>
-          <a:chExt cx="0" cy="0"/>
-        </a:xfrm>
-      </p:grpSpPr>
-      <p:pic>
-        <p:nvPicPr>
-          <p:cNvPr id="2050" name="Picture 2" descr="C:\Users\Bob Gorman\AppData\Local\Skitch\Screenshot_111415_031800_PM.jpg"/>
-          <p:cNvPicPr>
-            <a:picLocks noChangeAspect="1" noChangeArrowheads="1"/>
-          </p:cNvPicPr>
-          <p:nvPr/>
-        </p:nvPicPr>
-        <p:blipFill>
-          <a:blip r:embed="rId2">
-            <a:extLst>
-              <a:ext uri="{28A0092B-C50C-407E-A947-70E740481C1C}">
-                <a14:useLocalDpi xmlns:a14="http://schemas.microsoft.com/office/drawing/2010/main" val="0"/>
-              </a:ext>
-            </a:extLst>
-          </a:blip>
-          <a:srcRect/>
-          <a:stretch>
-            <a:fillRect/>
-          </a:stretch>
-        </p:blipFill>
-        <p:spPr bwMode="auto">
-          <a:xfrm>
-            <a:off x="1295400" y="381000"/>
-            <a:ext cx="6309545" cy="4948368"/>
           </a:xfrm>
           <a:prstGeom prst="rect">
             <a:avLst/>
@@ -5006,6 +5257,77 @@
       </p:grpSpPr>
       <p:pic>
         <p:nvPicPr>
+          <p:cNvPr id="2050" name="Picture 2" descr="C:\Users\Bob Gorman\AppData\Local\Skitch\Screenshot_111415_031800_PM.jpg"/>
+          <p:cNvPicPr>
+            <a:picLocks noChangeAspect="1" noChangeArrowheads="1"/>
+          </p:cNvPicPr>
+          <p:nvPr/>
+        </p:nvPicPr>
+        <p:blipFill>
+          <a:blip r:embed="rId2">
+            <a:extLst>
+              <a:ext uri="{28A0092B-C50C-407E-A947-70E740481C1C}">
+                <a14:useLocalDpi xmlns:a14="http://schemas.microsoft.com/office/drawing/2010/main" val="0"/>
+              </a:ext>
+            </a:extLst>
+          </a:blip>
+          <a:srcRect/>
+          <a:stretch>
+            <a:fillRect/>
+          </a:stretch>
+        </p:blipFill>
+        <p:spPr bwMode="auto">
+          <a:xfrm>
+            <a:off x="1295400" y="381000"/>
+            <a:ext cx="6309545" cy="4948368"/>
+          </a:xfrm>
+          <a:prstGeom prst="rect">
+            <a:avLst/>
+          </a:prstGeom>
+          <a:noFill/>
+          <a:extLst>
+            <a:ext uri="{909E8E84-426E-40DD-AFC4-6F175D3DCCD1}">
+              <a14:hiddenFill xmlns:a14="http://schemas.microsoft.com/office/drawing/2010/main">
+                <a:solidFill>
+                  <a:srgbClr val="FFFFFF"/>
+                </a:solidFill>
+              </a14:hiddenFill>
+            </a:ext>
+          </a:extLst>
+        </p:spPr>
+      </p:pic>
+    </p:spTree>
+    <p:extLst>
+      <p:ext uri="{BB962C8B-B14F-4D97-AF65-F5344CB8AC3E}">
+        <p14:creationId xmlns:p14="http://schemas.microsoft.com/office/powerpoint/2010/main" val="2556506866"/>
+      </p:ext>
+    </p:extLst>
+  </p:cSld>
+  <p:clrMapOvr>
+    <a:masterClrMapping/>
+  </p:clrMapOvr>
+</p:sld>
+</file>
+
+<file path=ppt/slides/slide31.xml><?xml version="1.0" encoding="utf-8"?>
+<p:sld xmlns:a="http://schemas.openxmlformats.org/drawingml/2006/main" xmlns:r="http://schemas.openxmlformats.org/officeDocument/2006/relationships" xmlns:p="http://schemas.openxmlformats.org/presentationml/2006/main">
+  <p:cSld>
+    <p:spTree>
+      <p:nvGrpSpPr>
+        <p:cNvPr id="1" name=""/>
+        <p:cNvGrpSpPr/>
+        <p:nvPr/>
+      </p:nvGrpSpPr>
+      <p:grpSpPr>
+        <a:xfrm>
+          <a:off x="0" y="0"/>
+          <a:ext cx="0" cy="0"/>
+          <a:chOff x="0" y="0"/>
+          <a:chExt cx="0" cy="0"/>
+        </a:xfrm>
+      </p:grpSpPr>
+      <p:pic>
+        <p:nvPicPr>
           <p:cNvPr id="5122" name="Picture 2" descr="C:\Users\Bob Gorman\AppData\Local\Skitch\Screenshot_111415_032228_PM.jpg"/>
           <p:cNvPicPr>
             <a:picLocks noChangeAspect="1" noChangeArrowheads="1"/>
@@ -5058,7 +5380,7 @@
 </p:sld>
 </file>
 
-<file path=ppt/slides/slide31.xml><?xml version="1.0" encoding="utf-8"?>
+<file path=ppt/slides/slide32.xml><?xml version="1.0" encoding="utf-8"?>
 <p:sld xmlns:a="http://schemas.openxmlformats.org/drawingml/2006/main" xmlns:r="http://schemas.openxmlformats.org/officeDocument/2006/relationships" xmlns:p="http://schemas.openxmlformats.org/presentationml/2006/main">
   <p:cSld>
     <p:spTree>
@@ -5129,7 +5451,7 @@
 </p:sld>
 </file>
 
-<file path=ppt/slides/slide32.xml><?xml version="1.0" encoding="utf-8"?>
+<file path=ppt/slides/slide33.xml><?xml version="1.0" encoding="utf-8"?>
 <p:sld xmlns:a="http://schemas.openxmlformats.org/drawingml/2006/main" xmlns:r="http://schemas.openxmlformats.org/officeDocument/2006/relationships" xmlns:p="http://schemas.openxmlformats.org/presentationml/2006/main">
   <p:cSld>
     <p:spTree>
@@ -5200,7 +5522,7 @@
 </p:sld>
 </file>
 
-<file path=ppt/slides/slide33.xml><?xml version="1.0" encoding="utf-8"?>
+<file path=ppt/slides/slide34.xml><?xml version="1.0" encoding="utf-8"?>
 <p:sld xmlns:a="http://schemas.openxmlformats.org/drawingml/2006/main" xmlns:r="http://schemas.openxmlformats.org/officeDocument/2006/relationships" xmlns:p="http://schemas.openxmlformats.org/presentationml/2006/main">
   <p:cSld>
     <p:spTree>
@@ -5271,7 +5593,7 @@
 </p:sld>
 </file>
 
-<file path=ppt/slides/slide34.xml><?xml version="1.0" encoding="utf-8"?>
+<file path=ppt/slides/slide35.xml><?xml version="1.0" encoding="utf-8"?>
 <p:sld xmlns:a="http://schemas.openxmlformats.org/drawingml/2006/main" xmlns:r="http://schemas.openxmlformats.org/officeDocument/2006/relationships" xmlns:p="http://schemas.openxmlformats.org/presentationml/2006/main">
   <p:cSld>
     <p:spTree>
@@ -5342,7 +5664,7 @@
 </p:sld>
 </file>
 
-<file path=ppt/slides/slide35.xml><?xml version="1.0" encoding="utf-8"?>
+<file path=ppt/slides/slide36.xml><?xml version="1.0" encoding="utf-8"?>
 <p:sld xmlns:a="http://schemas.openxmlformats.org/drawingml/2006/main" xmlns:r="http://schemas.openxmlformats.org/officeDocument/2006/relationships" xmlns:p="http://schemas.openxmlformats.org/presentationml/2006/main">
   <p:cSld>
     <p:spTree>
@@ -5413,7 +5735,7 @@
 </p:sld>
 </file>
 
-<file path=ppt/slides/slide36.xml><?xml version="1.0" encoding="utf-8"?>
+<file path=ppt/slides/slide37.xml><?xml version="1.0" encoding="utf-8"?>
 <p:sld xmlns:a="http://schemas.openxmlformats.org/drawingml/2006/main" xmlns:r="http://schemas.openxmlformats.org/officeDocument/2006/relationships" xmlns:p="http://schemas.openxmlformats.org/presentationml/2006/main">
   <p:cSld>
     <p:spTree>
@@ -5491,7 +5813,7 @@
 </p:sld>
 </file>
 
-<file path=ppt/slides/slide37.xml><?xml version="1.0" encoding="utf-8"?>
+<file path=ppt/slides/slide38.xml><?xml version="1.0" encoding="utf-8"?>
 <p:sld xmlns:a="http://schemas.openxmlformats.org/drawingml/2006/main" xmlns:r="http://schemas.openxmlformats.org/officeDocument/2006/relationships" xmlns:p="http://schemas.openxmlformats.org/presentationml/2006/main">
   <p:cSld>
     <p:spTree>
@@ -5642,7 +5964,7 @@
 </p:sld>
 </file>
 
-<file path=ppt/slides/slide38.xml><?xml version="1.0" encoding="utf-8"?>
+<file path=ppt/slides/slide39.xml><?xml version="1.0" encoding="utf-8"?>
 <p:sld xmlns:a="http://schemas.openxmlformats.org/drawingml/2006/main" xmlns:r="http://schemas.openxmlformats.org/officeDocument/2006/relationships" xmlns:p="http://schemas.openxmlformats.org/presentationml/2006/main">
   <p:cSld>
     <p:spTree>
@@ -5800,201 +6122,6 @@
             </a:r>
             <a:r>
               <a:rPr lang="en-US" sz="2400" dirty="0"/>
-              <a:t>.</a:t>
-            </a:r>
-          </a:p>
-        </p:txBody>
-      </p:sp>
-    </p:spTree>
-    <p:extLst>
-      <p:ext uri="{BB962C8B-B14F-4D97-AF65-F5344CB8AC3E}">
-        <p14:creationId xmlns:p14="http://schemas.microsoft.com/office/powerpoint/2010/main" val="385875116"/>
-      </p:ext>
-    </p:extLst>
-  </p:cSld>
-  <p:clrMapOvr>
-    <a:masterClrMapping/>
-  </p:clrMapOvr>
-  <p:timing>
-    <p:tnLst>
-      <p:par>
-        <p:cTn id="1" dur="indefinite" restart="never" nodeType="tmRoot"/>
-      </p:par>
-    </p:tnLst>
-  </p:timing>
-</p:sld>
-</file>
-
-<file path=ppt/slides/slide39.xml><?xml version="1.0" encoding="utf-8"?>
-<p:sld xmlns:a="http://schemas.openxmlformats.org/drawingml/2006/main" xmlns:r="http://schemas.openxmlformats.org/officeDocument/2006/relationships" xmlns:p="http://schemas.openxmlformats.org/presentationml/2006/main">
-  <p:cSld>
-    <p:spTree>
-      <p:nvGrpSpPr>
-        <p:cNvPr id="1" name=""/>
-        <p:cNvGrpSpPr/>
-        <p:nvPr/>
-      </p:nvGrpSpPr>
-      <p:grpSpPr>
-        <a:xfrm>
-          <a:off x="0" y="0"/>
-          <a:ext cx="0" cy="0"/>
-          <a:chOff x="0" y="0"/>
-          <a:chExt cx="0" cy="0"/>
-        </a:xfrm>
-      </p:grpSpPr>
-      <p:pic>
-        <p:nvPicPr>
-          <p:cNvPr id="3074" name="Picture 2" descr="C:\Users\Bob Gorman\AppData\Local\Skitch\Screenshot_111515_020334_PM.jpg"/>
-          <p:cNvPicPr>
-            <a:picLocks noChangeAspect="1" noChangeArrowheads="1"/>
-          </p:cNvPicPr>
-          <p:nvPr/>
-        </p:nvPicPr>
-        <p:blipFill>
-          <a:blip r:embed="rId2">
-            <a:extLst>
-              <a:ext uri="{28A0092B-C50C-407E-A947-70E740481C1C}">
-                <a14:useLocalDpi xmlns:a14="http://schemas.microsoft.com/office/drawing/2010/main" val="0"/>
-              </a:ext>
-            </a:extLst>
-          </a:blip>
-          <a:srcRect/>
-          <a:stretch>
-            <a:fillRect/>
-          </a:stretch>
-        </p:blipFill>
-        <p:spPr bwMode="auto">
-          <a:xfrm>
-            <a:off x="2051742" y="855532"/>
-            <a:ext cx="5181600" cy="4524513"/>
-          </a:xfrm>
-          <a:prstGeom prst="rect">
-            <a:avLst/>
-          </a:prstGeom>
-          <a:noFill/>
-          <a:extLst>
-            <a:ext uri="{909E8E84-426E-40DD-AFC4-6F175D3DCCD1}">
-              <a14:hiddenFill xmlns:a14="http://schemas.microsoft.com/office/drawing/2010/main">
-                <a:solidFill>
-                  <a:srgbClr val="FFFFFF"/>
-                </a:solidFill>
-              </a14:hiddenFill>
-            </a:ext>
-          </a:extLst>
-        </p:spPr>
-      </p:pic>
-      <p:sp>
-        <p:nvSpPr>
-          <p:cNvPr id="4" name="Rectangle 3"/>
-          <p:cNvSpPr/>
-          <p:nvPr/>
-        </p:nvSpPr>
-        <p:spPr>
-          <a:xfrm>
-            <a:off x="2819400" y="332312"/>
-            <a:ext cx="3581400" cy="523220"/>
-          </a:xfrm>
-          <a:prstGeom prst="rect">
-            <a:avLst/>
-          </a:prstGeom>
-        </p:spPr>
-        <p:txBody>
-          <a:bodyPr wrap="square">
-            <a:spAutoFit/>
-          </a:bodyPr>
-          <a:lstStyle/>
-          <a:p>
-            <a:pPr algn="ctr"/>
-            <a:r>
-              <a:rPr lang="en-US" sz="2800" b="1" dirty="0"/>
-              <a:t>#-</a:t>
-            </a:r>
-            <a:r>
-              <a:rPr lang="en-US" sz="2800" b="1" dirty="0" err="1"/>
-              <a:t>pred</a:t>
-            </a:r>
-            <a:r>
-              <a:rPr lang="en-US" sz="2800" b="1" dirty="0"/>
-              <a:t>*v-*</a:t>
-            </a:r>
-            <a:r>
-              <a:rPr lang="en-US" sz="2800" b="1" dirty="0" err="1"/>
-              <a:t>obl</a:t>
-            </a:r>
-            <a:r>
-              <a:rPr lang="en-US" sz="2800" b="1" dirty="0"/>
-              <a:t>*pp</a:t>
-            </a:r>
-          </a:p>
-        </p:txBody>
-      </p:sp>
-      <p:sp>
-        <p:nvSpPr>
-          <p:cNvPr id="5" name="Rectangle 4"/>
-          <p:cNvSpPr/>
-          <p:nvPr/>
-        </p:nvSpPr>
-        <p:spPr>
-          <a:xfrm>
-            <a:off x="1524000" y="5715000"/>
-            <a:ext cx="6396495" cy="523220"/>
-          </a:xfrm>
-          <a:prstGeom prst="rect">
-            <a:avLst/>
-          </a:prstGeom>
-        </p:spPr>
-        <p:txBody>
-          <a:bodyPr wrap="none">
-            <a:spAutoFit/>
-          </a:bodyPr>
-          <a:lstStyle/>
-          <a:p>
-            <a:r>
-              <a:rPr lang="en-US" sz="2800" dirty="0"/>
-              <a:t>Luke 1:11, </a:t>
-            </a:r>
-            <a:r>
-              <a:rPr lang="en-US" sz="2800" baseline="30000" dirty="0"/>
-              <a:t> </a:t>
-            </a:r>
-            <a:r>
-              <a:rPr lang="en-US" sz="2800" dirty="0" err="1"/>
-              <a:t>ὤφθη</a:t>
-            </a:r>
-            <a:r>
-              <a:rPr lang="en-US" sz="2800" dirty="0"/>
-              <a:t> </a:t>
-            </a:r>
-            <a:r>
-              <a:rPr lang="en-US" sz="2800" dirty="0" err="1"/>
-              <a:t>δὲ</a:t>
-            </a:r>
-            <a:r>
-              <a:rPr lang="en-US" sz="2800" dirty="0"/>
-              <a:t> α</a:t>
-            </a:r>
-            <a:r>
-              <a:rPr lang="en-US" sz="2800" dirty="0" err="1"/>
-              <a:t>ὐτῷ</a:t>
-            </a:r>
-            <a:r>
-              <a:rPr lang="en-US" sz="2800" dirty="0"/>
-              <a:t> </a:t>
-            </a:r>
-            <a:r>
-              <a:rPr lang="en-US" sz="2800" dirty="0" err="1"/>
-              <a:t>ἄγγελος</a:t>
-            </a:r>
-            <a:r>
-              <a:rPr lang="en-US" sz="2800" dirty="0"/>
-              <a:t> </a:t>
-            </a:r>
-            <a:r>
-              <a:rPr lang="en-US" sz="2800" dirty="0" err="1"/>
-              <a:t>κυρίου</a:t>
-            </a:r>
-            <a:r>
-              <a:rPr lang="en-US" dirty="0"/>
               <a:t>.</a:t>
             </a:r>
           </a:p>
@@ -6040,7 +6167,7 @@
     </p:spTree>
     <p:extLst>
       <p:ext uri="{BB962C8B-B14F-4D97-AF65-F5344CB8AC3E}">
-        <p14:creationId xmlns:p14="http://schemas.microsoft.com/office/powerpoint/2010/main" val="953151465"/>
+        <p14:creationId xmlns:p14="http://schemas.microsoft.com/office/powerpoint/2010/main" val="3976027406"/>
       </p:ext>
     </p:extLst>
   </p:cSld>
@@ -6069,7 +6196,7 @@
       </p:grpSpPr>
       <p:pic>
         <p:nvPicPr>
-          <p:cNvPr id="1026" name="Picture 2" descr="C:\Users\Bob Gorman\AppData\Local\Skitch\Screenshot_111515_110506_PM.jpg"/>
+          <p:cNvPr id="3074" name="Picture 2" descr="C:\Users\Bob Gorman\AppData\Local\Skitch\Screenshot_111515_020334_PM.jpg"/>
           <p:cNvPicPr>
             <a:picLocks noChangeAspect="1" noChangeArrowheads="1"/>
           </p:cNvPicPr>
@@ -6090,8 +6217,8 @@
         </p:blipFill>
         <p:spPr bwMode="auto">
           <a:xfrm>
-            <a:off x="1828800" y="914400"/>
-            <a:ext cx="5067300" cy="4627789"/>
+            <a:off x="2051742" y="855532"/>
+            <a:ext cx="5181600" cy="4524513"/>
           </a:xfrm>
           <a:prstGeom prst="rect">
             <a:avLst/>
@@ -6110,14 +6237,14 @@
       </p:pic>
       <p:sp>
         <p:nvSpPr>
-          <p:cNvPr id="2" name="Rectangle 1"/>
+          <p:cNvPr id="4" name="Rectangle 3"/>
           <p:cNvSpPr/>
           <p:nvPr/>
         </p:nvSpPr>
         <p:spPr>
           <a:xfrm>
-            <a:off x="2209800" y="301720"/>
-            <a:ext cx="3962400" cy="461665"/>
+            <a:off x="2819400" y="332312"/>
+            <a:ext cx="3581400" cy="523220"/>
           </a:xfrm>
           <a:prstGeom prst="rect">
             <a:avLst/>
@@ -6131,23 +6258,23 @@
           <a:p>
             <a:pPr algn="ctr"/>
             <a:r>
-              <a:rPr lang="en-US" sz="2400" b="1" dirty="0"/>
+              <a:rPr lang="en-US" sz="2800" b="1" dirty="0"/>
               <a:t>#-</a:t>
             </a:r>
             <a:r>
-              <a:rPr lang="en-US" sz="2400" b="1" dirty="0" err="1"/>
+              <a:rPr lang="en-US" sz="2800" b="1" dirty="0" err="1"/>
               <a:t>pred</a:t>
             </a:r>
             <a:r>
-              <a:rPr lang="en-US" sz="2400" b="1" dirty="0"/>
+              <a:rPr lang="en-US" sz="2800" b="1" dirty="0"/>
               <a:t>*v-*</a:t>
             </a:r>
             <a:r>
-              <a:rPr lang="en-US" sz="2400" b="1" dirty="0" err="1"/>
+              <a:rPr lang="en-US" sz="2800" b="1" dirty="0" err="1"/>
               <a:t>obl</a:t>
             </a:r>
             <a:r>
-              <a:rPr lang="en-US" sz="2400" b="1" dirty="0"/>
+              <a:rPr lang="en-US" sz="2800" b="1" dirty="0"/>
               <a:t>*pp</a:t>
             </a:r>
           </a:p>
@@ -6155,75 +6282,71 @@
       </p:sp>
       <p:sp>
         <p:nvSpPr>
-          <p:cNvPr id="3" name="Rectangle 2"/>
+          <p:cNvPr id="5" name="Rectangle 4"/>
           <p:cNvSpPr/>
           <p:nvPr/>
         </p:nvSpPr>
         <p:spPr>
           <a:xfrm>
-            <a:off x="1524000" y="5867399"/>
-            <a:ext cx="5820577" cy="461665"/>
+            <a:off x="1524000" y="5715000"/>
+            <a:ext cx="6396495" cy="523220"/>
           </a:xfrm>
           <a:prstGeom prst="rect">
             <a:avLst/>
           </a:prstGeom>
         </p:spPr>
         <p:txBody>
-          <a:bodyPr wrap="square">
+          <a:bodyPr wrap="none">
             <a:spAutoFit/>
           </a:bodyPr>
           <a:lstStyle/>
           <a:p>
             <a:r>
-              <a:rPr lang="en-US" sz="2400" dirty="0"/>
-              <a:t>Luke 1:38, </a:t>
-            </a:r>
-            <a:r>
-              <a:rPr lang="en-US" sz="2400" dirty="0" err="1"/>
-              <a:t>γένοιτό</a:t>
-            </a:r>
-            <a:r>
-              <a:rPr lang="en-US" sz="2400" dirty="0"/>
+              <a:rPr lang="en-US" sz="2800" dirty="0"/>
+              <a:t>Luke 1:11, </a:t>
+            </a:r>
+            <a:r>
+              <a:rPr lang="en-US" sz="2800" baseline="30000" dirty="0"/>
+              <a:t> </a:t>
+            </a:r>
+            <a:r>
+              <a:rPr lang="en-US" sz="2800" dirty="0" err="1"/>
+              <a:t>ὤφθη</a:t>
+            </a:r>
+            <a:r>
+              <a:rPr lang="en-US" sz="2800" dirty="0"/>
               <a:t> </a:t>
             </a:r>
             <a:r>
-              <a:rPr lang="en-US" sz="2400" dirty="0" err="1"/>
-              <a:t>μοι</a:t>
-            </a:r>
-            <a:r>
-              <a:rPr lang="en-US" sz="2400" dirty="0"/>
-              <a:t> κα</a:t>
-            </a:r>
-            <a:r>
-              <a:rPr lang="en-US" sz="2400" dirty="0" err="1"/>
-              <a:t>τὰ</a:t>
-            </a:r>
-            <a:r>
-              <a:rPr lang="en-US" sz="2400" dirty="0"/>
+              <a:rPr lang="en-US" sz="2800" dirty="0" err="1"/>
+              <a:t>δὲ</a:t>
+            </a:r>
+            <a:r>
+              <a:rPr lang="en-US" sz="2800" dirty="0"/>
+              <a:t> α</a:t>
+            </a:r>
+            <a:r>
+              <a:rPr lang="en-US" sz="2800" dirty="0" err="1"/>
+              <a:t>ὐτῷ</a:t>
+            </a:r>
+            <a:r>
+              <a:rPr lang="en-US" sz="2800" dirty="0"/>
               <a:t> </a:t>
             </a:r>
             <a:r>
-              <a:rPr lang="en-US" sz="2400" dirty="0" err="1"/>
-              <a:t>τὸ</a:t>
-            </a:r>
-            <a:r>
-              <a:rPr lang="en-US" sz="2400" dirty="0"/>
+              <a:rPr lang="en-US" sz="2800" dirty="0" err="1"/>
+              <a:t>ἄγγελος</a:t>
+            </a:r>
+            <a:r>
+              <a:rPr lang="en-US" sz="2800" dirty="0"/>
               <a:t> </a:t>
             </a:r>
             <a:r>
-              <a:rPr lang="en-US" sz="2400" dirty="0" err="1"/>
-              <a:t>ῥῆμά</a:t>
-            </a:r>
-            <a:r>
-              <a:rPr lang="en-US" sz="2400" dirty="0"/>
-              <a:t> </a:t>
-            </a:r>
-            <a:r>
-              <a:rPr lang="en-US" sz="2400" dirty="0" err="1"/>
-              <a:t>σου</a:t>
-            </a:r>
-            <a:r>
-              <a:rPr lang="en-US" sz="2400" dirty="0"/>
+              <a:rPr lang="en-US" sz="2800" dirty="0" err="1"/>
+              <a:t>κυρίου</a:t>
+            </a:r>
+            <a:r>
+              <a:rPr lang="en-US" dirty="0"/>
               <a:t>.</a:t>
             </a:r>
           </a:p>
@@ -6268,6 +6391,205 @@
       </p:grpSpPr>
       <p:pic>
         <p:nvPicPr>
+          <p:cNvPr id="1026" name="Picture 2" descr="C:\Users\Bob Gorman\AppData\Local\Skitch\Screenshot_111515_110506_PM.jpg"/>
+          <p:cNvPicPr>
+            <a:picLocks noChangeAspect="1" noChangeArrowheads="1"/>
+          </p:cNvPicPr>
+          <p:nvPr/>
+        </p:nvPicPr>
+        <p:blipFill>
+          <a:blip r:embed="rId2">
+            <a:extLst>
+              <a:ext uri="{28A0092B-C50C-407E-A947-70E740481C1C}">
+                <a14:useLocalDpi xmlns:a14="http://schemas.microsoft.com/office/drawing/2010/main" val="0"/>
+              </a:ext>
+            </a:extLst>
+          </a:blip>
+          <a:srcRect/>
+          <a:stretch>
+            <a:fillRect/>
+          </a:stretch>
+        </p:blipFill>
+        <p:spPr bwMode="auto">
+          <a:xfrm>
+            <a:off x="1828800" y="914400"/>
+            <a:ext cx="5067300" cy="4627789"/>
+          </a:xfrm>
+          <a:prstGeom prst="rect">
+            <a:avLst/>
+          </a:prstGeom>
+          <a:noFill/>
+          <a:extLst>
+            <a:ext uri="{909E8E84-426E-40DD-AFC4-6F175D3DCCD1}">
+              <a14:hiddenFill xmlns:a14="http://schemas.microsoft.com/office/drawing/2010/main">
+                <a:solidFill>
+                  <a:srgbClr val="FFFFFF"/>
+                </a:solidFill>
+              </a14:hiddenFill>
+            </a:ext>
+          </a:extLst>
+        </p:spPr>
+      </p:pic>
+      <p:sp>
+        <p:nvSpPr>
+          <p:cNvPr id="2" name="Rectangle 1"/>
+          <p:cNvSpPr/>
+          <p:nvPr/>
+        </p:nvSpPr>
+        <p:spPr>
+          <a:xfrm>
+            <a:off x="2209800" y="301720"/>
+            <a:ext cx="3962400" cy="461665"/>
+          </a:xfrm>
+          <a:prstGeom prst="rect">
+            <a:avLst/>
+          </a:prstGeom>
+        </p:spPr>
+        <p:txBody>
+          <a:bodyPr wrap="square">
+            <a:spAutoFit/>
+          </a:bodyPr>
+          <a:lstStyle/>
+          <a:p>
+            <a:pPr algn="ctr"/>
+            <a:r>
+              <a:rPr lang="en-US" sz="2400" b="1" dirty="0"/>
+              <a:t>#-</a:t>
+            </a:r>
+            <a:r>
+              <a:rPr lang="en-US" sz="2400" b="1" dirty="0" err="1"/>
+              <a:t>pred</a:t>
+            </a:r>
+            <a:r>
+              <a:rPr lang="en-US" sz="2400" b="1" dirty="0"/>
+              <a:t>*v-*</a:t>
+            </a:r>
+            <a:r>
+              <a:rPr lang="en-US" sz="2400" b="1" dirty="0" err="1"/>
+              <a:t>obl</a:t>
+            </a:r>
+            <a:r>
+              <a:rPr lang="en-US" sz="2400" b="1" dirty="0"/>
+              <a:t>*pp</a:t>
+            </a:r>
+          </a:p>
+        </p:txBody>
+      </p:sp>
+      <p:sp>
+        <p:nvSpPr>
+          <p:cNvPr id="3" name="Rectangle 2"/>
+          <p:cNvSpPr/>
+          <p:nvPr/>
+        </p:nvSpPr>
+        <p:spPr>
+          <a:xfrm>
+            <a:off x="1524000" y="5867399"/>
+            <a:ext cx="5820577" cy="461665"/>
+          </a:xfrm>
+          <a:prstGeom prst="rect">
+            <a:avLst/>
+          </a:prstGeom>
+        </p:spPr>
+        <p:txBody>
+          <a:bodyPr wrap="square">
+            <a:spAutoFit/>
+          </a:bodyPr>
+          <a:lstStyle/>
+          <a:p>
+            <a:r>
+              <a:rPr lang="en-US" sz="2400" dirty="0"/>
+              <a:t>Luke 1:38, </a:t>
+            </a:r>
+            <a:r>
+              <a:rPr lang="en-US" sz="2400" dirty="0" err="1"/>
+              <a:t>γένοιτό</a:t>
+            </a:r>
+            <a:r>
+              <a:rPr lang="en-US" sz="2400" dirty="0"/>
+              <a:t> </a:t>
+            </a:r>
+            <a:r>
+              <a:rPr lang="en-US" sz="2400" dirty="0" err="1"/>
+              <a:t>μοι</a:t>
+            </a:r>
+            <a:r>
+              <a:rPr lang="en-US" sz="2400" dirty="0"/>
+              <a:t> κα</a:t>
+            </a:r>
+            <a:r>
+              <a:rPr lang="en-US" sz="2400" dirty="0" err="1"/>
+              <a:t>τὰ</a:t>
+            </a:r>
+            <a:r>
+              <a:rPr lang="en-US" sz="2400" dirty="0"/>
+              <a:t> </a:t>
+            </a:r>
+            <a:r>
+              <a:rPr lang="en-US" sz="2400" dirty="0" err="1"/>
+              <a:t>τὸ</a:t>
+            </a:r>
+            <a:r>
+              <a:rPr lang="en-US" sz="2400" dirty="0"/>
+              <a:t> </a:t>
+            </a:r>
+            <a:r>
+              <a:rPr lang="en-US" sz="2400" dirty="0" err="1"/>
+              <a:t>ῥῆμά</a:t>
+            </a:r>
+            <a:r>
+              <a:rPr lang="en-US" sz="2400" dirty="0"/>
+              <a:t> </a:t>
+            </a:r>
+            <a:r>
+              <a:rPr lang="en-US" sz="2400" dirty="0" err="1"/>
+              <a:t>σου</a:t>
+            </a:r>
+            <a:r>
+              <a:rPr lang="en-US" sz="2400" dirty="0"/>
+              <a:t>.</a:t>
+            </a:r>
+          </a:p>
+        </p:txBody>
+      </p:sp>
+    </p:spTree>
+    <p:extLst>
+      <p:ext uri="{BB962C8B-B14F-4D97-AF65-F5344CB8AC3E}">
+        <p14:creationId xmlns:p14="http://schemas.microsoft.com/office/powerpoint/2010/main" val="385875116"/>
+      </p:ext>
+    </p:extLst>
+  </p:cSld>
+  <p:clrMapOvr>
+    <a:masterClrMapping/>
+  </p:clrMapOvr>
+  <p:timing>
+    <p:tnLst>
+      <p:par>
+        <p:cTn id="1" dur="indefinite" restart="never" nodeType="tmRoot"/>
+      </p:par>
+    </p:tnLst>
+  </p:timing>
+</p:sld>
+</file>
+
+<file path=ppt/slides/slide42.xml><?xml version="1.0" encoding="utf-8"?>
+<p:sld xmlns:a="http://schemas.openxmlformats.org/drawingml/2006/main" xmlns:r="http://schemas.openxmlformats.org/officeDocument/2006/relationships" xmlns:p="http://schemas.openxmlformats.org/presentationml/2006/main">
+  <p:cSld>
+    <p:spTree>
+      <p:nvGrpSpPr>
+        <p:cNvPr id="1" name=""/>
+        <p:cNvGrpSpPr/>
+        <p:nvPr/>
+      </p:nvGrpSpPr>
+      <p:grpSpPr>
+        <a:xfrm>
+          <a:off x="0" y="0"/>
+          <a:ext cx="0" cy="0"/>
+          <a:chOff x="0" y="0"/>
+          <a:chExt cx="0" cy="0"/>
+        </a:xfrm>
+      </p:grpSpPr>
+      <p:pic>
+        <p:nvPicPr>
           <p:cNvPr id="2050" name="Picture 2" descr="C:\Users\Bob Gorman\AppData\Local\Skitch\Screenshot_111515_115032_PM.jpg"/>
           <p:cNvPicPr>
             <a:picLocks noChangeAspect="1" noChangeArrowheads="1"/>
@@ -6350,7 +6672,7 @@
 </p:sld>
 </file>
 
-<file path=ppt/slides/slide42.xml><?xml version="1.0" encoding="utf-8"?>
+<file path=ppt/slides/slide43.xml><?xml version="1.0" encoding="utf-8"?>
 <p:sld xmlns:a="http://schemas.openxmlformats.org/drawingml/2006/main" xmlns:r="http://schemas.openxmlformats.org/officeDocument/2006/relationships" xmlns:p="http://schemas.openxmlformats.org/presentationml/2006/main">
   <p:cSld>
     <p:spTree>
@@ -6457,8 +6779,8 @@
         </p:nvSpPr>
         <p:spPr>
           <a:xfrm>
-            <a:off x="3276600" y="5905925"/>
-            <a:ext cx="3276600" cy="523220"/>
+            <a:off x="3276600" y="5757455"/>
+            <a:ext cx="3962400" cy="523220"/>
           </a:xfrm>
           <a:prstGeom prst="rect">
             <a:avLst/>
@@ -6495,217 +6817,10 @@
               <a:rPr lang="en-US" sz="2800" dirty="0" err="1" smtClean="0"/>
               <a:t>auxp</a:t>
             </a:r>
-            <a:endParaRPr lang="en-US" sz="2800" dirty="0"/>
-          </a:p>
-        </p:txBody>
-      </p:sp>
-    </p:spTree>
-    <p:extLst>
-      <p:ext uri="{BB962C8B-B14F-4D97-AF65-F5344CB8AC3E}">
-        <p14:creationId xmlns:p14="http://schemas.microsoft.com/office/powerpoint/2010/main" val="359706117"/>
-      </p:ext>
-    </p:extLst>
-  </p:cSld>
-  <p:clrMapOvr>
-    <a:masterClrMapping/>
-  </p:clrMapOvr>
-</p:sld>
-</file>
-
-<file path=ppt/slides/slide43.xml><?xml version="1.0" encoding="utf-8"?>
-<p:sld xmlns:a="http://schemas.openxmlformats.org/drawingml/2006/main" xmlns:r="http://schemas.openxmlformats.org/officeDocument/2006/relationships" xmlns:p="http://schemas.openxmlformats.org/presentationml/2006/main">
-  <p:cSld>
-    <p:spTree>
-      <p:nvGrpSpPr>
-        <p:cNvPr id="1" name=""/>
-        <p:cNvGrpSpPr/>
-        <p:nvPr/>
-      </p:nvGrpSpPr>
-      <p:grpSpPr>
-        <a:xfrm>
-          <a:off x="0" y="0"/>
-          <a:ext cx="0" cy="0"/>
-          <a:chOff x="0" y="0"/>
-          <a:chExt cx="0" cy="0"/>
-        </a:xfrm>
-      </p:grpSpPr>
-      <p:sp>
-        <p:nvSpPr>
-          <p:cNvPr id="2" name="Rectangle 1"/>
-          <p:cNvSpPr/>
-          <p:nvPr/>
-        </p:nvSpPr>
-        <p:spPr>
-          <a:xfrm>
-            <a:off x="2590800" y="914400"/>
-            <a:ext cx="3145476" cy="523220"/>
-          </a:xfrm>
-          <a:prstGeom prst="rect">
-            <a:avLst/>
-          </a:prstGeom>
-        </p:spPr>
-        <p:txBody>
-          <a:bodyPr wrap="none">
-            <a:spAutoFit/>
-          </a:bodyPr>
-          <a:lstStyle/>
-          <a:p>
-            <a:pPr lvl="0"/>
-            <a:r>
-              <a:rPr lang="en-US" sz="2800" dirty="0">
-                <a:solidFill>
-                  <a:prstClr val="black"/>
-                </a:solidFill>
-              </a:rPr>
-              <a:t>#-</a:t>
-            </a:r>
-            <a:r>
-              <a:rPr lang="en-US" sz="2800" dirty="0" err="1">
-                <a:solidFill>
-                  <a:prstClr val="black"/>
-                </a:solidFill>
-              </a:rPr>
-              <a:t>pred</a:t>
-            </a:r>
-            <a:r>
-              <a:rPr lang="en-US" sz="2800" dirty="0">
-                <a:solidFill>
-                  <a:prstClr val="black"/>
-                </a:solidFill>
-              </a:rPr>
-              <a:t>-v-</a:t>
-            </a:r>
-            <a:r>
-              <a:rPr lang="en-US" sz="2800" dirty="0" err="1">
-                <a:solidFill>
-                  <a:prstClr val="black"/>
-                </a:solidFill>
-              </a:rPr>
-              <a:t>adv</a:t>
-            </a:r>
-            <a:r>
-              <a:rPr lang="en-US" sz="2800" dirty="0">
-                <a:solidFill>
-                  <a:prstClr val="black"/>
-                </a:solidFill>
-              </a:rPr>
-              <a:t>-v-</a:t>
-            </a:r>
-            <a:r>
-              <a:rPr lang="en-US" sz="2800" dirty="0" err="1">
-                <a:solidFill>
-                  <a:prstClr val="black"/>
-                </a:solidFill>
-              </a:rPr>
-              <a:t>auxp</a:t>
-            </a:r>
-            <a:endParaRPr lang="en-US" sz="2800" dirty="0">
-              <a:solidFill>
-                <a:prstClr val="black"/>
-              </a:solidFill>
-            </a:endParaRPr>
-          </a:p>
-        </p:txBody>
-      </p:sp>
-      <p:sp>
-        <p:nvSpPr>
-          <p:cNvPr id="3" name="TextBox 2"/>
-          <p:cNvSpPr txBox="1"/>
-          <p:nvPr/>
-        </p:nvSpPr>
-        <p:spPr>
-          <a:xfrm>
-            <a:off x="914400" y="1828800"/>
-            <a:ext cx="7696200" cy="4832092"/>
-          </a:xfrm>
-          <a:prstGeom prst="rect">
-            <a:avLst/>
-          </a:prstGeom>
-          <a:noFill/>
-        </p:spPr>
-        <p:txBody>
-          <a:bodyPr wrap="square" rtlCol="0">
-            <a:spAutoFit/>
-          </a:bodyPr>
-          <a:lstStyle/>
-          <a:p>
             <a:r>
               <a:rPr lang="en-US" sz="2800" dirty="0" smtClean="0"/>
-              <a:t>Representative of “heavy” circumstantial participle</a:t>
-            </a:r>
-            <a:br>
-              <a:rPr lang="en-US" sz="2800" dirty="0" smtClean="0"/>
-            </a:br>
-            <a:endParaRPr lang="en-US" sz="2800" dirty="0" smtClean="0"/>
-          </a:p>
-          <a:p>
-            <a:r>
-              <a:rPr lang="en-US" sz="2800" dirty="0" smtClean="0"/>
-              <a:t>Distinctive of historical prose, e.g.:</a:t>
-            </a:r>
-          </a:p>
-          <a:p>
-            <a:pPr marL="457200" indent="-457200">
-              <a:buFont typeface="Arial" panose="020B0604020202020204" pitchFamily="34" charset="0"/>
-              <a:buChar char="•"/>
-            </a:pPr>
-            <a:r>
-              <a:rPr lang="en-US" sz="2800" dirty="0" smtClean="0"/>
-              <a:t>Polybius 1: frequency = 24.9% of #-</a:t>
-            </a:r>
-            <a:r>
-              <a:rPr lang="en-US" sz="2800" dirty="0" err="1" smtClean="0"/>
-              <a:t>pred</a:t>
-            </a:r>
-            <a:r>
-              <a:rPr lang="en-US" sz="2800" dirty="0" smtClean="0"/>
-              <a:t>-v</a:t>
-            </a:r>
-            <a:br>
-              <a:rPr lang="en-US" sz="2800" dirty="0" smtClean="0"/>
-            </a:br>
-            <a:r>
-              <a:rPr lang="en-US" sz="2800" dirty="0" smtClean="0"/>
-              <a:t>(178 times / 26,894 tokens)</a:t>
-            </a:r>
-            <a:br>
-              <a:rPr lang="en-US" sz="2800" dirty="0" smtClean="0"/>
-            </a:br>
-            <a:endParaRPr lang="en-US" sz="2800" dirty="0" smtClean="0"/>
-          </a:p>
-          <a:p>
-            <a:pPr marL="457200" indent="-457200">
-              <a:buFont typeface="Arial" panose="020B0604020202020204" pitchFamily="34" charset="0"/>
-              <a:buChar char="•"/>
-            </a:pPr>
-            <a:r>
-              <a:rPr lang="en-US" sz="2800" dirty="0" smtClean="0"/>
-              <a:t>Aeschylus: frequency = 3% of #-</a:t>
-            </a:r>
-            <a:r>
-              <a:rPr lang="en-US" sz="2800" dirty="0" err="1" smtClean="0"/>
-              <a:t>pred</a:t>
-            </a:r>
-            <a:r>
-              <a:rPr lang="en-US" sz="2800" smtClean="0"/>
-              <a:t>-v</a:t>
-            </a:r>
-            <a:br>
-              <a:rPr lang="en-US" sz="2800" smtClean="0"/>
-            </a:br>
-            <a:r>
-              <a:rPr lang="en-US" sz="2800" smtClean="0"/>
-              <a:t>(14 times / 45, 682 tokens)</a:t>
-            </a:r>
-            <a:endParaRPr lang="en-US" sz="2800" dirty="0" smtClean="0"/>
-          </a:p>
-          <a:p>
-            <a:endParaRPr lang="en-US" sz="2800" dirty="0"/>
-          </a:p>
-          <a:p>
-            <a:endParaRPr lang="en-US" sz="2800" dirty="0" smtClean="0"/>
-          </a:p>
-          <a:p>
+              <a:t>-r</a:t>
+            </a:r>
             <a:endParaRPr lang="en-US" sz="2800" dirty="0"/>
           </a:p>
         </p:txBody>
@@ -6740,10 +6855,198 @@
           <a:chExt cx="0" cy="0"/>
         </a:xfrm>
       </p:grpSpPr>
+      <p:sp>
+        <p:nvSpPr>
+          <p:cNvPr id="2" name="Rectangle 1"/>
+          <p:cNvSpPr/>
+          <p:nvPr/>
+        </p:nvSpPr>
+        <p:spPr>
+          <a:xfrm>
+            <a:off x="2590800" y="914400"/>
+            <a:ext cx="3381118" cy="523220"/>
+          </a:xfrm>
+          <a:prstGeom prst="rect">
+            <a:avLst/>
+          </a:prstGeom>
+        </p:spPr>
+        <p:txBody>
+          <a:bodyPr wrap="none">
+            <a:spAutoFit/>
+          </a:bodyPr>
+          <a:lstStyle/>
+          <a:p>
+            <a:pPr lvl="0"/>
+            <a:r>
+              <a:rPr lang="en-US" sz="2800" dirty="0">
+                <a:solidFill>
+                  <a:prstClr val="black"/>
+                </a:solidFill>
+              </a:rPr>
+              <a:t>#-</a:t>
+            </a:r>
+            <a:r>
+              <a:rPr lang="en-US" sz="2800" dirty="0" err="1" smtClean="0">
+                <a:solidFill>
+                  <a:prstClr val="black"/>
+                </a:solidFill>
+              </a:rPr>
+              <a:t>pred</a:t>
+            </a:r>
+            <a:r>
+              <a:rPr lang="en-US" sz="2800" dirty="0" smtClean="0">
+                <a:solidFill>
+                  <a:prstClr val="black"/>
+                </a:solidFill>
+              </a:rPr>
+              <a:t>-v-</a:t>
+            </a:r>
+            <a:r>
+              <a:rPr lang="en-US" sz="2800" dirty="0" err="1" smtClean="0">
+                <a:solidFill>
+                  <a:prstClr val="black"/>
+                </a:solidFill>
+              </a:rPr>
+              <a:t>adv</a:t>
+            </a:r>
+            <a:r>
+              <a:rPr lang="en-US" sz="2800" dirty="0" smtClean="0">
+                <a:solidFill>
+                  <a:prstClr val="black"/>
+                </a:solidFill>
+              </a:rPr>
+              <a:t>-v-</a:t>
+            </a:r>
+            <a:r>
+              <a:rPr lang="en-US" sz="2800" dirty="0" err="1" smtClean="0">
+                <a:solidFill>
+                  <a:prstClr val="black"/>
+                </a:solidFill>
+              </a:rPr>
+              <a:t>auxp</a:t>
+            </a:r>
+            <a:r>
+              <a:rPr lang="en-US" sz="2800" dirty="0" smtClean="0">
+                <a:solidFill>
+                  <a:prstClr val="black"/>
+                </a:solidFill>
+              </a:rPr>
+              <a:t>-r</a:t>
+            </a:r>
+            <a:endParaRPr lang="en-US" sz="2800" dirty="0">
+              <a:solidFill>
+                <a:prstClr val="black"/>
+              </a:solidFill>
+            </a:endParaRPr>
+          </a:p>
+        </p:txBody>
+      </p:sp>
+      <p:sp>
+        <p:nvSpPr>
+          <p:cNvPr id="3" name="TextBox 2"/>
+          <p:cNvSpPr txBox="1"/>
+          <p:nvPr/>
+        </p:nvSpPr>
+        <p:spPr>
+          <a:xfrm>
+            <a:off x="914400" y="1828800"/>
+            <a:ext cx="7696200" cy="4832092"/>
+          </a:xfrm>
+          <a:prstGeom prst="rect">
+            <a:avLst/>
+          </a:prstGeom>
+          <a:noFill/>
+        </p:spPr>
+        <p:txBody>
+          <a:bodyPr wrap="square" rtlCol="0">
+            <a:spAutoFit/>
+          </a:bodyPr>
+          <a:lstStyle/>
+          <a:p>
+            <a:r>
+              <a:rPr lang="en-US" sz="2800" dirty="0" smtClean="0"/>
+              <a:t>Representative of “heavy” circumstantial participle</a:t>
+            </a:r>
+            <a:br>
+              <a:rPr lang="en-US" sz="2800" dirty="0" smtClean="0"/>
+            </a:br>
+            <a:endParaRPr lang="en-US" sz="2800" dirty="0" smtClean="0"/>
+          </a:p>
+          <a:p>
+            <a:r>
+              <a:rPr lang="en-US" sz="2800" dirty="0" smtClean="0"/>
+              <a:t>Distinctive of historical prose, e.g.:</a:t>
+            </a:r>
+          </a:p>
+          <a:p>
+            <a:pPr marL="457200" indent="-457200">
+              <a:buFont typeface="Arial" panose="020B0604020202020204" pitchFamily="34" charset="0"/>
+              <a:buChar char="•"/>
+            </a:pPr>
+            <a:r>
+              <a:rPr lang="en-US" sz="2800" dirty="0" smtClean="0"/>
+              <a:t>Polybius 1: frequency = 24.9% of #-</a:t>
+            </a:r>
+            <a:r>
+              <a:rPr lang="en-US" sz="2800" dirty="0" err="1" smtClean="0"/>
+              <a:t>pred</a:t>
+            </a:r>
+            <a:r>
+              <a:rPr lang="en-US" sz="2800" dirty="0" smtClean="0"/>
+              <a:t>-v</a:t>
+            </a:r>
+            <a:br>
+              <a:rPr lang="en-US" sz="2800" dirty="0" smtClean="0"/>
+            </a:br>
+            <a:r>
+              <a:rPr lang="en-US" sz="2800" dirty="0" smtClean="0"/>
+              <a:t>(178 times / 26,894 tokens)</a:t>
+            </a:r>
+            <a:br>
+              <a:rPr lang="en-US" sz="2800" dirty="0" smtClean="0"/>
+            </a:br>
+            <a:endParaRPr lang="en-US" sz="2800" dirty="0" smtClean="0"/>
+          </a:p>
+          <a:p>
+            <a:pPr marL="457200" indent="-457200">
+              <a:buFont typeface="Arial" panose="020B0604020202020204" pitchFamily="34" charset="0"/>
+              <a:buChar char="•"/>
+            </a:pPr>
+            <a:r>
+              <a:rPr lang="en-US" sz="2800" dirty="0" smtClean="0"/>
+              <a:t>Aeschylus: frequency = 3% of #-</a:t>
+            </a:r>
+            <a:r>
+              <a:rPr lang="en-US" sz="2800" dirty="0" err="1" smtClean="0"/>
+              <a:t>pred</a:t>
+            </a:r>
+            <a:r>
+              <a:rPr lang="en-US" sz="2800" dirty="0" smtClean="0"/>
+              <a:t>-v</a:t>
+            </a:r>
+            <a:br>
+              <a:rPr lang="en-US" sz="2800" dirty="0" smtClean="0"/>
+            </a:br>
+            <a:r>
+              <a:rPr lang="en-US" sz="2800" dirty="0" smtClean="0"/>
+              <a:t>(14 times / 45, 682 tokens)</a:t>
+            </a:r>
+          </a:p>
+          <a:p>
+            <a:endParaRPr lang="en-US" sz="2800" dirty="0"/>
+          </a:p>
+          <a:p>
+            <a:endParaRPr lang="en-US" sz="2800" dirty="0" smtClean="0"/>
+          </a:p>
+          <a:p>
+            <a:endParaRPr lang="en-US" sz="2800" dirty="0"/>
+          </a:p>
+        </p:txBody>
+      </p:sp>
     </p:spTree>
     <p:extLst>
       <p:ext uri="{BB962C8B-B14F-4D97-AF65-F5344CB8AC3E}">
-        <p14:creationId xmlns:p14="http://schemas.microsoft.com/office/powerpoint/2010/main" val="21488030"/>
+        <p14:creationId xmlns:p14="http://schemas.microsoft.com/office/powerpoint/2010/main" val="359706117"/>
       </p:ext>
     </p:extLst>
   </p:cSld>
@@ -6770,6 +7073,47 @@
           <a:chExt cx="0" cy="0"/>
         </a:xfrm>
       </p:grpSpPr>
+      <p:pic>
+        <p:nvPicPr>
+          <p:cNvPr id="1026" name="Picture 2" descr="C:\Users\Bob Gorman\AppData\Local\Skitch\Screenshot_111615_023113_PM.jpg"/>
+          <p:cNvPicPr>
+            <a:picLocks noChangeAspect="1" noChangeArrowheads="1"/>
+          </p:cNvPicPr>
+          <p:nvPr/>
+        </p:nvPicPr>
+        <p:blipFill>
+          <a:blip r:embed="rId2">
+            <a:extLst>
+              <a:ext uri="{28A0092B-C50C-407E-A947-70E740481C1C}">
+                <a14:useLocalDpi xmlns:a14="http://schemas.microsoft.com/office/drawing/2010/main" val="0"/>
+              </a:ext>
+            </a:extLst>
+          </a:blip>
+          <a:srcRect/>
+          <a:stretch>
+            <a:fillRect/>
+          </a:stretch>
+        </p:blipFill>
+        <p:spPr bwMode="auto">
+          <a:xfrm>
+            <a:off x="533401" y="397344"/>
+            <a:ext cx="7591424" cy="5698656"/>
+          </a:xfrm>
+          <a:prstGeom prst="rect">
+            <a:avLst/>
+          </a:prstGeom>
+          <a:noFill/>
+          <a:extLst>
+            <a:ext uri="{909E8E84-426E-40DD-AFC4-6F175D3DCCD1}">
+              <a14:hiddenFill xmlns:a14="http://schemas.microsoft.com/office/drawing/2010/main">
+                <a:solidFill>
+                  <a:srgbClr val="FFFFFF"/>
+                </a:solidFill>
+              </a14:hiddenFill>
+            </a:ext>
+          </a:extLst>
+        </p:spPr>
+      </p:pic>
     </p:spTree>
     <p:extLst>
       <p:ext uri="{BB962C8B-B14F-4D97-AF65-F5344CB8AC3E}">
@@ -6800,10 +7144,442 @@
           <a:chExt cx="0" cy="0"/>
         </a:xfrm>
       </p:grpSpPr>
+      <p:pic>
+        <p:nvPicPr>
+          <p:cNvPr id="7170" name="Picture 2" descr="C:\Users\Bob Gorman\AppData\Local\Skitch\Screenshot_111315_063818_PM.jpg"/>
+          <p:cNvPicPr>
+            <a:picLocks noChangeAspect="1" noChangeArrowheads="1"/>
+          </p:cNvPicPr>
+          <p:nvPr/>
+        </p:nvPicPr>
+        <p:blipFill>
+          <a:blip r:embed="rId2">
+            <a:extLst>
+              <a:ext uri="{28A0092B-C50C-407E-A947-70E740481C1C}">
+                <a14:useLocalDpi xmlns:a14="http://schemas.microsoft.com/office/drawing/2010/main" val="0"/>
+              </a:ext>
+            </a:extLst>
+          </a:blip>
+          <a:srcRect/>
+          <a:stretch>
+            <a:fillRect/>
+          </a:stretch>
+        </p:blipFill>
+        <p:spPr bwMode="auto">
+          <a:xfrm>
+            <a:off x="1143000" y="533400"/>
+            <a:ext cx="6934199" cy="5040594"/>
+          </a:xfrm>
+          <a:prstGeom prst="rect">
+            <a:avLst/>
+          </a:prstGeom>
+          <a:noFill/>
+          <a:extLst>
+            <a:ext uri="{909E8E84-426E-40DD-AFC4-6F175D3DCCD1}">
+              <a14:hiddenFill xmlns:a14="http://schemas.microsoft.com/office/drawing/2010/main">
+                <a:solidFill>
+                  <a:srgbClr val="FFFFFF"/>
+                </a:solidFill>
+              </a14:hiddenFill>
+            </a:ext>
+          </a:extLst>
+        </p:spPr>
+      </p:pic>
     </p:spTree>
     <p:extLst>
       <p:ext uri="{BB962C8B-B14F-4D97-AF65-F5344CB8AC3E}">
-        <p14:creationId xmlns:p14="http://schemas.microsoft.com/office/powerpoint/2010/main" val="21488030"/>
+        <p14:creationId xmlns:p14="http://schemas.microsoft.com/office/powerpoint/2010/main" val="1316849322"/>
+      </p:ext>
+    </p:extLst>
+  </p:cSld>
+  <p:clrMapOvr>
+    <a:masterClrMapping/>
+  </p:clrMapOvr>
+</p:sld>
+</file>
+
+<file path=ppt/slides/slide47.xml><?xml version="1.0" encoding="utf-8"?>
+<p:sld xmlns:a="http://schemas.openxmlformats.org/drawingml/2006/main" xmlns:r="http://schemas.openxmlformats.org/officeDocument/2006/relationships" xmlns:p="http://schemas.openxmlformats.org/presentationml/2006/main">
+  <p:cSld>
+    <p:spTree>
+      <p:nvGrpSpPr>
+        <p:cNvPr id="1" name=""/>
+        <p:cNvGrpSpPr/>
+        <p:nvPr/>
+      </p:nvGrpSpPr>
+      <p:grpSpPr>
+        <a:xfrm>
+          <a:off x="0" y="0"/>
+          <a:ext cx="0" cy="0"/>
+          <a:chOff x="0" y="0"/>
+          <a:chExt cx="0" cy="0"/>
+        </a:xfrm>
+      </p:grpSpPr>
+      <p:pic>
+        <p:nvPicPr>
+          <p:cNvPr id="2050" name="Picture 2" descr="C:\Users\Bob Gorman\AppData\Local\Skitch\Screenshot_111615_023821_PM.jpg"/>
+          <p:cNvPicPr>
+            <a:picLocks noChangeAspect="1" noChangeArrowheads="1"/>
+          </p:cNvPicPr>
+          <p:nvPr/>
+        </p:nvPicPr>
+        <p:blipFill>
+          <a:blip r:embed="rId2">
+            <a:extLst>
+              <a:ext uri="{28A0092B-C50C-407E-A947-70E740481C1C}">
+                <a14:useLocalDpi xmlns:a14="http://schemas.microsoft.com/office/drawing/2010/main" val="0"/>
+              </a:ext>
+            </a:extLst>
+          </a:blip>
+          <a:srcRect/>
+          <a:stretch>
+            <a:fillRect/>
+          </a:stretch>
+        </p:blipFill>
+        <p:spPr bwMode="auto">
+          <a:xfrm>
+            <a:off x="838200" y="304800"/>
+            <a:ext cx="7772400" cy="5834509"/>
+          </a:xfrm>
+          <a:prstGeom prst="rect">
+            <a:avLst/>
+          </a:prstGeom>
+          <a:noFill/>
+          <a:extLst>
+            <a:ext uri="{909E8E84-426E-40DD-AFC4-6F175D3DCCD1}">
+              <a14:hiddenFill xmlns:a14="http://schemas.microsoft.com/office/drawing/2010/main">
+                <a:solidFill>
+                  <a:srgbClr val="FFFFFF"/>
+                </a:solidFill>
+              </a14:hiddenFill>
+            </a:ext>
+          </a:extLst>
+        </p:spPr>
+      </p:pic>
+      <p:sp>
+        <p:nvSpPr>
+          <p:cNvPr id="2" name="TextBox 1"/>
+          <p:cNvSpPr txBox="1"/>
+          <p:nvPr/>
+        </p:nvSpPr>
+        <p:spPr>
+          <a:xfrm>
+            <a:off x="2286000" y="1447800"/>
+            <a:ext cx="2273379" cy="523220"/>
+          </a:xfrm>
+          <a:prstGeom prst="rect">
+            <a:avLst/>
+          </a:prstGeom>
+          <a:noFill/>
+        </p:spPr>
+        <p:txBody>
+          <a:bodyPr wrap="none" rtlCol="0">
+            <a:spAutoFit/>
+          </a:bodyPr>
+          <a:lstStyle/>
+          <a:p>
+            <a:r>
+              <a:rPr lang="en-US" sz="2800" dirty="0" smtClean="0"/>
+              <a:t>Relation alone</a:t>
+            </a:r>
+            <a:endParaRPr lang="en-US" sz="2800" dirty="0"/>
+          </a:p>
+        </p:txBody>
+      </p:sp>
+    </p:spTree>
+    <p:extLst>
+      <p:ext uri="{BB962C8B-B14F-4D97-AF65-F5344CB8AC3E}">
+        <p14:creationId xmlns:p14="http://schemas.microsoft.com/office/powerpoint/2010/main" val="3453052883"/>
+      </p:ext>
+    </p:extLst>
+  </p:cSld>
+  <p:clrMapOvr>
+    <a:masterClrMapping/>
+  </p:clrMapOvr>
+</p:sld>
+</file>
+
+<file path=ppt/slides/slide48.xml><?xml version="1.0" encoding="utf-8"?>
+<p:sld xmlns:a="http://schemas.openxmlformats.org/drawingml/2006/main" xmlns:r="http://schemas.openxmlformats.org/officeDocument/2006/relationships" xmlns:p="http://schemas.openxmlformats.org/presentationml/2006/main">
+  <p:cSld>
+    <p:spTree>
+      <p:nvGrpSpPr>
+        <p:cNvPr id="1" name=""/>
+        <p:cNvGrpSpPr/>
+        <p:nvPr/>
+      </p:nvGrpSpPr>
+      <p:grpSpPr>
+        <a:xfrm>
+          <a:off x="0" y="0"/>
+          <a:ext cx="0" cy="0"/>
+          <a:chOff x="0" y="0"/>
+          <a:chExt cx="0" cy="0"/>
+        </a:xfrm>
+      </p:grpSpPr>
+      <p:pic>
+        <p:nvPicPr>
+          <p:cNvPr id="8194" name="Picture 2" descr="C:\Users\Bob Gorman\AppData\Local\Skitch\Screenshot_111315_063925_PM.jpg"/>
+          <p:cNvPicPr>
+            <a:picLocks noChangeAspect="1" noChangeArrowheads="1"/>
+          </p:cNvPicPr>
+          <p:nvPr/>
+        </p:nvPicPr>
+        <p:blipFill>
+          <a:blip r:embed="rId2">
+            <a:extLst>
+              <a:ext uri="{28A0092B-C50C-407E-A947-70E740481C1C}">
+                <a14:useLocalDpi xmlns:a14="http://schemas.microsoft.com/office/drawing/2010/main" val="0"/>
+              </a:ext>
+            </a:extLst>
+          </a:blip>
+          <a:srcRect/>
+          <a:stretch>
+            <a:fillRect/>
+          </a:stretch>
+        </p:blipFill>
+        <p:spPr bwMode="auto">
+          <a:xfrm>
+            <a:off x="1007912" y="457200"/>
+            <a:ext cx="7145488" cy="5194184"/>
+          </a:xfrm>
+          <a:prstGeom prst="rect">
+            <a:avLst/>
+          </a:prstGeom>
+          <a:noFill/>
+          <a:extLst>
+            <a:ext uri="{909E8E84-426E-40DD-AFC4-6F175D3DCCD1}">
+              <a14:hiddenFill xmlns:a14="http://schemas.microsoft.com/office/drawing/2010/main">
+                <a:solidFill>
+                  <a:srgbClr val="FFFFFF"/>
+                </a:solidFill>
+              </a14:hiddenFill>
+            </a:ext>
+          </a:extLst>
+        </p:spPr>
+      </p:pic>
+      <p:sp>
+        <p:nvSpPr>
+          <p:cNvPr id="2" name="TextBox 1"/>
+          <p:cNvSpPr txBox="1"/>
+          <p:nvPr/>
+        </p:nvSpPr>
+        <p:spPr>
+          <a:xfrm>
+            <a:off x="4724400" y="914400"/>
+            <a:ext cx="2895600" cy="461665"/>
+          </a:xfrm>
+          <a:prstGeom prst="rect">
+            <a:avLst/>
+          </a:prstGeom>
+          <a:noFill/>
+        </p:spPr>
+        <p:txBody>
+          <a:bodyPr wrap="square" rtlCol="0">
+            <a:spAutoFit/>
+          </a:bodyPr>
+          <a:lstStyle/>
+          <a:p>
+            <a:r>
+              <a:rPr lang="en-US" sz="2400" dirty="0" smtClean="0"/>
+              <a:t>Relation + POS</a:t>
+            </a:r>
+            <a:endParaRPr lang="en-US" sz="2400" dirty="0"/>
+          </a:p>
+        </p:txBody>
+      </p:sp>
+    </p:spTree>
+    <p:extLst>
+      <p:ext uri="{BB962C8B-B14F-4D97-AF65-F5344CB8AC3E}">
+        <p14:creationId xmlns:p14="http://schemas.microsoft.com/office/powerpoint/2010/main" val="3910361439"/>
+      </p:ext>
+    </p:extLst>
+  </p:cSld>
+  <p:clrMapOvr>
+    <a:masterClrMapping/>
+  </p:clrMapOvr>
+</p:sld>
+</file>
+
+<file path=ppt/slides/slide49.xml><?xml version="1.0" encoding="utf-8"?>
+<p:sld xmlns:a="http://schemas.openxmlformats.org/drawingml/2006/main" xmlns:r="http://schemas.openxmlformats.org/officeDocument/2006/relationships" xmlns:p="http://schemas.openxmlformats.org/presentationml/2006/main">
+  <p:cSld>
+    <p:spTree>
+      <p:nvGrpSpPr>
+        <p:cNvPr id="1" name=""/>
+        <p:cNvGrpSpPr/>
+        <p:nvPr/>
+      </p:nvGrpSpPr>
+      <p:grpSpPr>
+        <a:xfrm>
+          <a:off x="0" y="0"/>
+          <a:ext cx="0" cy="0"/>
+          <a:chOff x="0" y="0"/>
+          <a:chExt cx="0" cy="0"/>
+        </a:xfrm>
+      </p:grpSpPr>
+      <p:pic>
+        <p:nvPicPr>
+          <p:cNvPr id="3075" name="Picture 3" descr="C:\Users\Bob Gorman\AppData\Local\Skitch\Screenshot_111615_041736_PM.jpg"/>
+          <p:cNvPicPr>
+            <a:picLocks noChangeAspect="1" noChangeArrowheads="1"/>
+          </p:cNvPicPr>
+          <p:nvPr/>
+        </p:nvPicPr>
+        <p:blipFill>
+          <a:blip r:embed="rId2">
+            <a:extLst>
+              <a:ext uri="{28A0092B-C50C-407E-A947-70E740481C1C}">
+                <a14:useLocalDpi xmlns:a14="http://schemas.microsoft.com/office/drawing/2010/main" val="0"/>
+              </a:ext>
+            </a:extLst>
+          </a:blip>
+          <a:srcRect/>
+          <a:stretch>
+            <a:fillRect/>
+          </a:stretch>
+        </p:blipFill>
+        <p:spPr bwMode="auto">
+          <a:xfrm>
+            <a:off x="2971800" y="923453"/>
+            <a:ext cx="5448972" cy="5029200"/>
+          </a:xfrm>
+          <a:prstGeom prst="rect">
+            <a:avLst/>
+          </a:prstGeom>
+          <a:noFill/>
+          <a:extLst>
+            <a:ext uri="{909E8E84-426E-40DD-AFC4-6F175D3DCCD1}">
+              <a14:hiddenFill xmlns:a14="http://schemas.microsoft.com/office/drawing/2010/main">
+                <a:solidFill>
+                  <a:srgbClr val="FFFFFF"/>
+                </a:solidFill>
+              </a14:hiddenFill>
+            </a:ext>
+          </a:extLst>
+        </p:spPr>
+      </p:pic>
+      <p:sp>
+        <p:nvSpPr>
+          <p:cNvPr id="2" name="TextBox 1"/>
+          <p:cNvSpPr txBox="1"/>
+          <p:nvPr/>
+        </p:nvSpPr>
+        <p:spPr>
+          <a:xfrm>
+            <a:off x="3733800" y="228600"/>
+            <a:ext cx="1686744" cy="523220"/>
+          </a:xfrm>
+          <a:prstGeom prst="rect">
+            <a:avLst/>
+          </a:prstGeom>
+          <a:noFill/>
+        </p:spPr>
+        <p:txBody>
+          <a:bodyPr wrap="none" rtlCol="0">
+            <a:spAutoFit/>
+          </a:bodyPr>
+          <a:lstStyle/>
+          <a:p>
+            <a:r>
+              <a:rPr lang="en-US" dirty="0" smtClean="0"/>
+              <a:t>#-</a:t>
+            </a:r>
+            <a:r>
+              <a:rPr lang="en-US" sz="2800" dirty="0" err="1" smtClean="0"/>
+              <a:t>pred</a:t>
+            </a:r>
+            <a:r>
+              <a:rPr lang="en-US" sz="2800" dirty="0" smtClean="0"/>
+              <a:t>*</a:t>
+            </a:r>
+            <a:r>
+              <a:rPr lang="en-US" sz="2800" dirty="0" err="1" smtClean="0"/>
+              <a:t>obl</a:t>
+            </a:r>
+            <a:endParaRPr lang="en-US" sz="2800" dirty="0"/>
+          </a:p>
+        </p:txBody>
+      </p:sp>
+      <p:sp>
+        <p:nvSpPr>
+          <p:cNvPr id="3" name="TextBox 2"/>
+          <p:cNvSpPr txBox="1"/>
+          <p:nvPr/>
+        </p:nvSpPr>
+        <p:spPr>
+          <a:xfrm>
+            <a:off x="304800" y="1219200"/>
+            <a:ext cx="2514600" cy="1077218"/>
+          </a:xfrm>
+          <a:prstGeom prst="rect">
+            <a:avLst/>
+          </a:prstGeom>
+          <a:noFill/>
+        </p:spPr>
+        <p:txBody>
+          <a:bodyPr wrap="square" rtlCol="0">
+            <a:spAutoFit/>
+          </a:bodyPr>
+          <a:lstStyle/>
+          <a:p>
+            <a:r>
+              <a:rPr lang="en-US" sz="3200" dirty="0" err="1" smtClean="0"/>
+              <a:t>Gps</a:t>
+            </a:r>
+            <a:r>
+              <a:rPr lang="en-US" sz="3200" dirty="0" smtClean="0"/>
+              <a:t>.: 1784</a:t>
+            </a:r>
+          </a:p>
+          <a:p>
+            <a:r>
+              <a:rPr lang="en-US" sz="3200" dirty="0" smtClean="0"/>
+              <a:t>Others: 948</a:t>
+            </a:r>
+            <a:endParaRPr lang="en-US" sz="3200" dirty="0"/>
+          </a:p>
+        </p:txBody>
+      </p:sp>
+      <p:sp>
+        <p:nvSpPr>
+          <p:cNvPr id="4" name="Rectangle 3"/>
+          <p:cNvSpPr/>
+          <p:nvPr/>
+        </p:nvSpPr>
+        <p:spPr>
+          <a:xfrm>
+            <a:off x="2505055" y="6172200"/>
+            <a:ext cx="4133889" cy="369332"/>
+          </a:xfrm>
+          <a:prstGeom prst="rect">
+            <a:avLst/>
+          </a:prstGeom>
+        </p:spPr>
+        <p:txBody>
+          <a:bodyPr wrap="none">
+            <a:spAutoFit/>
+          </a:bodyPr>
+          <a:lstStyle/>
+          <a:p>
+            <a:r>
+              <a:rPr lang="en-US" dirty="0"/>
+              <a:t>Luke 1:12, καὶ </a:t>
+            </a:r>
+            <a:r>
+              <a:rPr lang="en-US" dirty="0" err="1"/>
+              <a:t>φό</a:t>
+            </a:r>
+            <a:r>
+              <a:rPr lang="en-US" dirty="0"/>
+              <a:t>βος ἐπέπεσεν ἐπ’ αὐτόν.</a:t>
+            </a:r>
+          </a:p>
+        </p:txBody>
+      </p:sp>
+    </p:spTree>
+    <p:extLst>
+      <p:ext uri="{BB962C8B-B14F-4D97-AF65-F5344CB8AC3E}">
+        <p14:creationId xmlns:p14="http://schemas.microsoft.com/office/powerpoint/2010/main" val="28840728"/>
       </p:ext>
     </p:extLst>
   </p:cSld>
@@ -6814,6 +7590,481 @@
 </file>
 
 <file path=ppt/slides/slide5.xml><?xml version="1.0" encoding="utf-8"?>
+<p:sld xmlns:a="http://schemas.openxmlformats.org/drawingml/2006/main" xmlns:r="http://schemas.openxmlformats.org/officeDocument/2006/relationships" xmlns:p="http://schemas.openxmlformats.org/presentationml/2006/main">
+  <p:cSld>
+    <p:spTree>
+      <p:nvGrpSpPr>
+        <p:cNvPr id="1" name=""/>
+        <p:cNvGrpSpPr/>
+        <p:nvPr/>
+      </p:nvGrpSpPr>
+      <p:grpSpPr>
+        <a:xfrm>
+          <a:off x="0" y="0"/>
+          <a:ext cx="0" cy="0"/>
+          <a:chOff x="0" y="0"/>
+          <a:chExt cx="0" cy="0"/>
+        </a:xfrm>
+      </p:grpSpPr>
+    </p:spTree>
+    <p:extLst>
+      <p:ext uri="{BB962C8B-B14F-4D97-AF65-F5344CB8AC3E}">
+        <p14:creationId xmlns:p14="http://schemas.microsoft.com/office/powerpoint/2010/main" val="953151465"/>
+      </p:ext>
+    </p:extLst>
+  </p:cSld>
+  <p:clrMapOvr>
+    <a:masterClrMapping/>
+  </p:clrMapOvr>
+</p:sld>
+</file>
+
+<file path=ppt/slides/slide50.xml><?xml version="1.0" encoding="utf-8"?>
+<p:sld xmlns:a="http://schemas.openxmlformats.org/drawingml/2006/main" xmlns:r="http://schemas.openxmlformats.org/officeDocument/2006/relationships" xmlns:p="http://schemas.openxmlformats.org/presentationml/2006/main">
+  <p:cSld>
+    <p:spTree>
+      <p:nvGrpSpPr>
+        <p:cNvPr id="1" name=""/>
+        <p:cNvGrpSpPr/>
+        <p:nvPr/>
+      </p:nvGrpSpPr>
+      <p:grpSpPr>
+        <a:xfrm>
+          <a:off x="0" y="0"/>
+          <a:ext cx="0" cy="0"/>
+          <a:chOff x="0" y="0"/>
+          <a:chExt cx="0" cy="0"/>
+        </a:xfrm>
+      </p:grpSpPr>
+      <p:pic>
+        <p:nvPicPr>
+          <p:cNvPr id="4098" name="Picture 2" descr="C:\Users\Bob Gorman\AppData\Local\Skitch\Screenshot_111615_042245_PM.jpg"/>
+          <p:cNvPicPr>
+            <a:picLocks noChangeAspect="1" noChangeArrowheads="1"/>
+          </p:cNvPicPr>
+          <p:nvPr/>
+        </p:nvPicPr>
+        <p:blipFill>
+          <a:blip r:embed="rId2">
+            <a:extLst>
+              <a:ext uri="{28A0092B-C50C-407E-A947-70E740481C1C}">
+                <a14:useLocalDpi xmlns:a14="http://schemas.microsoft.com/office/drawing/2010/main" val="0"/>
+              </a:ext>
+            </a:extLst>
+          </a:blip>
+          <a:srcRect/>
+          <a:stretch>
+            <a:fillRect/>
+          </a:stretch>
+        </p:blipFill>
+        <p:spPr bwMode="auto">
+          <a:xfrm>
+            <a:off x="2133600" y="990600"/>
+            <a:ext cx="4556125" cy="4732244"/>
+          </a:xfrm>
+          <a:prstGeom prst="rect">
+            <a:avLst/>
+          </a:prstGeom>
+          <a:noFill/>
+          <a:extLst>
+            <a:ext uri="{909E8E84-426E-40DD-AFC4-6F175D3DCCD1}">
+              <a14:hiddenFill xmlns:a14="http://schemas.microsoft.com/office/drawing/2010/main">
+                <a:solidFill>
+                  <a:srgbClr val="FFFFFF"/>
+                </a:solidFill>
+              </a14:hiddenFill>
+            </a:ext>
+          </a:extLst>
+        </p:spPr>
+      </p:pic>
+      <p:sp>
+        <p:nvSpPr>
+          <p:cNvPr id="4" name="TextBox 3"/>
+          <p:cNvSpPr txBox="1"/>
+          <p:nvPr/>
+        </p:nvSpPr>
+        <p:spPr>
+          <a:xfrm>
+            <a:off x="3048000" y="381000"/>
+            <a:ext cx="2279727" cy="523220"/>
+          </a:xfrm>
+          <a:prstGeom prst="rect">
+            <a:avLst/>
+          </a:prstGeom>
+          <a:noFill/>
+        </p:spPr>
+        <p:txBody>
+          <a:bodyPr wrap="none" rtlCol="0">
+            <a:spAutoFit/>
+          </a:bodyPr>
+          <a:lstStyle/>
+          <a:p>
+            <a:r>
+              <a:rPr lang="en-US" dirty="0" smtClean="0"/>
+              <a:t>#-</a:t>
+            </a:r>
+            <a:r>
+              <a:rPr lang="en-US" sz="2800" dirty="0" err="1" smtClean="0"/>
+              <a:t>pred</a:t>
+            </a:r>
+            <a:r>
+              <a:rPr lang="en-US" sz="2800" dirty="0" smtClean="0"/>
+              <a:t>*</a:t>
+            </a:r>
+            <a:r>
+              <a:rPr lang="en-US" sz="2800" dirty="0" err="1" smtClean="0"/>
+              <a:t>obl</a:t>
+            </a:r>
+            <a:r>
+              <a:rPr lang="en-US" sz="2800" dirty="0" smtClean="0"/>
+              <a:t>*</a:t>
+            </a:r>
+            <a:r>
+              <a:rPr lang="en-US" sz="2800" dirty="0" err="1" smtClean="0"/>
+              <a:t>atr</a:t>
+            </a:r>
+            <a:endParaRPr lang="en-US" sz="2800" dirty="0"/>
+          </a:p>
+        </p:txBody>
+      </p:sp>
+      <p:sp>
+        <p:nvSpPr>
+          <p:cNvPr id="3" name="Rectangle 2"/>
+          <p:cNvSpPr/>
+          <p:nvPr/>
+        </p:nvSpPr>
+        <p:spPr>
+          <a:xfrm>
+            <a:off x="1447800" y="5943600"/>
+            <a:ext cx="5730875" cy="369332"/>
+          </a:xfrm>
+          <a:prstGeom prst="rect">
+            <a:avLst/>
+          </a:prstGeom>
+        </p:spPr>
+        <p:txBody>
+          <a:bodyPr wrap="square">
+            <a:spAutoFit/>
+          </a:bodyPr>
+          <a:lstStyle/>
+          <a:p>
+            <a:r>
+              <a:rPr lang="en-US" dirty="0"/>
+              <a:t>Luke 5:7, καὶ κα</a:t>
+            </a:r>
+            <a:r>
+              <a:rPr lang="en-US" dirty="0" err="1"/>
+              <a:t>τένευσ</a:t>
+            </a:r>
+            <a:r>
+              <a:rPr lang="en-US" dirty="0"/>
+              <a:t>αν τοῖς μετόχοις ἐν τῷ ἑτέρῳ πλοίῳ</a:t>
+            </a:r>
+          </a:p>
+        </p:txBody>
+      </p:sp>
+    </p:spTree>
+    <p:extLst>
+      <p:ext uri="{BB962C8B-B14F-4D97-AF65-F5344CB8AC3E}">
+        <p14:creationId xmlns:p14="http://schemas.microsoft.com/office/powerpoint/2010/main" val="28840728"/>
+      </p:ext>
+    </p:extLst>
+  </p:cSld>
+  <p:clrMapOvr>
+    <a:masterClrMapping/>
+  </p:clrMapOvr>
+</p:sld>
+</file>
+
+<file path=ppt/slides/slide51.xml><?xml version="1.0" encoding="utf-8"?>
+<p:sld xmlns:a="http://schemas.openxmlformats.org/drawingml/2006/main" xmlns:r="http://schemas.openxmlformats.org/officeDocument/2006/relationships" xmlns:p="http://schemas.openxmlformats.org/presentationml/2006/main">
+  <p:cSld>
+    <p:spTree>
+      <p:nvGrpSpPr>
+        <p:cNvPr id="1" name=""/>
+        <p:cNvGrpSpPr/>
+        <p:nvPr/>
+      </p:nvGrpSpPr>
+      <p:grpSpPr>
+        <a:xfrm>
+          <a:off x="0" y="0"/>
+          <a:ext cx="0" cy="0"/>
+          <a:chOff x="0" y="0"/>
+          <a:chExt cx="0" cy="0"/>
+        </a:xfrm>
+      </p:grpSpPr>
+      <p:pic>
+        <p:nvPicPr>
+          <p:cNvPr id="5122" name="Picture 2" descr="C:\Users\Bob Gorman\AppData\Local\Skitch\Screenshot_111615_042605_PM.jpg"/>
+          <p:cNvPicPr>
+            <a:picLocks noChangeAspect="1" noChangeArrowheads="1"/>
+          </p:cNvPicPr>
+          <p:nvPr/>
+        </p:nvPicPr>
+        <p:blipFill>
+          <a:blip r:embed="rId2">
+            <a:extLst>
+              <a:ext uri="{28A0092B-C50C-407E-A947-70E740481C1C}">
+                <a14:useLocalDpi xmlns:a14="http://schemas.microsoft.com/office/drawing/2010/main" val="0"/>
+              </a:ext>
+            </a:extLst>
+          </a:blip>
+          <a:srcRect/>
+          <a:stretch>
+            <a:fillRect/>
+          </a:stretch>
+        </p:blipFill>
+        <p:spPr bwMode="auto">
+          <a:xfrm>
+            <a:off x="2502528" y="914400"/>
+            <a:ext cx="6290373" cy="4191000"/>
+          </a:xfrm>
+          <a:prstGeom prst="rect">
+            <a:avLst/>
+          </a:prstGeom>
+          <a:noFill/>
+          <a:extLst>
+            <a:ext uri="{909E8E84-426E-40DD-AFC4-6F175D3DCCD1}">
+              <a14:hiddenFill xmlns:a14="http://schemas.microsoft.com/office/drawing/2010/main">
+                <a:solidFill>
+                  <a:srgbClr val="FFFFFF"/>
+                </a:solidFill>
+              </a14:hiddenFill>
+            </a:ext>
+          </a:extLst>
+        </p:spPr>
+      </p:pic>
+      <p:sp>
+        <p:nvSpPr>
+          <p:cNvPr id="2" name="Rectangle 1"/>
+          <p:cNvSpPr/>
+          <p:nvPr/>
+        </p:nvSpPr>
+        <p:spPr>
+          <a:xfrm>
+            <a:off x="3429000" y="222492"/>
+            <a:ext cx="3124200" cy="584775"/>
+          </a:xfrm>
+          <a:prstGeom prst="rect">
+            <a:avLst/>
+          </a:prstGeom>
+        </p:spPr>
+        <p:txBody>
+          <a:bodyPr wrap="square">
+            <a:spAutoFit/>
+          </a:bodyPr>
+          <a:lstStyle/>
+          <a:p>
+            <a:r>
+              <a:rPr lang="en-US" sz="3200" dirty="0" err="1"/>
+              <a:t>pred</a:t>
+            </a:r>
+            <a:r>
+              <a:rPr lang="en-US" sz="3200" dirty="0"/>
+              <a:t>*</a:t>
+            </a:r>
+            <a:r>
+              <a:rPr lang="en-US" sz="3200" dirty="0" err="1"/>
+              <a:t>obl</a:t>
+            </a:r>
+            <a:r>
+              <a:rPr lang="en-US" sz="3200" dirty="0"/>
+              <a:t>*</a:t>
+            </a:r>
+            <a:r>
+              <a:rPr lang="en-US" sz="3200" dirty="0" err="1"/>
+              <a:t>atr</a:t>
+            </a:r>
+            <a:endParaRPr lang="en-US" sz="3200" dirty="0"/>
+          </a:p>
+        </p:txBody>
+      </p:sp>
+      <p:sp>
+        <p:nvSpPr>
+          <p:cNvPr id="3" name="TextBox 2"/>
+          <p:cNvSpPr txBox="1"/>
+          <p:nvPr/>
+        </p:nvSpPr>
+        <p:spPr>
+          <a:xfrm>
+            <a:off x="152400" y="914400"/>
+            <a:ext cx="2819400" cy="1200329"/>
+          </a:xfrm>
+          <a:prstGeom prst="rect">
+            <a:avLst/>
+          </a:prstGeom>
+          <a:noFill/>
+        </p:spPr>
+        <p:txBody>
+          <a:bodyPr wrap="square" rtlCol="0">
+            <a:spAutoFit/>
+          </a:bodyPr>
+          <a:lstStyle/>
+          <a:p>
+            <a:r>
+              <a:rPr lang="en-US" sz="2400" dirty="0" err="1" smtClean="0"/>
+              <a:t>Gosp</a:t>
+            </a:r>
+            <a:r>
+              <a:rPr lang="en-US" sz="2400" dirty="0" smtClean="0"/>
+              <a:t>.: 68 / 1784</a:t>
+            </a:r>
+            <a:br>
+              <a:rPr lang="en-US" sz="2400" dirty="0" smtClean="0"/>
+            </a:br>
+            <a:endParaRPr lang="en-US" sz="2400" dirty="0" smtClean="0"/>
+          </a:p>
+          <a:p>
+            <a:r>
+              <a:rPr lang="en-US" sz="2400" dirty="0" smtClean="0"/>
+              <a:t>Other: 121 / 948</a:t>
+            </a:r>
+            <a:endParaRPr lang="en-US" sz="2400" dirty="0"/>
+          </a:p>
+        </p:txBody>
+      </p:sp>
+      <p:sp>
+        <p:nvSpPr>
+          <p:cNvPr id="4" name="Rectangle 3"/>
+          <p:cNvSpPr/>
+          <p:nvPr/>
+        </p:nvSpPr>
+        <p:spPr>
+          <a:xfrm>
+            <a:off x="1676400" y="5562600"/>
+            <a:ext cx="6553200" cy="369332"/>
+          </a:xfrm>
+          <a:prstGeom prst="rect">
+            <a:avLst/>
+          </a:prstGeom>
+        </p:spPr>
+        <p:txBody>
+          <a:bodyPr wrap="square">
+            <a:spAutoFit/>
+          </a:bodyPr>
+          <a:lstStyle/>
+          <a:p>
+            <a:r>
+              <a:rPr lang="en-US" dirty="0"/>
+              <a:t>Luke 5:8,  </a:t>
+            </a:r>
+            <a:r>
+              <a:rPr lang="en-US" dirty="0" err="1"/>
+              <a:t>ἰδὼν</a:t>
+            </a:r>
+            <a:r>
+              <a:rPr lang="en-US" dirty="0"/>
+              <a:t> </a:t>
+            </a:r>
+            <a:r>
+              <a:rPr lang="en-US" dirty="0" err="1"/>
+              <a:t>δὲ</a:t>
+            </a:r>
+            <a:r>
+              <a:rPr lang="en-US" dirty="0"/>
+              <a:t> </a:t>
+            </a:r>
+            <a:r>
+              <a:rPr lang="en-US" dirty="0" err="1"/>
+              <a:t>Σίμων</a:t>
+            </a:r>
+            <a:r>
+              <a:rPr lang="en-US" dirty="0"/>
+              <a:t> </a:t>
+            </a:r>
+            <a:r>
+              <a:rPr lang="en-US" dirty="0" err="1"/>
+              <a:t>Πέτρος</a:t>
+            </a:r>
+            <a:r>
+              <a:rPr lang="en-US" dirty="0"/>
+              <a:t> π</a:t>
+            </a:r>
+            <a:r>
+              <a:rPr lang="en-US" dirty="0" err="1"/>
+              <a:t>ροσέ</a:t>
+            </a:r>
+            <a:r>
+              <a:rPr lang="en-US" dirty="0"/>
+              <a:t>πεσεν τοῖς γόνασιν Ἰησοῦ</a:t>
+            </a:r>
+          </a:p>
+        </p:txBody>
+      </p:sp>
+    </p:spTree>
+    <p:extLst>
+      <p:ext uri="{BB962C8B-B14F-4D97-AF65-F5344CB8AC3E}">
+        <p14:creationId xmlns:p14="http://schemas.microsoft.com/office/powerpoint/2010/main" val="28840728"/>
+      </p:ext>
+    </p:extLst>
+  </p:cSld>
+  <p:clrMapOvr>
+    <a:masterClrMapping/>
+  </p:clrMapOvr>
+</p:sld>
+</file>
+
+<file path=ppt/slides/slide52.xml><?xml version="1.0" encoding="utf-8"?>
+<p:sld xmlns:a="http://schemas.openxmlformats.org/drawingml/2006/main" xmlns:r="http://schemas.openxmlformats.org/officeDocument/2006/relationships" xmlns:p="http://schemas.openxmlformats.org/presentationml/2006/main">
+  <p:cSld>
+    <p:spTree>
+      <p:nvGrpSpPr>
+        <p:cNvPr id="1" name=""/>
+        <p:cNvGrpSpPr/>
+        <p:nvPr/>
+      </p:nvGrpSpPr>
+      <p:grpSpPr>
+        <a:xfrm>
+          <a:off x="0" y="0"/>
+          <a:ext cx="0" cy="0"/>
+          <a:chOff x="0" y="0"/>
+          <a:chExt cx="0" cy="0"/>
+        </a:xfrm>
+      </p:grpSpPr>
+    </p:spTree>
+    <p:extLst>
+      <p:ext uri="{BB962C8B-B14F-4D97-AF65-F5344CB8AC3E}">
+        <p14:creationId xmlns:p14="http://schemas.microsoft.com/office/powerpoint/2010/main" val="3651251494"/>
+      </p:ext>
+    </p:extLst>
+  </p:cSld>
+  <p:clrMapOvr>
+    <a:masterClrMapping/>
+  </p:clrMapOvr>
+</p:sld>
+</file>
+
+<file path=ppt/slides/slide53.xml><?xml version="1.0" encoding="utf-8"?>
+<p:sld xmlns:a="http://schemas.openxmlformats.org/drawingml/2006/main" xmlns:r="http://schemas.openxmlformats.org/officeDocument/2006/relationships" xmlns:p="http://schemas.openxmlformats.org/presentationml/2006/main">
+  <p:cSld>
+    <p:spTree>
+      <p:nvGrpSpPr>
+        <p:cNvPr id="1" name=""/>
+        <p:cNvGrpSpPr/>
+        <p:nvPr/>
+      </p:nvGrpSpPr>
+      <p:grpSpPr>
+        <a:xfrm>
+          <a:off x="0" y="0"/>
+          <a:ext cx="0" cy="0"/>
+          <a:chOff x="0" y="0"/>
+          <a:chExt cx="0" cy="0"/>
+        </a:xfrm>
+      </p:grpSpPr>
+    </p:spTree>
+    <p:extLst>
+      <p:ext uri="{BB962C8B-B14F-4D97-AF65-F5344CB8AC3E}">
+        <p14:creationId xmlns:p14="http://schemas.microsoft.com/office/powerpoint/2010/main" val="3651251494"/>
+      </p:ext>
+    </p:extLst>
+  </p:cSld>
+  <p:clrMapOvr>
+    <a:masterClrMapping/>
+  </p:clrMapOvr>
+</p:sld>
+</file>
+
+<file path=ppt/slides/slide6.xml><?xml version="1.0" encoding="utf-8"?>
 <p:sld xmlns:a="http://schemas.openxmlformats.org/drawingml/2006/main" xmlns:r="http://schemas.openxmlformats.org/officeDocument/2006/relationships" xmlns:p="http://schemas.openxmlformats.org/presentationml/2006/main">
   <p:cSld>
     <p:spTree>
@@ -6944,7 +8195,7 @@
 </p:sld>
 </file>
 
-<file path=ppt/slides/slide6.xml><?xml version="1.0" encoding="utf-8"?>
+<file path=ppt/slides/slide7.xml><?xml version="1.0" encoding="utf-8"?>
 <p:sld xmlns:a="http://schemas.openxmlformats.org/drawingml/2006/main" xmlns:r="http://schemas.openxmlformats.org/officeDocument/2006/relationships" xmlns:p="http://schemas.openxmlformats.org/presentationml/2006/main">
   <p:cSld>
     <p:spTree>
@@ -7015,7 +8266,7 @@
 </p:sld>
 </file>
 
-<file path=ppt/slides/slide7.xml><?xml version="1.0" encoding="utf-8"?>
+<file path=ppt/slides/slide8.xml><?xml version="1.0" encoding="utf-8"?>
 <p:sld xmlns:a="http://schemas.openxmlformats.org/drawingml/2006/main" xmlns:r="http://schemas.openxmlformats.org/officeDocument/2006/relationships" xmlns:p="http://schemas.openxmlformats.org/presentationml/2006/main">
   <p:cSld>
     <p:spTree>
@@ -7127,7 +8378,7 @@
 </p:sld>
 </file>
 
-<file path=ppt/slides/slide8.xml><?xml version="1.0" encoding="utf-8"?>
+<file path=ppt/slides/slide9.xml><?xml version="1.0" encoding="utf-8"?>
 <p:sld xmlns:a="http://schemas.openxmlformats.org/drawingml/2006/main" xmlns:r="http://schemas.openxmlformats.org/officeDocument/2006/relationships" xmlns:p="http://schemas.openxmlformats.org/presentationml/2006/main">
   <p:cSld>
     <p:spTree>
@@ -7214,200 +8465,6 @@
       </p:par>
     </p:tnLst>
   </p:timing>
-</p:sld>
-</file>
-
-<file path=ppt/slides/slide9.xml><?xml version="1.0" encoding="utf-8"?>
-<p:sld xmlns:a="http://schemas.openxmlformats.org/drawingml/2006/main" xmlns:r="http://schemas.openxmlformats.org/officeDocument/2006/relationships" xmlns:p="http://schemas.openxmlformats.org/presentationml/2006/main">
-  <p:cSld>
-    <p:spTree>
-      <p:nvGrpSpPr>
-        <p:cNvPr id="1" name=""/>
-        <p:cNvGrpSpPr/>
-        <p:nvPr/>
-      </p:nvGrpSpPr>
-      <p:grpSpPr>
-        <a:xfrm>
-          <a:off x="0" y="0"/>
-          <a:ext cx="0" cy="0"/>
-          <a:chOff x="0" y="0"/>
-          <a:chExt cx="0" cy="0"/>
-        </a:xfrm>
-      </p:grpSpPr>
-      <p:pic>
-        <p:nvPicPr>
-          <p:cNvPr id="6146" name="Picture 2" descr="C:\Users\Bob Gorman\AppData\Local\Skitch\Screenshot_111315_062316_PM.jpg"/>
-          <p:cNvPicPr>
-            <a:picLocks noChangeAspect="1" noChangeArrowheads="1"/>
-          </p:cNvPicPr>
-          <p:nvPr/>
-        </p:nvPicPr>
-        <p:blipFill>
-          <a:blip r:embed="rId2">
-            <a:extLst>
-              <a:ext uri="{28A0092B-C50C-407E-A947-70E740481C1C}">
-                <a14:useLocalDpi xmlns:a14="http://schemas.microsoft.com/office/drawing/2010/main" val="0"/>
-              </a:ext>
-            </a:extLst>
-          </a:blip>
-          <a:srcRect/>
-          <a:stretch>
-            <a:fillRect/>
-          </a:stretch>
-        </p:blipFill>
-        <p:spPr bwMode="auto">
-          <a:xfrm>
-            <a:off x="228600" y="457200"/>
-            <a:ext cx="8258960" cy="2299430"/>
-          </a:xfrm>
-          <a:prstGeom prst="rect">
-            <a:avLst/>
-          </a:prstGeom>
-          <a:noFill/>
-          <a:extLst>
-            <a:ext uri="{909E8E84-426E-40DD-AFC4-6F175D3DCCD1}">
-              <a14:hiddenFill xmlns:a14="http://schemas.microsoft.com/office/drawing/2010/main">
-                <a:solidFill>
-                  <a:srgbClr val="FFFFFF"/>
-                </a:solidFill>
-              </a14:hiddenFill>
-            </a:ext>
-          </a:extLst>
-        </p:spPr>
-      </p:pic>
-      <p:pic>
-        <p:nvPicPr>
-          <p:cNvPr id="6150" name="Picture 6" descr="C:\Users\Bob Gorman\AppData\Local\Skitch\Screenshot_111315_062800_PM.jpg"/>
-          <p:cNvPicPr>
-            <a:picLocks noChangeAspect="1" noChangeArrowheads="1"/>
-          </p:cNvPicPr>
-          <p:nvPr/>
-        </p:nvPicPr>
-        <p:blipFill>
-          <a:blip r:embed="rId3">
-            <a:extLst>
-              <a:ext uri="{28A0092B-C50C-407E-A947-70E740481C1C}">
-                <a14:useLocalDpi xmlns:a14="http://schemas.microsoft.com/office/drawing/2010/main" val="0"/>
-              </a:ext>
-            </a:extLst>
-          </a:blip>
-          <a:srcRect/>
-          <a:stretch>
-            <a:fillRect/>
-          </a:stretch>
-        </p:blipFill>
-        <p:spPr bwMode="auto">
-          <a:xfrm>
-            <a:off x="762000" y="2891817"/>
-            <a:ext cx="2257968" cy="3276600"/>
-          </a:xfrm>
-          <a:prstGeom prst="rect">
-            <a:avLst/>
-          </a:prstGeom>
-          <a:noFill/>
-          <a:extLst>
-            <a:ext uri="{909E8E84-426E-40DD-AFC4-6F175D3DCCD1}">
-              <a14:hiddenFill xmlns:a14="http://schemas.microsoft.com/office/drawing/2010/main">
-                <a:solidFill>
-                  <a:srgbClr val="FFFFFF"/>
-                </a:solidFill>
-              </a14:hiddenFill>
-            </a:ext>
-          </a:extLst>
-        </p:spPr>
-      </p:pic>
-      <p:pic>
-        <p:nvPicPr>
-          <p:cNvPr id="6151" name="Picture 7" descr="C:\Users\Bob Gorman\AppData\Local\Skitch\Screenshot_111315_062858_PM.jpg"/>
-          <p:cNvPicPr>
-            <a:picLocks noChangeAspect="1" noChangeArrowheads="1"/>
-          </p:cNvPicPr>
-          <p:nvPr/>
-        </p:nvPicPr>
-        <p:blipFill>
-          <a:blip r:embed="rId4">
-            <a:extLst>
-              <a:ext uri="{28A0092B-C50C-407E-A947-70E740481C1C}">
-                <a14:useLocalDpi xmlns:a14="http://schemas.microsoft.com/office/drawing/2010/main" val="0"/>
-              </a:ext>
-            </a:extLst>
-          </a:blip>
-          <a:srcRect/>
-          <a:stretch>
-            <a:fillRect/>
-          </a:stretch>
-        </p:blipFill>
-        <p:spPr bwMode="auto">
-          <a:xfrm>
-            <a:off x="3219245" y="2891817"/>
-            <a:ext cx="2277670" cy="3373692"/>
-          </a:xfrm>
-          <a:prstGeom prst="rect">
-            <a:avLst/>
-          </a:prstGeom>
-          <a:noFill/>
-          <a:extLst>
-            <a:ext uri="{909E8E84-426E-40DD-AFC4-6F175D3DCCD1}">
-              <a14:hiddenFill xmlns:a14="http://schemas.microsoft.com/office/drawing/2010/main">
-                <a:solidFill>
-                  <a:srgbClr val="FFFFFF"/>
-                </a:solidFill>
-              </a14:hiddenFill>
-            </a:ext>
-          </a:extLst>
-        </p:spPr>
-      </p:pic>
-      <p:pic>
-        <p:nvPicPr>
-          <p:cNvPr id="6152" name="Picture 8" descr="C:\Users\Bob Gorman\AppData\Local\Skitch\Screenshot_111315_063001_PM.jpg"/>
-          <p:cNvPicPr>
-            <a:picLocks noChangeAspect="1" noChangeArrowheads="1"/>
-          </p:cNvPicPr>
-          <p:nvPr/>
-        </p:nvPicPr>
-        <p:blipFill>
-          <a:blip r:embed="rId5">
-            <a:extLst>
-              <a:ext uri="{28A0092B-C50C-407E-A947-70E740481C1C}">
-                <a14:useLocalDpi xmlns:a14="http://schemas.microsoft.com/office/drawing/2010/main" val="0"/>
-              </a:ext>
-            </a:extLst>
-          </a:blip>
-          <a:srcRect/>
-          <a:stretch>
-            <a:fillRect/>
-          </a:stretch>
-        </p:blipFill>
-        <p:spPr bwMode="auto">
-          <a:xfrm>
-            <a:off x="5442896" y="2891817"/>
-            <a:ext cx="2563235" cy="2670783"/>
-          </a:xfrm>
-          <a:prstGeom prst="rect">
-            <a:avLst/>
-          </a:prstGeom>
-          <a:noFill/>
-          <a:extLst>
-            <a:ext uri="{909E8E84-426E-40DD-AFC4-6F175D3DCCD1}">
-              <a14:hiddenFill xmlns:a14="http://schemas.microsoft.com/office/drawing/2010/main">
-                <a:solidFill>
-                  <a:srgbClr val="FFFFFF"/>
-                </a:solidFill>
-              </a14:hiddenFill>
-            </a:ext>
-          </a:extLst>
-        </p:spPr>
-      </p:pic>
-    </p:spTree>
-    <p:extLst>
-      <p:ext uri="{BB962C8B-B14F-4D97-AF65-F5344CB8AC3E}">
-        <p14:creationId xmlns:p14="http://schemas.microsoft.com/office/powerpoint/2010/main" val="384389964"/>
-      </p:ext>
-    </p:extLst>
-  </p:cSld>
-  <p:clrMapOvr>
-    <a:masterClrMapping/>
-  </p:clrMapOvr>
 </p:sld>
 </file>
 

</xml_diff>

<commit_message>
adds to PPt for sbl.
</commit_message>
<xml_diff>
--- a/SBL_talk/sbl_presentation.pptx
+++ b/SBL_talk/sbl_presentation.pptx
@@ -340,7 +340,7 @@
           <a:p>
             <a:fld id="{AB94029E-6FCD-4D3D-AE41-24E942A5DE05}" type="datetimeFigureOut">
               <a:rPr lang="en-US" smtClean="0"/>
-              <a:t>11/16/2015</a:t>
+              <a:t>11/18/2015</a:t>
             </a:fld>
             <a:endParaRPr lang="en-US"/>
           </a:p>
@@ -510,7 +510,7 @@
           <a:p>
             <a:fld id="{AB94029E-6FCD-4D3D-AE41-24E942A5DE05}" type="datetimeFigureOut">
               <a:rPr lang="en-US" smtClean="0"/>
-              <a:t>11/16/2015</a:t>
+              <a:t>11/18/2015</a:t>
             </a:fld>
             <a:endParaRPr lang="en-US"/>
           </a:p>
@@ -690,7 +690,7 @@
           <a:p>
             <a:fld id="{AB94029E-6FCD-4D3D-AE41-24E942A5DE05}" type="datetimeFigureOut">
               <a:rPr lang="en-US" smtClean="0"/>
-              <a:t>11/16/2015</a:t>
+              <a:t>11/18/2015</a:t>
             </a:fld>
             <a:endParaRPr lang="en-US"/>
           </a:p>
@@ -860,7 +860,7 @@
           <a:p>
             <a:fld id="{AB94029E-6FCD-4D3D-AE41-24E942A5DE05}" type="datetimeFigureOut">
               <a:rPr lang="en-US" smtClean="0"/>
-              <a:t>11/16/2015</a:t>
+              <a:t>11/18/2015</a:t>
             </a:fld>
             <a:endParaRPr lang="en-US"/>
           </a:p>
@@ -1106,7 +1106,7 @@
           <a:p>
             <a:fld id="{AB94029E-6FCD-4D3D-AE41-24E942A5DE05}" type="datetimeFigureOut">
               <a:rPr lang="en-US" smtClean="0"/>
-              <a:t>11/16/2015</a:t>
+              <a:t>11/18/2015</a:t>
             </a:fld>
             <a:endParaRPr lang="en-US"/>
           </a:p>
@@ -1394,7 +1394,7 @@
           <a:p>
             <a:fld id="{AB94029E-6FCD-4D3D-AE41-24E942A5DE05}" type="datetimeFigureOut">
               <a:rPr lang="en-US" smtClean="0"/>
-              <a:t>11/16/2015</a:t>
+              <a:t>11/18/2015</a:t>
             </a:fld>
             <a:endParaRPr lang="en-US"/>
           </a:p>
@@ -1816,7 +1816,7 @@
           <a:p>
             <a:fld id="{AB94029E-6FCD-4D3D-AE41-24E942A5DE05}" type="datetimeFigureOut">
               <a:rPr lang="en-US" smtClean="0"/>
-              <a:t>11/16/2015</a:t>
+              <a:t>11/18/2015</a:t>
             </a:fld>
             <a:endParaRPr lang="en-US"/>
           </a:p>
@@ -1934,7 +1934,7 @@
           <a:p>
             <a:fld id="{AB94029E-6FCD-4D3D-AE41-24E942A5DE05}" type="datetimeFigureOut">
               <a:rPr lang="en-US" smtClean="0"/>
-              <a:t>11/16/2015</a:t>
+              <a:t>11/18/2015</a:t>
             </a:fld>
             <a:endParaRPr lang="en-US"/>
           </a:p>
@@ -2029,7 +2029,7 @@
           <a:p>
             <a:fld id="{AB94029E-6FCD-4D3D-AE41-24E942A5DE05}" type="datetimeFigureOut">
               <a:rPr lang="en-US" smtClean="0"/>
-              <a:t>11/16/2015</a:t>
+              <a:t>11/18/2015</a:t>
             </a:fld>
             <a:endParaRPr lang="en-US"/>
           </a:p>
@@ -2306,7 +2306,7 @@
           <a:p>
             <a:fld id="{AB94029E-6FCD-4D3D-AE41-24E942A5DE05}" type="datetimeFigureOut">
               <a:rPr lang="en-US" smtClean="0"/>
-              <a:t>11/16/2015</a:t>
+              <a:t>11/18/2015</a:t>
             </a:fld>
             <a:endParaRPr lang="en-US"/>
           </a:p>
@@ -2559,7 +2559,7 @@
           <a:p>
             <a:fld id="{AB94029E-6FCD-4D3D-AE41-24E942A5DE05}" type="datetimeFigureOut">
               <a:rPr lang="en-US" smtClean="0"/>
-              <a:t>11/16/2015</a:t>
+              <a:t>11/18/2015</a:t>
             </a:fld>
             <a:endParaRPr lang="en-US"/>
           </a:p>
@@ -2772,7 +2772,7 @@
           <a:p>
             <a:fld id="{AB94029E-6FCD-4D3D-AE41-24E942A5DE05}" type="datetimeFigureOut">
               <a:rPr lang="en-US" smtClean="0"/>
-              <a:t>11/16/2015</a:t>
+              <a:t>11/18/2015</a:t>
             </a:fld>
             <a:endParaRPr lang="en-US"/>
           </a:p>
@@ -4198,6 +4198,167 @@
           <a:chExt cx="0" cy="0"/>
         </a:xfrm>
       </p:grpSpPr>
+      <p:sp>
+        <p:nvSpPr>
+          <p:cNvPr id="2" name="TextBox 1"/>
+          <p:cNvSpPr txBox="1"/>
+          <p:nvPr/>
+        </p:nvSpPr>
+        <p:spPr>
+          <a:xfrm>
+            <a:off x="990600" y="1143000"/>
+            <a:ext cx="7315200" cy="954107"/>
+          </a:xfrm>
+          <a:prstGeom prst="rect">
+            <a:avLst/>
+          </a:prstGeom>
+          <a:noFill/>
+        </p:spPr>
+        <p:txBody>
+          <a:bodyPr wrap="square" rtlCol="0">
+            <a:spAutoFit/>
+          </a:bodyPr>
+          <a:lstStyle/>
+          <a:p>
+            <a:r>
+              <a:rPr lang="en-US" sz="2800" dirty="0" smtClean="0"/>
+              <a:t>Starting point: how to evaluate ancient reuse of lost texts?</a:t>
+            </a:r>
+            <a:endParaRPr lang="en-US" sz="2800" dirty="0"/>
+          </a:p>
+        </p:txBody>
+      </p:sp>
+      <p:sp>
+        <p:nvSpPr>
+          <p:cNvPr id="3" name="Rectangle 2"/>
+          <p:cNvSpPr/>
+          <p:nvPr/>
+        </p:nvSpPr>
+        <p:spPr>
+          <a:xfrm>
+            <a:off x="765699" y="2228671"/>
+            <a:ext cx="7543800" cy="2677656"/>
+          </a:xfrm>
+          <a:prstGeom prst="rect">
+            <a:avLst/>
+          </a:prstGeom>
+        </p:spPr>
+        <p:txBody>
+          <a:bodyPr wrap="square">
+            <a:spAutoFit/>
+          </a:bodyPr>
+          <a:lstStyle/>
+          <a:p>
+            <a:r>
+              <a:rPr lang="en-US" sz="2400" dirty="0" err="1" smtClean="0"/>
+              <a:t>Athenaeus</a:t>
+            </a:r>
+            <a:r>
+              <a:rPr lang="en-US" sz="2400" dirty="0" smtClean="0"/>
+              <a:t> 12.41, </a:t>
+            </a:r>
+            <a:r>
+              <a:rPr lang="en-US" sz="2400" dirty="0" err="1" smtClean="0"/>
+              <a:t>Θεό</a:t>
+            </a:r>
+            <a:r>
+              <a:rPr lang="en-US" sz="2400" dirty="0" smtClean="0"/>
+              <a:t>πομπος </a:t>
+            </a:r>
+            <a:r>
+              <a:rPr lang="en-US" sz="2400" dirty="0"/>
+              <a:t>δ' ἐν πεντεκαιδεκάτῃ Φιλιππικῶν Ἱστοριῶν </a:t>
+            </a:r>
+            <a:r>
+              <a:rPr lang="el-GR" sz="2400" dirty="0"/>
+              <a:t>Στράτωνα</a:t>
+            </a:r>
+            <a:r>
+              <a:rPr lang="en-US" sz="2400" dirty="0"/>
+              <a:t> </a:t>
+            </a:r>
+            <a:r>
+              <a:rPr lang="en-US" sz="2400" dirty="0" err="1"/>
+              <a:t>φησι</a:t>
+            </a:r>
+            <a:r>
+              <a:rPr lang="en-US" sz="2400" dirty="0"/>
+              <a:t> </a:t>
+            </a:r>
+            <a:r>
+              <a:rPr lang="en-US" sz="2400" dirty="0" err="1"/>
+              <a:t>τὸν</a:t>
+            </a:r>
+            <a:r>
+              <a:rPr lang="en-US" sz="2400" dirty="0"/>
+              <a:t> </a:t>
+            </a:r>
+            <a:r>
+              <a:rPr lang="en-US" sz="2400" dirty="0" err="1"/>
+              <a:t>Σιδώνιον</a:t>
+            </a:r>
+            <a:r>
+              <a:rPr lang="en-US" sz="2400" dirty="0"/>
+              <a:t> βα</a:t>
+            </a:r>
+            <a:r>
+              <a:rPr lang="en-US" sz="2400" dirty="0" err="1"/>
+              <a:t>σιλέ</a:t>
+            </a:r>
+            <a:r>
+              <a:rPr lang="en-US" sz="2400" dirty="0"/>
+              <a:t>α ὑπερβάλλειν ἡδυπαθείᾳ καὶ τρυφῇ πάντας ἀνθρώπους</a:t>
+            </a:r>
+            <a:r>
+              <a:rPr lang="en-US" sz="2400" dirty="0" smtClean="0"/>
+              <a:t>.</a:t>
+            </a:r>
+            <a:br>
+              <a:rPr lang="en-US" sz="2400" dirty="0" smtClean="0"/>
+            </a:br>
+            <a:r>
+              <a:rPr lang="en-US" sz="2400" dirty="0" smtClean="0"/>
+              <a:t/>
+            </a:r>
+            <a:br>
+              <a:rPr lang="en-US" sz="2400" dirty="0" smtClean="0"/>
+            </a:br>
+            <a:r>
+              <a:rPr lang="en-US" sz="2400" dirty="0" err="1" smtClean="0"/>
+              <a:t>Theopompus</a:t>
+            </a:r>
+            <a:r>
+              <a:rPr lang="en-US" sz="2400" dirty="0" smtClean="0"/>
+              <a:t> in the 15</a:t>
+            </a:r>
+            <a:r>
+              <a:rPr lang="en-US" sz="2400" baseline="30000" dirty="0" smtClean="0"/>
+              <a:t>th</a:t>
+            </a:r>
+            <a:r>
+              <a:rPr lang="en-US" sz="2400" dirty="0" smtClean="0"/>
+              <a:t> book of his Philippic Histories says that </a:t>
+            </a:r>
+            <a:r>
+              <a:rPr lang="en-US" sz="2400" dirty="0" err="1" smtClean="0"/>
+              <a:t>Straton</a:t>
+            </a:r>
+            <a:r>
+              <a:rPr lang="en-US" sz="2400" dirty="0" smtClean="0"/>
+              <a:t>, the </a:t>
+            </a:r>
+            <a:r>
+              <a:rPr lang="en-US" sz="2400" dirty="0" err="1" smtClean="0"/>
+              <a:t>Sidonian</a:t>
+            </a:r>
+            <a:r>
+              <a:rPr lang="en-US" sz="2400" dirty="0" smtClean="0"/>
+              <a:t> king, surpassed all people in extravagance and self-indulgence. </a:t>
+            </a:r>
+            <a:endParaRPr lang="en-US" sz="2400" dirty="0"/>
+          </a:p>
+        </p:txBody>
+      </p:sp>
     </p:spTree>
     <p:extLst>
       <p:ext uri="{BB962C8B-B14F-4D97-AF65-F5344CB8AC3E}">

</xml_diff>